<commit_message>
Fixed error in wiring diagram for generic PS2 joystick
</commit_message>
<xml_diff>
--- a/Documentation/Working_Documents/Assets/Spruce Wiring Diagrams.pptx
+++ b/Documentation/Working_Documents/Assets/Spruce Wiring Diagrams.pptx
@@ -114,1267 +114,85 @@
 </p:presentation>
 </file>
 
-<file path=ppt/revisionInfo.xml><?xml version="1.0" encoding="utf-8"?>
-<p1510:revInfo xmlns:a="http://schemas.openxmlformats.org/drawingml/2006/main" xmlns:r="http://schemas.openxmlformats.org/officeDocument/2006/relationships" xmlns:p1510="http://schemas.microsoft.com/office/powerpoint/2015/10/main">
-  <p1510:revLst>
-    <p1510:client id="{998EA659-91A7-412B-94B9-119A637F5B9E}" v="2" dt="2023-12-14T17:13:38.023"/>
-  </p1510:revLst>
-</p1510:revInfo>
-</file>
-
 <file path=ppt/changesInfos/changesInfo1.xml><?xml version="1.0" encoding="utf-8"?>
 <pc:chgInfo xmlns:a="http://schemas.openxmlformats.org/drawingml/2006/main" xmlns:r="http://schemas.openxmlformats.org/officeDocument/2006/relationships" xmlns:ac="http://schemas.microsoft.com/office/drawing/2013/main/command" xmlns:pc="http://schemas.microsoft.com/office/powerpoint/2013/main/command">
   <pc:docChgLst>
-    <pc:chgData name="Josie Versloot" userId="21650351-ceaf-4c5e-acf0-be8276fefc3c" providerId="ADAL" clId="{23DB148D-3B2F-4928-82C9-E7B12ED6FC7C}"/>
-    <pc:docChg chg="undo redo custSel addSld modSld">
-      <pc:chgData name="Josie Versloot" userId="21650351-ceaf-4c5e-acf0-be8276fefc3c" providerId="ADAL" clId="{23DB148D-3B2F-4928-82C9-E7B12ED6FC7C}" dt="2023-09-22T13:30:58.670" v="821" actId="1036"/>
+    <pc:chgData name="Stephen Moyer" userId="fde0619e-9f48-44fe-9adc-708c18563dcc" providerId="ADAL" clId="{998EA659-91A7-412B-94B9-119A637F5B9E}"/>
+    <pc:docChg chg="modSld">
+      <pc:chgData name="Stephen Moyer" userId="fde0619e-9f48-44fe-9adc-708c18563dcc" providerId="ADAL" clId="{998EA659-91A7-412B-94B9-119A637F5B9E}" dt="2023-12-14T17:13:54.659" v="24" actId="1076"/>
       <pc:docMkLst>
         <pc:docMk/>
       </pc:docMkLst>
-      <pc:sldChg chg="addSp delSp modSp mod">
-        <pc:chgData name="Josie Versloot" userId="21650351-ceaf-4c5e-acf0-be8276fefc3c" providerId="ADAL" clId="{23DB148D-3B2F-4928-82C9-E7B12ED6FC7C}" dt="2023-09-22T13:30:58.670" v="821" actId="1036"/>
+      <pc:sldChg chg="addSp modSp mod">
+        <pc:chgData name="Stephen Moyer" userId="fde0619e-9f48-44fe-9adc-708c18563dcc" providerId="ADAL" clId="{998EA659-91A7-412B-94B9-119A637F5B9E}" dt="2023-12-14T17:13:54.659" v="24" actId="1076"/>
         <pc:sldMkLst>
           <pc:docMk/>
-          <pc:sldMk cId="2922292050" sldId="256"/>
+          <pc:sldMk cId="1725122554" sldId="259"/>
         </pc:sldMkLst>
-        <pc:spChg chg="add mod">
-          <ac:chgData name="Josie Versloot" userId="21650351-ceaf-4c5e-acf0-be8276fefc3c" providerId="ADAL" clId="{23DB148D-3B2F-4928-82C9-E7B12ED6FC7C}" dt="2023-09-22T13:22:54.042" v="696" actId="1036"/>
+        <pc:spChg chg="mod">
+          <ac:chgData name="Stephen Moyer" userId="fde0619e-9f48-44fe-9adc-708c18563dcc" providerId="ADAL" clId="{998EA659-91A7-412B-94B9-119A637F5B9E}" dt="2023-12-14T17:12:04.659" v="9" actId="207"/>
           <ac:spMkLst>
             <pc:docMk/>
-            <pc:sldMk cId="2922292050" sldId="256"/>
-            <ac:spMk id="21" creationId="{453BBD75-CA27-D040-AB53-0E5485FE3510}"/>
-          </ac:spMkLst>
-        </pc:spChg>
-        <pc:spChg chg="add mod">
-          <ac:chgData name="Josie Versloot" userId="21650351-ceaf-4c5e-acf0-be8276fefc3c" providerId="ADAL" clId="{23DB148D-3B2F-4928-82C9-E7B12ED6FC7C}" dt="2023-09-22T13:24:43.556" v="719" actId="207"/>
-          <ac:spMkLst>
-            <pc:docMk/>
-            <pc:sldMk cId="2922292050" sldId="256"/>
-            <ac:spMk id="22" creationId="{B57E2696-DCF1-54D6-7767-9FE6BEA097BF}"/>
-          </ac:spMkLst>
-        </pc:spChg>
-        <pc:spChg chg="add mod">
-          <ac:chgData name="Josie Versloot" userId="21650351-ceaf-4c5e-acf0-be8276fefc3c" providerId="ADAL" clId="{23DB148D-3B2F-4928-82C9-E7B12ED6FC7C}" dt="2023-09-22T13:27:47.249" v="757" actId="1076"/>
-          <ac:spMkLst>
-            <pc:docMk/>
-            <pc:sldMk cId="2922292050" sldId="256"/>
-            <ac:spMk id="54" creationId="{C83D70B9-5BE4-7E49-33FA-B74892EC33FA}"/>
-          </ac:spMkLst>
-        </pc:spChg>
-        <pc:spChg chg="add mod">
-          <ac:chgData name="Josie Versloot" userId="21650351-ceaf-4c5e-acf0-be8276fefc3c" providerId="ADAL" clId="{23DB148D-3B2F-4928-82C9-E7B12ED6FC7C}" dt="2023-09-22T13:28:20.930" v="763" actId="1076"/>
-          <ac:spMkLst>
-            <pc:docMk/>
-            <pc:sldMk cId="2922292050" sldId="256"/>
-            <ac:spMk id="61" creationId="{B1C9EFF5-BB50-E3F9-9668-91DAD3D41D62}"/>
-          </ac:spMkLst>
-        </pc:spChg>
-        <pc:spChg chg="add mod">
-          <ac:chgData name="Josie Versloot" userId="21650351-ceaf-4c5e-acf0-be8276fefc3c" providerId="ADAL" clId="{23DB148D-3B2F-4928-82C9-E7B12ED6FC7C}" dt="2023-09-22T13:30:58.670" v="821" actId="1036"/>
-          <ac:spMkLst>
-            <pc:docMk/>
-            <pc:sldMk cId="2922292050" sldId="256"/>
-            <ac:spMk id="62" creationId="{7BDBC84D-180D-49DF-7084-F9F8209948C9}"/>
-          </ac:spMkLst>
-        </pc:spChg>
-        <pc:spChg chg="add mod">
-          <ac:chgData name="Josie Versloot" userId="21650351-ceaf-4c5e-acf0-be8276fefc3c" providerId="ADAL" clId="{23DB148D-3B2F-4928-82C9-E7B12ED6FC7C}" dt="2023-09-22T13:30:53.163" v="818" actId="1035"/>
-          <ac:spMkLst>
-            <pc:docMk/>
-            <pc:sldMk cId="2922292050" sldId="256"/>
-            <ac:spMk id="1024" creationId="{1467EA08-F534-C889-8D1A-6D38ADE2E241}"/>
-          </ac:spMkLst>
-        </pc:spChg>
-        <pc:spChg chg="add mod">
-          <ac:chgData name="Josie Versloot" userId="21650351-ceaf-4c5e-acf0-be8276fefc3c" providerId="ADAL" clId="{23DB148D-3B2F-4928-82C9-E7B12ED6FC7C}" dt="2023-09-20T14:46:19.963" v="155" actId="208"/>
-          <ac:spMkLst>
-            <pc:docMk/>
-            <pc:sldMk cId="2922292050" sldId="256"/>
-            <ac:spMk id="1048" creationId="{B1FE8235-C8AD-945F-95DB-FFD3265E13D1}"/>
-          </ac:spMkLst>
-        </pc:spChg>
-        <pc:picChg chg="add mod">
-          <ac:chgData name="Josie Versloot" userId="21650351-ceaf-4c5e-acf0-be8276fefc3c" providerId="ADAL" clId="{23DB148D-3B2F-4928-82C9-E7B12ED6FC7C}" dt="2023-09-22T13:22:50.268" v="695" actId="1035"/>
-          <ac:picMkLst>
-            <pc:docMk/>
-            <pc:sldMk cId="2922292050" sldId="256"/>
-            <ac:picMk id="3" creationId="{6A74AC54-97B7-AEEC-982B-F2921D2DAEDD}"/>
-          </ac:picMkLst>
-        </pc:picChg>
-        <pc:picChg chg="add del mod">
-          <ac:chgData name="Josie Versloot" userId="21650351-ceaf-4c5e-acf0-be8276fefc3c" providerId="ADAL" clId="{23DB148D-3B2F-4928-82C9-E7B12ED6FC7C}" dt="2023-09-22T13:19:47.232" v="623" actId="478"/>
-          <ac:picMkLst>
-            <pc:docMk/>
-            <pc:sldMk cId="2922292050" sldId="256"/>
-            <ac:picMk id="5" creationId="{10059444-DD1A-EAB0-82B2-09D49631B5CF}"/>
-          </ac:picMkLst>
-        </pc:picChg>
-        <pc:picChg chg="mod">
-          <ac:chgData name="Josie Versloot" userId="21650351-ceaf-4c5e-acf0-be8276fefc3c" providerId="ADAL" clId="{23DB148D-3B2F-4928-82C9-E7B12ED6FC7C}" dt="2023-09-22T13:17:50.247" v="615" actId="14100"/>
-          <ac:picMkLst>
-            <pc:docMk/>
-            <pc:sldMk cId="2922292050" sldId="256"/>
-            <ac:picMk id="1028" creationId="{A4D3099E-C7DC-F8BE-C5F3-7B2CA7808018}"/>
-          </ac:picMkLst>
-        </pc:picChg>
-        <pc:cxnChg chg="add del mod">
-          <ac:chgData name="Josie Versloot" userId="21650351-ceaf-4c5e-acf0-be8276fefc3c" providerId="ADAL" clId="{23DB148D-3B2F-4928-82C9-E7B12ED6FC7C}" dt="2023-09-22T13:20:20.357" v="627"/>
-          <ac:cxnSpMkLst>
-            <pc:docMk/>
-            <pc:sldMk cId="2922292050" sldId="256"/>
-            <ac:cxnSpMk id="19" creationId="{F59B0472-CD7C-D733-6160-C63F739DBF3D}"/>
-          </ac:cxnSpMkLst>
-        </pc:cxnChg>
-        <pc:cxnChg chg="add del mod">
-          <ac:chgData name="Josie Versloot" userId="21650351-ceaf-4c5e-acf0-be8276fefc3c" providerId="ADAL" clId="{23DB148D-3B2F-4928-82C9-E7B12ED6FC7C}" dt="2023-09-22T13:20:20.357" v="627"/>
-          <ac:cxnSpMkLst>
-            <pc:docMk/>
-            <pc:sldMk cId="2922292050" sldId="256"/>
-            <ac:cxnSpMk id="20" creationId="{99D99F5E-A670-EE59-6A78-966A26122674}"/>
-          </ac:cxnSpMkLst>
-        </pc:cxnChg>
-        <pc:cxnChg chg="add mod">
-          <ac:chgData name="Josie Versloot" userId="21650351-ceaf-4c5e-acf0-be8276fefc3c" providerId="ADAL" clId="{23DB148D-3B2F-4928-82C9-E7B12ED6FC7C}" dt="2023-09-22T13:22:54.042" v="696" actId="1036"/>
-          <ac:cxnSpMkLst>
-            <pc:docMk/>
-            <pc:sldMk cId="2922292050" sldId="256"/>
-            <ac:cxnSpMk id="23" creationId="{5DF6E68A-EDDF-F669-A75E-D86E12269403}"/>
-          </ac:cxnSpMkLst>
-        </pc:cxnChg>
-        <pc:cxnChg chg="add mod">
-          <ac:chgData name="Josie Versloot" userId="21650351-ceaf-4c5e-acf0-be8276fefc3c" providerId="ADAL" clId="{23DB148D-3B2F-4928-82C9-E7B12ED6FC7C}" dt="2023-09-22T13:22:54.042" v="696" actId="1036"/>
-          <ac:cxnSpMkLst>
-            <pc:docMk/>
-            <pc:sldMk cId="2922292050" sldId="256"/>
-            <ac:cxnSpMk id="24" creationId="{714D9DDF-4416-4646-3533-E3325B769F25}"/>
-          </ac:cxnSpMkLst>
-        </pc:cxnChg>
-        <pc:cxnChg chg="add mod">
-          <ac:chgData name="Josie Versloot" userId="21650351-ceaf-4c5e-acf0-be8276fefc3c" providerId="ADAL" clId="{23DB148D-3B2F-4928-82C9-E7B12ED6FC7C}" dt="2023-09-22T13:22:54.042" v="696" actId="1036"/>
-          <ac:cxnSpMkLst>
-            <pc:docMk/>
-            <pc:sldMk cId="2922292050" sldId="256"/>
-            <ac:cxnSpMk id="25" creationId="{C11744F2-872D-5744-583A-CD6CEE1055F1}"/>
-          </ac:cxnSpMkLst>
-        </pc:cxnChg>
-        <pc:cxnChg chg="add mod">
-          <ac:chgData name="Josie Versloot" userId="21650351-ceaf-4c5e-acf0-be8276fefc3c" providerId="ADAL" clId="{23DB148D-3B2F-4928-82C9-E7B12ED6FC7C}" dt="2023-09-22T13:22:57.958" v="697" actId="14100"/>
-          <ac:cxnSpMkLst>
-            <pc:docMk/>
-            <pc:sldMk cId="2922292050" sldId="256"/>
-            <ac:cxnSpMk id="26" creationId="{15B92820-D23C-AA2F-BBB9-671AD21B55B9}"/>
-          </ac:cxnSpMkLst>
-        </pc:cxnChg>
-        <pc:cxnChg chg="add del mod">
-          <ac:chgData name="Josie Versloot" userId="21650351-ceaf-4c5e-acf0-be8276fefc3c" providerId="ADAL" clId="{23DB148D-3B2F-4928-82C9-E7B12ED6FC7C}" dt="2023-09-22T13:23:46.132" v="704" actId="478"/>
-          <ac:cxnSpMkLst>
-            <pc:docMk/>
-            <pc:sldMk cId="2922292050" sldId="256"/>
-            <ac:cxnSpMk id="28" creationId="{36F5607A-E025-036B-7825-1E6B4972C230}"/>
-          </ac:cxnSpMkLst>
-        </pc:cxnChg>
-        <pc:cxnChg chg="mod ord">
-          <ac:chgData name="Josie Versloot" userId="21650351-ceaf-4c5e-acf0-be8276fefc3c" providerId="ADAL" clId="{23DB148D-3B2F-4928-82C9-E7B12ED6FC7C}" dt="2023-09-20T14:48:34.644" v="199" actId="554"/>
-          <ac:cxnSpMkLst>
-            <pc:docMk/>
-            <pc:sldMk cId="2922292050" sldId="256"/>
-            <ac:cxnSpMk id="30" creationId="{4D8A65B0-FD29-1764-4775-0C869BF5C4E4}"/>
-          </ac:cxnSpMkLst>
-        </pc:cxnChg>
-        <pc:cxnChg chg="add mod ord">
-          <ac:chgData name="Josie Versloot" userId="21650351-ceaf-4c5e-acf0-be8276fefc3c" providerId="ADAL" clId="{23DB148D-3B2F-4928-82C9-E7B12ED6FC7C}" dt="2023-09-22T13:24:33.053" v="718" actId="208"/>
-          <ac:cxnSpMkLst>
-            <pc:docMk/>
-            <pc:sldMk cId="2922292050" sldId="256"/>
-            <ac:cxnSpMk id="31" creationId="{7D435197-ADDB-584B-86EC-E3800DF70A1F}"/>
-          </ac:cxnSpMkLst>
-        </pc:cxnChg>
-        <pc:cxnChg chg="mod">
-          <ac:chgData name="Josie Versloot" userId="21650351-ceaf-4c5e-acf0-be8276fefc3c" providerId="ADAL" clId="{23DB148D-3B2F-4928-82C9-E7B12ED6FC7C}" dt="2023-09-20T14:45:15.017" v="139" actId="692"/>
-          <ac:cxnSpMkLst>
-            <pc:docMk/>
-            <pc:sldMk cId="2922292050" sldId="256"/>
-            <ac:cxnSpMk id="32" creationId="{C0B9AB97-299F-4B76-3C2C-977514A4A449}"/>
-          </ac:cxnSpMkLst>
-        </pc:cxnChg>
-        <pc:cxnChg chg="add mod">
-          <ac:chgData name="Josie Versloot" userId="21650351-ceaf-4c5e-acf0-be8276fefc3c" providerId="ADAL" clId="{23DB148D-3B2F-4928-82C9-E7B12ED6FC7C}" dt="2023-09-22T13:25:38.942" v="733" actId="14100"/>
-          <ac:cxnSpMkLst>
-            <pc:docMk/>
-            <pc:sldMk cId="2922292050" sldId="256"/>
-            <ac:cxnSpMk id="33" creationId="{495E1AC3-BB2C-2078-1868-FB27D432BD29}"/>
-          </ac:cxnSpMkLst>
-        </pc:cxnChg>
-        <pc:cxnChg chg="add mod">
-          <ac:chgData name="Josie Versloot" userId="21650351-ceaf-4c5e-acf0-be8276fefc3c" providerId="ADAL" clId="{23DB148D-3B2F-4928-82C9-E7B12ED6FC7C}" dt="2023-09-22T13:25:46.996" v="734" actId="14100"/>
-          <ac:cxnSpMkLst>
-            <pc:docMk/>
-            <pc:sldMk cId="2922292050" sldId="256"/>
-            <ac:cxnSpMk id="34" creationId="{D1AA424D-52AE-7A5E-2185-B63E6229AD93}"/>
-          </ac:cxnSpMkLst>
-        </pc:cxnChg>
-        <pc:cxnChg chg="add mod">
-          <ac:chgData name="Josie Versloot" userId="21650351-ceaf-4c5e-acf0-be8276fefc3c" providerId="ADAL" clId="{23DB148D-3B2F-4928-82C9-E7B12ED6FC7C}" dt="2023-09-22T13:25:50.871" v="735" actId="14100"/>
-          <ac:cxnSpMkLst>
-            <pc:docMk/>
-            <pc:sldMk cId="2922292050" sldId="256"/>
-            <ac:cxnSpMk id="36" creationId="{8A557AB0-D25B-40F9-3559-294F6792F0DF}"/>
-          </ac:cxnSpMkLst>
-        </pc:cxnChg>
-        <pc:cxnChg chg="mod ord">
-          <ac:chgData name="Josie Versloot" userId="21650351-ceaf-4c5e-acf0-be8276fefc3c" providerId="ADAL" clId="{23DB148D-3B2F-4928-82C9-E7B12ED6FC7C}" dt="2023-09-20T14:48:34.644" v="199" actId="554"/>
-          <ac:cxnSpMkLst>
-            <pc:docMk/>
-            <pc:sldMk cId="2922292050" sldId="256"/>
-            <ac:cxnSpMk id="38" creationId="{7FB42686-8992-805C-FE25-5F355C617FBC}"/>
-          </ac:cxnSpMkLst>
-        </pc:cxnChg>
-        <pc:cxnChg chg="mod">
-          <ac:chgData name="Josie Versloot" userId="21650351-ceaf-4c5e-acf0-be8276fefc3c" providerId="ADAL" clId="{23DB148D-3B2F-4928-82C9-E7B12ED6FC7C}" dt="2023-09-20T14:45:45.396" v="151" actId="692"/>
-          <ac:cxnSpMkLst>
-            <pc:docMk/>
-            <pc:sldMk cId="2922292050" sldId="256"/>
-            <ac:cxnSpMk id="40" creationId="{F0D77CF0-CE44-8A9F-4143-976C0D972E7B}"/>
-          </ac:cxnSpMkLst>
-        </pc:cxnChg>
-        <pc:cxnChg chg="mod ord">
-          <ac:chgData name="Josie Versloot" userId="21650351-ceaf-4c5e-acf0-be8276fefc3c" providerId="ADAL" clId="{23DB148D-3B2F-4928-82C9-E7B12ED6FC7C}" dt="2023-09-20T14:48:37.734" v="200" actId="14100"/>
-          <ac:cxnSpMkLst>
-            <pc:docMk/>
-            <pc:sldMk cId="2922292050" sldId="256"/>
-            <ac:cxnSpMk id="44" creationId="{589A06C1-2B89-58FE-F5C4-3D016A3FEE15}"/>
-          </ac:cxnSpMkLst>
-        </pc:cxnChg>
-        <pc:cxnChg chg="mod">
-          <ac:chgData name="Josie Versloot" userId="21650351-ceaf-4c5e-acf0-be8276fefc3c" providerId="ADAL" clId="{23DB148D-3B2F-4928-82C9-E7B12ED6FC7C}" dt="2023-09-20T14:47:38.257" v="185" actId="692"/>
-          <ac:cxnSpMkLst>
-            <pc:docMk/>
-            <pc:sldMk cId="2922292050" sldId="256"/>
-            <ac:cxnSpMk id="45" creationId="{D21B4FC7-67F5-2402-BE83-0E8FB269A4EC}"/>
-          </ac:cxnSpMkLst>
-        </pc:cxnChg>
-        <pc:cxnChg chg="add mod">
-          <ac:chgData name="Josie Versloot" userId="21650351-ceaf-4c5e-acf0-be8276fefc3c" providerId="ADAL" clId="{23DB148D-3B2F-4928-82C9-E7B12ED6FC7C}" dt="2023-09-22T13:27:49.265" v="758" actId="14100"/>
-          <ac:cxnSpMkLst>
-            <pc:docMk/>
-            <pc:sldMk cId="2922292050" sldId="256"/>
-            <ac:cxnSpMk id="48" creationId="{C03E7130-138C-E68D-7ADA-B2737F3644D5}"/>
-          </ac:cxnSpMkLst>
-        </pc:cxnChg>
-        <pc:cxnChg chg="mod ord">
-          <ac:chgData name="Josie Versloot" userId="21650351-ceaf-4c5e-acf0-be8276fefc3c" providerId="ADAL" clId="{23DB148D-3B2F-4928-82C9-E7B12ED6FC7C}" dt="2023-09-20T14:48:34.644" v="199" actId="554"/>
-          <ac:cxnSpMkLst>
-            <pc:docMk/>
-            <pc:sldMk cId="2922292050" sldId="256"/>
-            <ac:cxnSpMk id="49" creationId="{97D06446-9D9F-4D43-BCA8-F990270E7C53}"/>
-          </ac:cxnSpMkLst>
-        </pc:cxnChg>
-        <pc:cxnChg chg="mod">
-          <ac:chgData name="Josie Versloot" userId="21650351-ceaf-4c5e-acf0-be8276fefc3c" providerId="ADAL" clId="{23DB148D-3B2F-4928-82C9-E7B12ED6FC7C}" dt="2023-09-20T14:47:55.535" v="193" actId="692"/>
-          <ac:cxnSpMkLst>
-            <pc:docMk/>
-            <pc:sldMk cId="2922292050" sldId="256"/>
-            <ac:cxnSpMk id="51" creationId="{D2BBF06E-61A7-163C-EBB8-1EE61F798CD7}"/>
-          </ac:cxnSpMkLst>
-        </pc:cxnChg>
-        <pc:cxnChg chg="add mod">
-          <ac:chgData name="Josie Versloot" userId="21650351-ceaf-4c5e-acf0-be8276fefc3c" providerId="ADAL" clId="{23DB148D-3B2F-4928-82C9-E7B12ED6FC7C}" dt="2023-09-22T13:27:43.346" v="756" actId="1076"/>
-          <ac:cxnSpMkLst>
-            <pc:docMk/>
-            <pc:sldMk cId="2922292050" sldId="256"/>
-            <ac:cxnSpMk id="55" creationId="{2F76AFB4-38DF-95D4-5FCA-E37F10B6E4B4}"/>
-          </ac:cxnSpMkLst>
-        </pc:cxnChg>
-        <pc:cxnChg chg="mod">
-          <ac:chgData name="Josie Versloot" userId="21650351-ceaf-4c5e-acf0-be8276fefc3c" providerId="ADAL" clId="{23DB148D-3B2F-4928-82C9-E7B12ED6FC7C}" dt="2023-09-19T21:15:46.758" v="1" actId="14100"/>
-          <ac:cxnSpMkLst>
-            <pc:docMk/>
-            <pc:sldMk cId="2922292050" sldId="256"/>
-            <ac:cxnSpMk id="58" creationId="{52C5FF01-1E3A-34BC-C669-C5AC61A29F8B}"/>
-          </ac:cxnSpMkLst>
-        </pc:cxnChg>
-      </pc:sldChg>
-      <pc:sldChg chg="addSp delSp modSp mod">
-        <pc:chgData name="Josie Versloot" userId="21650351-ceaf-4c5e-acf0-be8276fefc3c" providerId="ADAL" clId="{23DB148D-3B2F-4928-82C9-E7B12ED6FC7C}" dt="2023-09-20T15:12:54.651" v="604" actId="14100"/>
-        <pc:sldMkLst>
-          <pc:docMk/>
-          <pc:sldMk cId="3542691548" sldId="257"/>
-        </pc:sldMkLst>
-        <pc:spChg chg="del">
-          <ac:chgData name="Josie Versloot" userId="21650351-ceaf-4c5e-acf0-be8276fefc3c" providerId="ADAL" clId="{23DB148D-3B2F-4928-82C9-E7B12ED6FC7C}" dt="2023-09-19T21:16:00.994" v="2" actId="478"/>
-          <ac:spMkLst>
-            <pc:docMk/>
-            <pc:sldMk cId="3542691548" sldId="257"/>
-            <ac:spMk id="4" creationId="{8E4326E5-1328-F6E0-8DCB-DD5FC3F17C57}"/>
-          </ac:spMkLst>
-        </pc:spChg>
-        <pc:spChg chg="add mod">
-          <ac:chgData name="Josie Versloot" userId="21650351-ceaf-4c5e-acf0-be8276fefc3c" providerId="ADAL" clId="{23DB148D-3B2F-4928-82C9-E7B12ED6FC7C}" dt="2023-09-20T14:57:22.921" v="283" actId="1076"/>
-          <ac:spMkLst>
-            <pc:docMk/>
-            <pc:sldMk cId="3542691548" sldId="257"/>
-            <ac:spMk id="5" creationId="{FB5EC477-2430-75BD-907A-BDFD0848FDC0}"/>
-          </ac:spMkLst>
-        </pc:spChg>
-        <pc:spChg chg="add mod">
-          <ac:chgData name="Josie Versloot" userId="21650351-ceaf-4c5e-acf0-be8276fefc3c" providerId="ADAL" clId="{23DB148D-3B2F-4928-82C9-E7B12ED6FC7C}" dt="2023-09-20T14:57:22.921" v="283" actId="1076"/>
-          <ac:spMkLst>
-            <pc:docMk/>
-            <pc:sldMk cId="3542691548" sldId="257"/>
+            <pc:sldMk cId="1725122554" sldId="259"/>
             <ac:spMk id="6" creationId="{77BF3E52-4727-EA7E-D0C5-17E002E9F386}"/>
           </ac:spMkLst>
         </pc:spChg>
-        <pc:spChg chg="add mod">
-          <ac:chgData name="Josie Versloot" userId="21650351-ceaf-4c5e-acf0-be8276fefc3c" providerId="ADAL" clId="{23DB148D-3B2F-4928-82C9-E7B12ED6FC7C}" dt="2023-09-20T14:57:22.921" v="283" actId="1076"/>
+        <pc:spChg chg="mod">
+          <ac:chgData name="Stephen Moyer" userId="fde0619e-9f48-44fe-9adc-708c18563dcc" providerId="ADAL" clId="{998EA659-91A7-412B-94B9-119A637F5B9E}" dt="2023-12-14T17:13:14.539" v="16" actId="207"/>
           <ac:spMkLst>
             <pc:docMk/>
-            <pc:sldMk cId="3542691548" sldId="257"/>
+            <pc:sldMk cId="1725122554" sldId="259"/>
             <ac:spMk id="7" creationId="{70747C81-2036-749C-B56E-C63E7562C252}"/>
           </ac:spMkLst>
         </pc:spChg>
         <pc:spChg chg="add mod">
-          <ac:chgData name="Josie Versloot" userId="21650351-ceaf-4c5e-acf0-be8276fefc3c" providerId="ADAL" clId="{23DB148D-3B2F-4928-82C9-E7B12ED6FC7C}" dt="2023-09-20T14:57:22.921" v="283" actId="1076"/>
+          <ac:chgData name="Stephen Moyer" userId="fde0619e-9f48-44fe-9adc-708c18563dcc" providerId="ADAL" clId="{998EA659-91A7-412B-94B9-119A637F5B9E}" dt="2023-12-14T17:13:54.659" v="24" actId="1076"/>
           <ac:spMkLst>
             <pc:docMk/>
-            <pc:sldMk cId="3542691548" sldId="257"/>
-            <ac:spMk id="8" creationId="{BF20FFF7-E2EB-976B-FD57-8DCA9094558B}"/>
+            <pc:sldMk cId="1725122554" sldId="259"/>
+            <ac:spMk id="30" creationId="{62DD9C45-3DA9-DF79-B6EA-786AED291595}"/>
           </ac:spMkLst>
         </pc:spChg>
-        <pc:spChg chg="add mod">
-          <ac:chgData name="Josie Versloot" userId="21650351-ceaf-4c5e-acf0-be8276fefc3c" providerId="ADAL" clId="{23DB148D-3B2F-4928-82C9-E7B12ED6FC7C}" dt="2023-09-20T14:57:22.921" v="283" actId="1076"/>
-          <ac:spMkLst>
-            <pc:docMk/>
-            <pc:sldMk cId="3542691548" sldId="257"/>
-            <ac:spMk id="9" creationId="{378C1035-760A-2D7E-0085-28E6AEC7829B}"/>
-          </ac:spMkLst>
-        </pc:spChg>
-        <pc:spChg chg="add del mod">
-          <ac:chgData name="Josie Versloot" userId="21650351-ceaf-4c5e-acf0-be8276fefc3c" providerId="ADAL" clId="{23DB148D-3B2F-4928-82C9-E7B12ED6FC7C}" dt="2023-09-20T14:42:46.085" v="112" actId="478"/>
-          <ac:spMkLst>
-            <pc:docMk/>
-            <pc:sldMk cId="3542691548" sldId="257"/>
-            <ac:spMk id="17" creationId="{E59BF495-4824-C225-939C-592C3F08EA90}"/>
-          </ac:spMkLst>
-        </pc:spChg>
-        <pc:spChg chg="add del mod">
-          <ac:chgData name="Josie Versloot" userId="21650351-ceaf-4c5e-acf0-be8276fefc3c" providerId="ADAL" clId="{23DB148D-3B2F-4928-82C9-E7B12ED6FC7C}" dt="2023-09-20T14:42:46.085" v="112" actId="478"/>
-          <ac:spMkLst>
-            <pc:docMk/>
-            <pc:sldMk cId="3542691548" sldId="257"/>
-            <ac:spMk id="18" creationId="{E6993007-44F2-5B92-D935-8B30B54D6973}"/>
-          </ac:spMkLst>
-        </pc:spChg>
-        <pc:spChg chg="add del mod">
-          <ac:chgData name="Josie Versloot" userId="21650351-ceaf-4c5e-acf0-be8276fefc3c" providerId="ADAL" clId="{23DB148D-3B2F-4928-82C9-E7B12ED6FC7C}" dt="2023-09-20T14:42:46.085" v="112" actId="478"/>
-          <ac:spMkLst>
-            <pc:docMk/>
-            <pc:sldMk cId="3542691548" sldId="257"/>
-            <ac:spMk id="19" creationId="{8DBE063E-4A61-911C-3F91-4B8C46617305}"/>
-          </ac:spMkLst>
-        </pc:spChg>
-        <pc:spChg chg="add del mod">
-          <ac:chgData name="Josie Versloot" userId="21650351-ceaf-4c5e-acf0-be8276fefc3c" providerId="ADAL" clId="{23DB148D-3B2F-4928-82C9-E7B12ED6FC7C}" dt="2023-09-20T14:42:46.085" v="112" actId="478"/>
-          <ac:spMkLst>
-            <pc:docMk/>
-            <pc:sldMk cId="3542691548" sldId="257"/>
-            <ac:spMk id="20" creationId="{94FB05F9-652B-4668-FDA7-997DC073D064}"/>
-          </ac:spMkLst>
-        </pc:spChg>
-        <pc:spChg chg="add del mod">
-          <ac:chgData name="Josie Versloot" userId="21650351-ceaf-4c5e-acf0-be8276fefc3c" providerId="ADAL" clId="{23DB148D-3B2F-4928-82C9-E7B12ED6FC7C}" dt="2023-09-20T14:42:46.085" v="112" actId="478"/>
-          <ac:spMkLst>
-            <pc:docMk/>
-            <pc:sldMk cId="3542691548" sldId="257"/>
-            <ac:spMk id="21" creationId="{BEC25390-801D-7807-9A3A-153B2907868E}"/>
-          </ac:spMkLst>
-        </pc:spChg>
-        <pc:spChg chg="add del mod">
-          <ac:chgData name="Josie Versloot" userId="21650351-ceaf-4c5e-acf0-be8276fefc3c" providerId="ADAL" clId="{23DB148D-3B2F-4928-82C9-E7B12ED6FC7C}" dt="2023-09-20T14:48:10.292" v="194" actId="478"/>
-          <ac:spMkLst>
-            <pc:docMk/>
-            <pc:sldMk cId="3542691548" sldId="257"/>
-            <ac:spMk id="22" creationId="{ABDA34A2-DB6F-D543-57AB-FEF824288613}"/>
-          </ac:spMkLst>
-        </pc:spChg>
-        <pc:spChg chg="add del mod">
-          <ac:chgData name="Josie Versloot" userId="21650351-ceaf-4c5e-acf0-be8276fefc3c" providerId="ADAL" clId="{23DB148D-3B2F-4928-82C9-E7B12ED6FC7C}" dt="2023-09-20T14:48:10.292" v="194" actId="478"/>
-          <ac:spMkLst>
-            <pc:docMk/>
-            <pc:sldMk cId="3542691548" sldId="257"/>
-            <ac:spMk id="23" creationId="{E2279729-8E78-8459-0ACE-65BFF5F7D4CB}"/>
-          </ac:spMkLst>
-        </pc:spChg>
-        <pc:spChg chg="add del mod">
-          <ac:chgData name="Josie Versloot" userId="21650351-ceaf-4c5e-acf0-be8276fefc3c" providerId="ADAL" clId="{23DB148D-3B2F-4928-82C9-E7B12ED6FC7C}" dt="2023-09-20T14:48:10.292" v="194" actId="478"/>
-          <ac:spMkLst>
-            <pc:docMk/>
-            <pc:sldMk cId="3542691548" sldId="257"/>
-            <ac:spMk id="24" creationId="{F35047B7-AB4A-B3FD-B18B-BF86D15B3D62}"/>
-          </ac:spMkLst>
-        </pc:spChg>
-        <pc:spChg chg="add del mod">
-          <ac:chgData name="Josie Versloot" userId="21650351-ceaf-4c5e-acf0-be8276fefc3c" providerId="ADAL" clId="{23DB148D-3B2F-4928-82C9-E7B12ED6FC7C}" dt="2023-09-20T14:48:10.292" v="194" actId="478"/>
-          <ac:spMkLst>
-            <pc:docMk/>
-            <pc:sldMk cId="3542691548" sldId="257"/>
-            <ac:spMk id="25" creationId="{70F88842-E1E8-C277-1C1A-601EE15615B7}"/>
-          </ac:spMkLst>
-        </pc:spChg>
-        <pc:spChg chg="add del mod">
-          <ac:chgData name="Josie Versloot" userId="21650351-ceaf-4c5e-acf0-be8276fefc3c" providerId="ADAL" clId="{23DB148D-3B2F-4928-82C9-E7B12ED6FC7C}" dt="2023-09-20T14:48:50.856" v="201" actId="478"/>
-          <ac:spMkLst>
-            <pc:docMk/>
-            <pc:sldMk cId="3542691548" sldId="257"/>
-            <ac:spMk id="49" creationId="{94E5518C-79C8-A5E3-0291-0B6C4B158D36}"/>
-          </ac:spMkLst>
-        </pc:spChg>
-        <pc:spChg chg="add del mod">
-          <ac:chgData name="Josie Versloot" userId="21650351-ceaf-4c5e-acf0-be8276fefc3c" providerId="ADAL" clId="{23DB148D-3B2F-4928-82C9-E7B12ED6FC7C}" dt="2023-09-20T14:48:50.856" v="201" actId="478"/>
-          <ac:spMkLst>
-            <pc:docMk/>
-            <pc:sldMk cId="3542691548" sldId="257"/>
-            <ac:spMk id="50" creationId="{9B01F27E-6983-9DA9-1523-387F86F138CC}"/>
-          </ac:spMkLst>
-        </pc:spChg>
-        <pc:spChg chg="add del mod">
-          <ac:chgData name="Josie Versloot" userId="21650351-ceaf-4c5e-acf0-be8276fefc3c" providerId="ADAL" clId="{23DB148D-3B2F-4928-82C9-E7B12ED6FC7C}" dt="2023-09-20T14:48:50.856" v="201" actId="478"/>
-          <ac:spMkLst>
-            <pc:docMk/>
-            <pc:sldMk cId="3542691548" sldId="257"/>
-            <ac:spMk id="51" creationId="{D3D8B866-BE57-2239-989B-999DF28CE338}"/>
-          </ac:spMkLst>
-        </pc:spChg>
-        <pc:spChg chg="add del mod">
-          <ac:chgData name="Josie Versloot" userId="21650351-ceaf-4c5e-acf0-be8276fefc3c" providerId="ADAL" clId="{23DB148D-3B2F-4928-82C9-E7B12ED6FC7C}" dt="2023-09-20T14:48:50.856" v="201" actId="478"/>
-          <ac:spMkLst>
-            <pc:docMk/>
-            <pc:sldMk cId="3542691548" sldId="257"/>
-            <ac:spMk id="52" creationId="{D4B3CE6B-171C-6373-138B-5EA28C71567F}"/>
-          </ac:spMkLst>
-        </pc:spChg>
-        <pc:spChg chg="add del mod">
-          <ac:chgData name="Josie Versloot" userId="21650351-ceaf-4c5e-acf0-be8276fefc3c" providerId="ADAL" clId="{23DB148D-3B2F-4928-82C9-E7B12ED6FC7C}" dt="2023-09-20T14:48:50.856" v="201" actId="478"/>
-          <ac:spMkLst>
-            <pc:docMk/>
-            <pc:sldMk cId="3542691548" sldId="257"/>
-            <ac:spMk id="53" creationId="{A573D9EB-4411-34DE-7F45-F94EA9117814}"/>
-          </ac:spMkLst>
-        </pc:spChg>
-        <pc:spChg chg="add del mod">
-          <ac:chgData name="Josie Versloot" userId="21650351-ceaf-4c5e-acf0-be8276fefc3c" providerId="ADAL" clId="{23DB148D-3B2F-4928-82C9-E7B12ED6FC7C}" dt="2023-09-20T14:48:50.856" v="201" actId="478"/>
-          <ac:spMkLst>
-            <pc:docMk/>
-            <pc:sldMk cId="3542691548" sldId="257"/>
-            <ac:spMk id="54" creationId="{B35DD35C-2E57-A462-92A1-D82372404A67}"/>
-          </ac:spMkLst>
-        </pc:spChg>
-        <pc:spChg chg="add del mod">
-          <ac:chgData name="Josie Versloot" userId="21650351-ceaf-4c5e-acf0-be8276fefc3c" providerId="ADAL" clId="{23DB148D-3B2F-4928-82C9-E7B12ED6FC7C}" dt="2023-09-20T14:48:50.856" v="201" actId="478"/>
-          <ac:spMkLst>
-            <pc:docMk/>
-            <pc:sldMk cId="3542691548" sldId="257"/>
-            <ac:spMk id="55" creationId="{26213186-6A5B-2AC8-96F8-D5B8AB0BA2E6}"/>
-          </ac:spMkLst>
-        </pc:spChg>
-        <pc:spChg chg="add del mod">
-          <ac:chgData name="Josie Versloot" userId="21650351-ceaf-4c5e-acf0-be8276fefc3c" providerId="ADAL" clId="{23DB148D-3B2F-4928-82C9-E7B12ED6FC7C}" dt="2023-09-20T14:48:52.963" v="202" actId="478"/>
-          <ac:spMkLst>
-            <pc:docMk/>
-            <pc:sldMk cId="3542691548" sldId="257"/>
-            <ac:spMk id="56" creationId="{8CE9C035-94EA-25EB-8DA7-9CEB5DC3C2D1}"/>
-          </ac:spMkLst>
-        </pc:spChg>
-        <pc:spChg chg="add del mod">
-          <ac:chgData name="Josie Versloot" userId="21650351-ceaf-4c5e-acf0-be8276fefc3c" providerId="ADAL" clId="{23DB148D-3B2F-4928-82C9-E7B12ED6FC7C}" dt="2023-09-20T14:48:52.963" v="202" actId="478"/>
-          <ac:spMkLst>
-            <pc:docMk/>
-            <pc:sldMk cId="3542691548" sldId="257"/>
-            <ac:spMk id="57" creationId="{DAB406F8-AF87-6DD7-7F43-DEA75BA21CC2}"/>
-          </ac:spMkLst>
-        </pc:spChg>
-        <pc:spChg chg="add del mod">
-          <ac:chgData name="Josie Versloot" userId="21650351-ceaf-4c5e-acf0-be8276fefc3c" providerId="ADAL" clId="{23DB148D-3B2F-4928-82C9-E7B12ED6FC7C}" dt="2023-09-20T14:48:50.856" v="201" actId="478"/>
-          <ac:spMkLst>
-            <pc:docMk/>
-            <pc:sldMk cId="3542691548" sldId="257"/>
-            <ac:spMk id="2051" creationId="{D625D2A5-DCAE-1A92-2821-397128963B45}"/>
-          </ac:spMkLst>
-        </pc:spChg>
-        <pc:spChg chg="add del mod">
-          <ac:chgData name="Josie Versloot" userId="21650351-ceaf-4c5e-acf0-be8276fefc3c" providerId="ADAL" clId="{23DB148D-3B2F-4928-82C9-E7B12ED6FC7C}" dt="2023-09-20T14:49:03.701" v="205" actId="478"/>
-          <ac:spMkLst>
-            <pc:docMk/>
-            <pc:sldMk cId="3542691548" sldId="257"/>
-            <ac:spMk id="2064" creationId="{B70A267D-CDDF-FA93-CCE0-4AD799887C1F}"/>
-          </ac:spMkLst>
-        </pc:spChg>
-        <pc:spChg chg="add del mod">
-          <ac:chgData name="Josie Versloot" userId="21650351-ceaf-4c5e-acf0-be8276fefc3c" providerId="ADAL" clId="{23DB148D-3B2F-4928-82C9-E7B12ED6FC7C}" dt="2023-09-20T14:49:03.701" v="205" actId="478"/>
-          <ac:spMkLst>
-            <pc:docMk/>
-            <pc:sldMk cId="3542691548" sldId="257"/>
-            <ac:spMk id="2065" creationId="{28D65B14-2481-1B84-95D9-3E1C0B244829}"/>
-          </ac:spMkLst>
-        </pc:spChg>
-        <pc:spChg chg="add del mod">
-          <ac:chgData name="Josie Versloot" userId="21650351-ceaf-4c5e-acf0-be8276fefc3c" providerId="ADAL" clId="{23DB148D-3B2F-4928-82C9-E7B12ED6FC7C}" dt="2023-09-20T14:49:03.701" v="205" actId="478"/>
-          <ac:spMkLst>
-            <pc:docMk/>
-            <pc:sldMk cId="3542691548" sldId="257"/>
-            <ac:spMk id="2066" creationId="{E3DE6343-47ED-CC89-6D6E-2024625ED44F}"/>
-          </ac:spMkLst>
-        </pc:spChg>
-        <pc:spChg chg="add del mod">
-          <ac:chgData name="Josie Versloot" userId="21650351-ceaf-4c5e-acf0-be8276fefc3c" providerId="ADAL" clId="{23DB148D-3B2F-4928-82C9-E7B12ED6FC7C}" dt="2023-09-20T14:49:03.701" v="205" actId="478"/>
-          <ac:spMkLst>
-            <pc:docMk/>
-            <pc:sldMk cId="3542691548" sldId="257"/>
-            <ac:spMk id="2067" creationId="{1D35160E-2743-26C5-B195-9A91D05A53C7}"/>
-          </ac:spMkLst>
-        </pc:spChg>
-        <pc:spChg chg="add del mod">
-          <ac:chgData name="Josie Versloot" userId="21650351-ceaf-4c5e-acf0-be8276fefc3c" providerId="ADAL" clId="{23DB148D-3B2F-4928-82C9-E7B12ED6FC7C}" dt="2023-09-20T14:49:03.701" v="205" actId="478"/>
-          <ac:spMkLst>
-            <pc:docMk/>
-            <pc:sldMk cId="3542691548" sldId="257"/>
-            <ac:spMk id="2068" creationId="{6723B06A-FC65-E259-8F67-5ED89D315BA1}"/>
-          </ac:spMkLst>
-        </pc:spChg>
-        <pc:spChg chg="add mod">
-          <ac:chgData name="Josie Versloot" userId="21650351-ceaf-4c5e-acf0-be8276fefc3c" providerId="ADAL" clId="{23DB148D-3B2F-4928-82C9-E7B12ED6FC7C}" dt="2023-09-20T14:49:01.074" v="204" actId="1076"/>
-          <ac:spMkLst>
-            <pc:docMk/>
-            <pc:sldMk cId="3542691548" sldId="257"/>
-            <ac:spMk id="2069" creationId="{8D77B35A-6D65-101F-6721-3D0D0F3D560A}"/>
-          </ac:spMkLst>
-        </pc:spChg>
-        <pc:spChg chg="add mod">
-          <ac:chgData name="Josie Versloot" userId="21650351-ceaf-4c5e-acf0-be8276fefc3c" providerId="ADAL" clId="{23DB148D-3B2F-4928-82C9-E7B12ED6FC7C}" dt="2023-09-20T14:49:01.074" v="204" actId="1076"/>
-          <ac:spMkLst>
-            <pc:docMk/>
-            <pc:sldMk cId="3542691548" sldId="257"/>
-            <ac:spMk id="2070" creationId="{B040A06E-A129-7C25-967D-1D6B8C948275}"/>
-          </ac:spMkLst>
-        </pc:spChg>
-        <pc:spChg chg="add mod">
-          <ac:chgData name="Josie Versloot" userId="21650351-ceaf-4c5e-acf0-be8276fefc3c" providerId="ADAL" clId="{23DB148D-3B2F-4928-82C9-E7B12ED6FC7C}" dt="2023-09-20T14:49:01.074" v="204" actId="1076"/>
-          <ac:spMkLst>
-            <pc:docMk/>
-            <pc:sldMk cId="3542691548" sldId="257"/>
-            <ac:spMk id="2071" creationId="{311A113C-3D04-5451-574B-1B572962D498}"/>
-          </ac:spMkLst>
-        </pc:spChg>
-        <pc:spChg chg="add mod">
-          <ac:chgData name="Josie Versloot" userId="21650351-ceaf-4c5e-acf0-be8276fefc3c" providerId="ADAL" clId="{23DB148D-3B2F-4928-82C9-E7B12ED6FC7C}" dt="2023-09-20T14:49:01.074" v="204" actId="1076"/>
-          <ac:spMkLst>
-            <pc:docMk/>
-            <pc:sldMk cId="3542691548" sldId="257"/>
-            <ac:spMk id="2072" creationId="{EA404592-0C54-AAD3-F196-ABA1D4C09E10}"/>
-          </ac:spMkLst>
-        </pc:spChg>
-        <pc:spChg chg="add mod">
-          <ac:chgData name="Josie Versloot" userId="21650351-ceaf-4c5e-acf0-be8276fefc3c" providerId="ADAL" clId="{23DB148D-3B2F-4928-82C9-E7B12ED6FC7C}" dt="2023-09-20T14:49:01.074" v="204" actId="1076"/>
-          <ac:spMkLst>
-            <pc:docMk/>
-            <pc:sldMk cId="3542691548" sldId="257"/>
-            <ac:spMk id="2081" creationId="{E0013EC2-D951-EDF6-363B-7954D8389034}"/>
-          </ac:spMkLst>
-        </pc:spChg>
-        <pc:spChg chg="add del mod">
-          <ac:chgData name="Josie Versloot" userId="21650351-ceaf-4c5e-acf0-be8276fefc3c" providerId="ADAL" clId="{23DB148D-3B2F-4928-82C9-E7B12ED6FC7C}" dt="2023-09-20T15:09:23.319" v="525" actId="478"/>
-          <ac:spMkLst>
-            <pc:docMk/>
-            <pc:sldMk cId="3542691548" sldId="257"/>
-            <ac:spMk id="2137" creationId="{30BD4CF9-023C-D60B-0E38-8D0267005877}"/>
-          </ac:spMkLst>
-        </pc:spChg>
-        <pc:spChg chg="add del mod">
-          <ac:chgData name="Josie Versloot" userId="21650351-ceaf-4c5e-acf0-be8276fefc3c" providerId="ADAL" clId="{23DB148D-3B2F-4928-82C9-E7B12ED6FC7C}" dt="2023-09-20T15:09:25.158" v="526" actId="478"/>
-          <ac:spMkLst>
-            <pc:docMk/>
-            <pc:sldMk cId="3542691548" sldId="257"/>
-            <ac:spMk id="2141" creationId="{29ED21A7-CE8F-00A0-4716-DB3ADF9E8E29}"/>
-          </ac:spMkLst>
-        </pc:spChg>
-        <pc:spChg chg="add mod ord">
-          <ac:chgData name="Josie Versloot" userId="21650351-ceaf-4c5e-acf0-be8276fefc3c" providerId="ADAL" clId="{23DB148D-3B2F-4928-82C9-E7B12ED6FC7C}" dt="2023-09-20T15:12:41.968" v="599" actId="208"/>
-          <ac:spMkLst>
-            <pc:docMk/>
-            <pc:sldMk cId="3542691548" sldId="257"/>
-            <ac:spMk id="2143" creationId="{DAB6BE57-85EB-C8E2-521A-7D8F7AB421EF}"/>
-          </ac:spMkLst>
-        </pc:spChg>
-        <pc:spChg chg="add mod">
-          <ac:chgData name="Josie Versloot" userId="21650351-ceaf-4c5e-acf0-be8276fefc3c" providerId="ADAL" clId="{23DB148D-3B2F-4928-82C9-E7B12ED6FC7C}" dt="2023-09-20T15:11:24.814" v="568" actId="14100"/>
-          <ac:spMkLst>
-            <pc:docMk/>
-            <pc:sldMk cId="3542691548" sldId="257"/>
-            <ac:spMk id="2166" creationId="{7130555E-1D52-1DA6-5CF9-824505E18894}"/>
-          </ac:spMkLst>
-        </pc:spChg>
-        <pc:picChg chg="add del mod">
-          <ac:chgData name="Josie Versloot" userId="21650351-ceaf-4c5e-acf0-be8276fefc3c" providerId="ADAL" clId="{23DB148D-3B2F-4928-82C9-E7B12ED6FC7C}" dt="2023-09-20T14:48:10.292" v="194" actId="478"/>
-          <ac:picMkLst>
-            <pc:docMk/>
-            <pc:sldMk cId="3542691548" sldId="257"/>
-            <ac:picMk id="13" creationId="{AAA69C63-F0DB-6CED-048F-3F143BFE611B}"/>
-          </ac:picMkLst>
-        </pc:picChg>
-        <pc:picChg chg="add del mod">
-          <ac:chgData name="Josie Versloot" userId="21650351-ceaf-4c5e-acf0-be8276fefc3c" providerId="ADAL" clId="{23DB148D-3B2F-4928-82C9-E7B12ED6FC7C}" dt="2023-09-20T14:48:50.856" v="201" actId="478"/>
-          <ac:picMkLst>
-            <pc:docMk/>
-            <pc:sldMk cId="3542691548" sldId="257"/>
-            <ac:picMk id="45" creationId="{E6C0DF2B-E67A-383A-C752-A1EFC4B296DB}"/>
-          </ac:picMkLst>
-        </pc:picChg>
-        <pc:picChg chg="mod">
-          <ac:chgData name="Josie Versloot" userId="21650351-ceaf-4c5e-acf0-be8276fefc3c" providerId="ADAL" clId="{23DB148D-3B2F-4928-82C9-E7B12ED6FC7C}" dt="2023-09-20T14:57:22.921" v="283" actId="1076"/>
-          <ac:picMkLst>
-            <pc:docMk/>
-            <pc:sldMk cId="3542691548" sldId="257"/>
-            <ac:picMk id="2050" creationId="{E32688F9-D91A-7D76-79BB-42644DB1638C}"/>
-          </ac:picMkLst>
-        </pc:picChg>
-        <pc:picChg chg="add del mod">
-          <ac:chgData name="Josie Versloot" userId="21650351-ceaf-4c5e-acf0-be8276fefc3c" providerId="ADAL" clId="{23DB148D-3B2F-4928-82C9-E7B12ED6FC7C}" dt="2023-09-19T21:16:47.464" v="12" actId="21"/>
-          <ac:picMkLst>
-            <pc:docMk/>
-            <pc:sldMk cId="3542691548" sldId="257"/>
-            <ac:picMk id="2052" creationId="{4BE56AA3-C4D7-E743-1AEE-8CC3343A9AD1}"/>
-          </ac:picMkLst>
-        </pc:picChg>
-        <pc:picChg chg="add mod">
-          <ac:chgData name="Josie Versloot" userId="21650351-ceaf-4c5e-acf0-be8276fefc3c" providerId="ADAL" clId="{23DB148D-3B2F-4928-82C9-E7B12ED6FC7C}" dt="2023-09-20T14:49:01.074" v="204" actId="1076"/>
-          <ac:picMkLst>
-            <pc:docMk/>
-            <pc:sldMk cId="3542691548" sldId="257"/>
-            <ac:picMk id="2060" creationId="{5E3E1480-BE18-AC09-0C03-5787CD68C0D4}"/>
-          </ac:picMkLst>
-        </pc:picChg>
-        <pc:cxnChg chg="add del mod">
-          <ac:chgData name="Josie Versloot" userId="21650351-ceaf-4c5e-acf0-be8276fefc3c" providerId="ADAL" clId="{23DB148D-3B2F-4928-82C9-E7B12ED6FC7C}" dt="2023-09-20T14:48:10.292" v="194" actId="478"/>
-          <ac:cxnSpMkLst>
-            <pc:docMk/>
-            <pc:sldMk cId="3542691548" sldId="257"/>
-            <ac:cxnSpMk id="10" creationId="{18AAA979-A458-249B-A9B1-99556840E579}"/>
-          </ac:cxnSpMkLst>
-        </pc:cxnChg>
-        <pc:cxnChg chg="add del mod">
-          <ac:chgData name="Josie Versloot" userId="21650351-ceaf-4c5e-acf0-be8276fefc3c" providerId="ADAL" clId="{23DB148D-3B2F-4928-82C9-E7B12ED6FC7C}" dt="2023-09-20T14:48:10.292" v="194" actId="478"/>
-          <ac:cxnSpMkLst>
-            <pc:docMk/>
-            <pc:sldMk cId="3542691548" sldId="257"/>
-            <ac:cxnSpMk id="11" creationId="{4922CFF9-46A9-9B2B-83C8-6A2C5FEB3625}"/>
-          </ac:cxnSpMkLst>
-        </pc:cxnChg>
-        <pc:cxnChg chg="add del mod">
-          <ac:chgData name="Josie Versloot" userId="21650351-ceaf-4c5e-acf0-be8276fefc3c" providerId="ADAL" clId="{23DB148D-3B2F-4928-82C9-E7B12ED6FC7C}" dt="2023-09-20T14:48:10.292" v="194" actId="478"/>
-          <ac:cxnSpMkLst>
-            <pc:docMk/>
-            <pc:sldMk cId="3542691548" sldId="257"/>
-            <ac:cxnSpMk id="12" creationId="{CF440862-FE5A-689B-6164-849BCC2AA161}"/>
-          </ac:cxnSpMkLst>
-        </pc:cxnChg>
-        <pc:cxnChg chg="add del mod">
-          <ac:chgData name="Josie Versloot" userId="21650351-ceaf-4c5e-acf0-be8276fefc3c" providerId="ADAL" clId="{23DB148D-3B2F-4928-82C9-E7B12ED6FC7C}" dt="2023-09-20T14:48:10.292" v="194" actId="478"/>
-          <ac:cxnSpMkLst>
-            <pc:docMk/>
-            <pc:sldMk cId="3542691548" sldId="257"/>
-            <ac:cxnSpMk id="14" creationId="{5FA17B49-E5CC-FCB3-04AE-282B591C1553}"/>
-          </ac:cxnSpMkLst>
-        </pc:cxnChg>
-        <pc:cxnChg chg="add del mod">
-          <ac:chgData name="Josie Versloot" userId="21650351-ceaf-4c5e-acf0-be8276fefc3c" providerId="ADAL" clId="{23DB148D-3B2F-4928-82C9-E7B12ED6FC7C}" dt="2023-09-20T14:48:10.292" v="194" actId="478"/>
-          <ac:cxnSpMkLst>
-            <pc:docMk/>
-            <pc:sldMk cId="3542691548" sldId="257"/>
-            <ac:cxnSpMk id="15" creationId="{128F2BEA-05E8-EE2B-8201-7E541AFB1059}"/>
-          </ac:cxnSpMkLst>
-        </pc:cxnChg>
-        <pc:cxnChg chg="add del mod">
-          <ac:chgData name="Josie Versloot" userId="21650351-ceaf-4c5e-acf0-be8276fefc3c" providerId="ADAL" clId="{23DB148D-3B2F-4928-82C9-E7B12ED6FC7C}" dt="2023-09-20T14:48:10.292" v="194" actId="478"/>
-          <ac:cxnSpMkLst>
-            <pc:docMk/>
-            <pc:sldMk cId="3542691548" sldId="257"/>
-            <ac:cxnSpMk id="16" creationId="{7477EA28-D26C-3B5F-64E9-561090FBF5DC}"/>
-          </ac:cxnSpMkLst>
-        </pc:cxnChg>
-        <pc:cxnChg chg="add del mod">
-          <ac:chgData name="Josie Versloot" userId="21650351-ceaf-4c5e-acf0-be8276fefc3c" providerId="ADAL" clId="{23DB148D-3B2F-4928-82C9-E7B12ED6FC7C}" dt="2023-09-20T14:48:10.292" v="194" actId="478"/>
-          <ac:cxnSpMkLst>
-            <pc:docMk/>
-            <pc:sldMk cId="3542691548" sldId="257"/>
-            <ac:cxnSpMk id="26" creationId="{681AAC21-D4C7-6B02-3D99-B76C7F1D44D7}"/>
-          </ac:cxnSpMkLst>
-        </pc:cxnChg>
-        <pc:cxnChg chg="add del mod">
-          <ac:chgData name="Josie Versloot" userId="21650351-ceaf-4c5e-acf0-be8276fefc3c" providerId="ADAL" clId="{23DB148D-3B2F-4928-82C9-E7B12ED6FC7C}" dt="2023-09-20T14:48:10.292" v="194" actId="478"/>
-          <ac:cxnSpMkLst>
-            <pc:docMk/>
-            <pc:sldMk cId="3542691548" sldId="257"/>
-            <ac:cxnSpMk id="27" creationId="{BB1740A6-8D85-9D7B-D46B-C6D9BEF01095}"/>
-          </ac:cxnSpMkLst>
-        </pc:cxnChg>
-        <pc:cxnChg chg="add del mod">
-          <ac:chgData name="Josie Versloot" userId="21650351-ceaf-4c5e-acf0-be8276fefc3c" providerId="ADAL" clId="{23DB148D-3B2F-4928-82C9-E7B12ED6FC7C}" dt="2023-09-20T14:48:10.292" v="194" actId="478"/>
-          <ac:cxnSpMkLst>
-            <pc:docMk/>
-            <pc:sldMk cId="3542691548" sldId="257"/>
-            <ac:cxnSpMk id="28" creationId="{6FDFD8B1-6F37-C925-B7CD-40301A9D248F}"/>
-          </ac:cxnSpMkLst>
-        </pc:cxnChg>
-        <pc:cxnChg chg="add del mod">
-          <ac:chgData name="Josie Versloot" userId="21650351-ceaf-4c5e-acf0-be8276fefc3c" providerId="ADAL" clId="{23DB148D-3B2F-4928-82C9-E7B12ED6FC7C}" dt="2023-09-20T14:48:10.292" v="194" actId="478"/>
-          <ac:cxnSpMkLst>
-            <pc:docMk/>
-            <pc:sldMk cId="3542691548" sldId="257"/>
-            <ac:cxnSpMk id="29" creationId="{134FBD7E-8D2A-67AF-7537-CEEC078030AE}"/>
-          </ac:cxnSpMkLst>
-        </pc:cxnChg>
-        <pc:cxnChg chg="add del mod">
-          <ac:chgData name="Josie Versloot" userId="21650351-ceaf-4c5e-acf0-be8276fefc3c" providerId="ADAL" clId="{23DB148D-3B2F-4928-82C9-E7B12ED6FC7C}" dt="2023-09-20T14:48:10.292" v="194" actId="478"/>
-          <ac:cxnSpMkLst>
-            <pc:docMk/>
-            <pc:sldMk cId="3542691548" sldId="257"/>
-            <ac:cxnSpMk id="30" creationId="{904046F6-1852-421C-C6A3-A4C240F9384B}"/>
-          </ac:cxnSpMkLst>
-        </pc:cxnChg>
-        <pc:cxnChg chg="add del mod">
-          <ac:chgData name="Josie Versloot" userId="21650351-ceaf-4c5e-acf0-be8276fefc3c" providerId="ADAL" clId="{23DB148D-3B2F-4928-82C9-E7B12ED6FC7C}" dt="2023-09-20T14:48:10.292" v="194" actId="478"/>
-          <ac:cxnSpMkLst>
-            <pc:docMk/>
-            <pc:sldMk cId="3542691548" sldId="257"/>
-            <ac:cxnSpMk id="31" creationId="{B3787BF4-1F47-8363-F03E-41C30F85BEE0}"/>
-          </ac:cxnSpMkLst>
-        </pc:cxnChg>
-        <pc:cxnChg chg="add del mod">
-          <ac:chgData name="Josie Versloot" userId="21650351-ceaf-4c5e-acf0-be8276fefc3c" providerId="ADAL" clId="{23DB148D-3B2F-4928-82C9-E7B12ED6FC7C}" dt="2023-09-20T14:48:10.292" v="194" actId="478"/>
-          <ac:cxnSpMkLst>
-            <pc:docMk/>
-            <pc:sldMk cId="3542691548" sldId="257"/>
-            <ac:cxnSpMk id="32" creationId="{980E26BF-31D6-00AA-20DF-9E1BC66EA1D4}"/>
-          </ac:cxnSpMkLst>
-        </pc:cxnChg>
-        <pc:cxnChg chg="add del mod">
-          <ac:chgData name="Josie Versloot" userId="21650351-ceaf-4c5e-acf0-be8276fefc3c" providerId="ADAL" clId="{23DB148D-3B2F-4928-82C9-E7B12ED6FC7C}" dt="2023-09-20T14:48:10.292" v="194" actId="478"/>
-          <ac:cxnSpMkLst>
-            <pc:docMk/>
-            <pc:sldMk cId="3542691548" sldId="257"/>
-            <ac:cxnSpMk id="33" creationId="{FAC24073-B1CB-274A-CA8F-076A8E193DA0}"/>
-          </ac:cxnSpMkLst>
-        </pc:cxnChg>
-        <pc:cxnChg chg="add del mod">
-          <ac:chgData name="Josie Versloot" userId="21650351-ceaf-4c5e-acf0-be8276fefc3c" providerId="ADAL" clId="{23DB148D-3B2F-4928-82C9-E7B12ED6FC7C}" dt="2023-09-20T14:48:10.292" v="194" actId="478"/>
-          <ac:cxnSpMkLst>
-            <pc:docMk/>
-            <pc:sldMk cId="3542691548" sldId="257"/>
-            <ac:cxnSpMk id="34" creationId="{BA0229A8-7C0E-29E3-E92B-2A29959121E4}"/>
-          </ac:cxnSpMkLst>
-        </pc:cxnChg>
-        <pc:cxnChg chg="add del mod">
-          <ac:chgData name="Josie Versloot" userId="21650351-ceaf-4c5e-acf0-be8276fefc3c" providerId="ADAL" clId="{23DB148D-3B2F-4928-82C9-E7B12ED6FC7C}" dt="2023-09-20T14:48:10.292" v="194" actId="478"/>
-          <ac:cxnSpMkLst>
-            <pc:docMk/>
-            <pc:sldMk cId="3542691548" sldId="257"/>
-            <ac:cxnSpMk id="35" creationId="{4D6903D9-3C56-9030-8737-E54103D07B65}"/>
-          </ac:cxnSpMkLst>
-        </pc:cxnChg>
-        <pc:cxnChg chg="add del mod">
-          <ac:chgData name="Josie Versloot" userId="21650351-ceaf-4c5e-acf0-be8276fefc3c" providerId="ADAL" clId="{23DB148D-3B2F-4928-82C9-E7B12ED6FC7C}" dt="2023-09-20T14:48:10.292" v="194" actId="478"/>
-          <ac:cxnSpMkLst>
-            <pc:docMk/>
-            <pc:sldMk cId="3542691548" sldId="257"/>
-            <ac:cxnSpMk id="36" creationId="{93B350D6-D349-EA96-811D-5DDE85977A60}"/>
-          </ac:cxnSpMkLst>
-        </pc:cxnChg>
-        <pc:cxnChg chg="add del mod">
-          <ac:chgData name="Josie Versloot" userId="21650351-ceaf-4c5e-acf0-be8276fefc3c" providerId="ADAL" clId="{23DB148D-3B2F-4928-82C9-E7B12ED6FC7C}" dt="2023-09-20T14:48:10.292" v="194" actId="478"/>
-          <ac:cxnSpMkLst>
-            <pc:docMk/>
-            <pc:sldMk cId="3542691548" sldId="257"/>
-            <ac:cxnSpMk id="37" creationId="{0002962E-E013-0A76-21EC-92FB24E464F1}"/>
-          </ac:cxnSpMkLst>
-        </pc:cxnChg>
-        <pc:cxnChg chg="add del mod">
-          <ac:chgData name="Josie Versloot" userId="21650351-ceaf-4c5e-acf0-be8276fefc3c" providerId="ADAL" clId="{23DB148D-3B2F-4928-82C9-E7B12ED6FC7C}" dt="2023-09-20T14:49:07.240" v="206" actId="478"/>
-          <ac:cxnSpMkLst>
-            <pc:docMk/>
-            <pc:sldMk cId="3542691548" sldId="257"/>
-            <ac:cxnSpMk id="38" creationId="{665C5F7E-C90D-8B35-ECEA-4BA70E51B911}"/>
-          </ac:cxnSpMkLst>
-        </pc:cxnChg>
-        <pc:cxnChg chg="add del mod">
-          <ac:chgData name="Josie Versloot" userId="21650351-ceaf-4c5e-acf0-be8276fefc3c" providerId="ADAL" clId="{23DB148D-3B2F-4928-82C9-E7B12ED6FC7C}" dt="2023-09-20T14:49:08.065" v="207" actId="478"/>
-          <ac:cxnSpMkLst>
-            <pc:docMk/>
-            <pc:sldMk cId="3542691548" sldId="257"/>
-            <ac:cxnSpMk id="40" creationId="{875E848F-FEC0-05CE-2D4B-9D9ABD4CE39F}"/>
-          </ac:cxnSpMkLst>
-        </pc:cxnChg>
-        <pc:cxnChg chg="add del mod">
-          <ac:chgData name="Josie Versloot" userId="21650351-ceaf-4c5e-acf0-be8276fefc3c" providerId="ADAL" clId="{23DB148D-3B2F-4928-82C9-E7B12ED6FC7C}" dt="2023-09-20T14:48:50.856" v="201" actId="478"/>
-          <ac:cxnSpMkLst>
-            <pc:docMk/>
-            <pc:sldMk cId="3542691548" sldId="257"/>
-            <ac:cxnSpMk id="42" creationId="{948023C0-29CA-0C57-62A1-7CA7BDA03609}"/>
-          </ac:cxnSpMkLst>
-        </pc:cxnChg>
-        <pc:cxnChg chg="add del mod">
-          <ac:chgData name="Josie Versloot" userId="21650351-ceaf-4c5e-acf0-be8276fefc3c" providerId="ADAL" clId="{23DB148D-3B2F-4928-82C9-E7B12ED6FC7C}" dt="2023-09-20T14:48:50.856" v="201" actId="478"/>
-          <ac:cxnSpMkLst>
-            <pc:docMk/>
-            <pc:sldMk cId="3542691548" sldId="257"/>
-            <ac:cxnSpMk id="43" creationId="{3B413509-BA58-E6F1-D427-C2C68E4B7186}"/>
-          </ac:cxnSpMkLst>
-        </pc:cxnChg>
-        <pc:cxnChg chg="add del mod">
-          <ac:chgData name="Josie Versloot" userId="21650351-ceaf-4c5e-acf0-be8276fefc3c" providerId="ADAL" clId="{23DB148D-3B2F-4928-82C9-E7B12ED6FC7C}" dt="2023-09-20T14:48:50.856" v="201" actId="478"/>
-          <ac:cxnSpMkLst>
-            <pc:docMk/>
-            <pc:sldMk cId="3542691548" sldId="257"/>
-            <ac:cxnSpMk id="44" creationId="{5B642D3F-0309-E62F-DA0E-A9A34D808B91}"/>
-          </ac:cxnSpMkLst>
-        </pc:cxnChg>
-        <pc:cxnChg chg="add del mod">
-          <ac:chgData name="Josie Versloot" userId="21650351-ceaf-4c5e-acf0-be8276fefc3c" providerId="ADAL" clId="{23DB148D-3B2F-4928-82C9-E7B12ED6FC7C}" dt="2023-09-20T14:48:50.856" v="201" actId="478"/>
-          <ac:cxnSpMkLst>
-            <pc:docMk/>
-            <pc:sldMk cId="3542691548" sldId="257"/>
-            <ac:cxnSpMk id="46" creationId="{C39D13D0-13E6-7D49-3079-B193A18BB633}"/>
-          </ac:cxnSpMkLst>
-        </pc:cxnChg>
-        <pc:cxnChg chg="add del mod">
-          <ac:chgData name="Josie Versloot" userId="21650351-ceaf-4c5e-acf0-be8276fefc3c" providerId="ADAL" clId="{23DB148D-3B2F-4928-82C9-E7B12ED6FC7C}" dt="2023-09-20T14:48:50.856" v="201" actId="478"/>
-          <ac:cxnSpMkLst>
-            <pc:docMk/>
-            <pc:sldMk cId="3542691548" sldId="257"/>
-            <ac:cxnSpMk id="47" creationId="{898EA07A-CA81-F057-CD3B-2ECDCB5ED17D}"/>
-          </ac:cxnSpMkLst>
-        </pc:cxnChg>
-        <pc:cxnChg chg="add del mod">
-          <ac:chgData name="Josie Versloot" userId="21650351-ceaf-4c5e-acf0-be8276fefc3c" providerId="ADAL" clId="{23DB148D-3B2F-4928-82C9-E7B12ED6FC7C}" dt="2023-09-20T14:48:50.856" v="201" actId="478"/>
-          <ac:cxnSpMkLst>
-            <pc:docMk/>
-            <pc:sldMk cId="3542691548" sldId="257"/>
-            <ac:cxnSpMk id="48" creationId="{4CF7B3C9-2D42-B44A-DD79-4E815EE4F4C1}"/>
-          </ac:cxnSpMkLst>
-        </pc:cxnChg>
-        <pc:cxnChg chg="add del mod">
-          <ac:chgData name="Josie Versloot" userId="21650351-ceaf-4c5e-acf0-be8276fefc3c" providerId="ADAL" clId="{23DB148D-3B2F-4928-82C9-E7B12ED6FC7C}" dt="2023-09-20T14:48:50.856" v="201" actId="478"/>
-          <ac:cxnSpMkLst>
-            <pc:docMk/>
-            <pc:sldMk cId="3542691548" sldId="257"/>
-            <ac:cxnSpMk id="58" creationId="{247CA70C-A4E2-DA1F-5ABE-DCCCDE706B53}"/>
-          </ac:cxnSpMkLst>
-        </pc:cxnChg>
-        <pc:cxnChg chg="add del mod">
-          <ac:chgData name="Josie Versloot" userId="21650351-ceaf-4c5e-acf0-be8276fefc3c" providerId="ADAL" clId="{23DB148D-3B2F-4928-82C9-E7B12ED6FC7C}" dt="2023-09-20T14:48:50.856" v="201" actId="478"/>
-          <ac:cxnSpMkLst>
-            <pc:docMk/>
-            <pc:sldMk cId="3542691548" sldId="257"/>
-            <ac:cxnSpMk id="59" creationId="{A176107B-AE82-F0F0-FFE8-DA074429FC1B}"/>
-          </ac:cxnSpMkLst>
-        </pc:cxnChg>
-        <pc:cxnChg chg="add del mod">
-          <ac:chgData name="Josie Versloot" userId="21650351-ceaf-4c5e-acf0-be8276fefc3c" providerId="ADAL" clId="{23DB148D-3B2F-4928-82C9-E7B12ED6FC7C}" dt="2023-09-20T14:48:50.856" v="201" actId="478"/>
-          <ac:cxnSpMkLst>
-            <pc:docMk/>
-            <pc:sldMk cId="3542691548" sldId="257"/>
-            <ac:cxnSpMk id="60" creationId="{881C8548-58FC-70B7-5AC0-ACC9CADAB9EA}"/>
-          </ac:cxnSpMkLst>
-        </pc:cxnChg>
-        <pc:cxnChg chg="add del mod">
-          <ac:chgData name="Josie Versloot" userId="21650351-ceaf-4c5e-acf0-be8276fefc3c" providerId="ADAL" clId="{23DB148D-3B2F-4928-82C9-E7B12ED6FC7C}" dt="2023-09-20T14:48:52.963" v="202" actId="478"/>
-          <ac:cxnSpMkLst>
-            <pc:docMk/>
-            <pc:sldMk cId="3542691548" sldId="257"/>
-            <ac:cxnSpMk id="61" creationId="{A189BC60-68E4-586B-3C2D-A9AF0E288D6E}"/>
-          </ac:cxnSpMkLst>
-        </pc:cxnChg>
-        <pc:cxnChg chg="add del mod">
-          <ac:chgData name="Josie Versloot" userId="21650351-ceaf-4c5e-acf0-be8276fefc3c" providerId="ADAL" clId="{23DB148D-3B2F-4928-82C9-E7B12ED6FC7C}" dt="2023-09-20T14:48:50.856" v="201" actId="478"/>
-          <ac:cxnSpMkLst>
-            <pc:docMk/>
-            <pc:sldMk cId="3542691548" sldId="257"/>
-            <ac:cxnSpMk id="62" creationId="{A6EF2815-B033-F508-F8DD-809355E7271D}"/>
-          </ac:cxnSpMkLst>
-        </pc:cxnChg>
-        <pc:cxnChg chg="add del mod">
-          <ac:chgData name="Josie Versloot" userId="21650351-ceaf-4c5e-acf0-be8276fefc3c" providerId="ADAL" clId="{23DB148D-3B2F-4928-82C9-E7B12ED6FC7C}" dt="2023-09-20T14:48:50.856" v="201" actId="478"/>
-          <ac:cxnSpMkLst>
-            <pc:docMk/>
-            <pc:sldMk cId="3542691548" sldId="257"/>
-            <ac:cxnSpMk id="63" creationId="{481A8508-E510-AACB-B993-5F03E8CECCC4}"/>
-          </ac:cxnSpMkLst>
-        </pc:cxnChg>
-        <pc:cxnChg chg="add del mod">
-          <ac:chgData name="Josie Versloot" userId="21650351-ceaf-4c5e-acf0-be8276fefc3c" providerId="ADAL" clId="{23DB148D-3B2F-4928-82C9-E7B12ED6FC7C}" dt="2023-09-20T14:48:50.856" v="201" actId="478"/>
-          <ac:cxnSpMkLst>
-            <pc:docMk/>
-            <pc:sldMk cId="3542691548" sldId="257"/>
-            <ac:cxnSpMk id="2048" creationId="{29A30DBB-FE7D-A776-072F-6A7FFF5C9FD5}"/>
-          </ac:cxnSpMkLst>
-        </pc:cxnChg>
-        <pc:cxnChg chg="add del mod">
-          <ac:chgData name="Josie Versloot" userId="21650351-ceaf-4c5e-acf0-be8276fefc3c" providerId="ADAL" clId="{23DB148D-3B2F-4928-82C9-E7B12ED6FC7C}" dt="2023-09-20T14:48:50.856" v="201" actId="478"/>
-          <ac:cxnSpMkLst>
-            <pc:docMk/>
-            <pc:sldMk cId="3542691548" sldId="257"/>
-            <ac:cxnSpMk id="2049" creationId="{67C671A5-E07A-73EE-069C-8D9A9F915A5D}"/>
-          </ac:cxnSpMkLst>
-        </pc:cxnChg>
-        <pc:cxnChg chg="add del mod">
-          <ac:chgData name="Josie Versloot" userId="21650351-ceaf-4c5e-acf0-be8276fefc3c" providerId="ADAL" clId="{23DB148D-3B2F-4928-82C9-E7B12ED6FC7C}" dt="2023-09-20T14:48:50.856" v="201" actId="478"/>
-          <ac:cxnSpMkLst>
-            <pc:docMk/>
-            <pc:sldMk cId="3542691548" sldId="257"/>
-            <ac:cxnSpMk id="2053" creationId="{C6E126F8-83EE-3033-5DDC-80E62FB0CEC1}"/>
-          </ac:cxnSpMkLst>
-        </pc:cxnChg>
-        <pc:cxnChg chg="add del mod">
-          <ac:chgData name="Josie Versloot" userId="21650351-ceaf-4c5e-acf0-be8276fefc3c" providerId="ADAL" clId="{23DB148D-3B2F-4928-82C9-E7B12ED6FC7C}" dt="2023-09-20T14:48:50.856" v="201" actId="478"/>
-          <ac:cxnSpMkLst>
-            <pc:docMk/>
-            <pc:sldMk cId="3542691548" sldId="257"/>
-            <ac:cxnSpMk id="2054" creationId="{646A855A-8FBC-55F9-B948-E2703AE6BA77}"/>
-          </ac:cxnSpMkLst>
-        </pc:cxnChg>
-        <pc:cxnChg chg="add del mod">
-          <ac:chgData name="Josie Versloot" userId="21650351-ceaf-4c5e-acf0-be8276fefc3c" providerId="ADAL" clId="{23DB148D-3B2F-4928-82C9-E7B12ED6FC7C}" dt="2023-09-20T14:48:50.856" v="201" actId="478"/>
-          <ac:cxnSpMkLst>
-            <pc:docMk/>
-            <pc:sldMk cId="3542691548" sldId="257"/>
-            <ac:cxnSpMk id="2055" creationId="{370F3A26-17E1-CF5F-C6A2-9D5FCB51A42B}"/>
-          </ac:cxnSpMkLst>
-        </pc:cxnChg>
-        <pc:cxnChg chg="add del mod">
-          <ac:chgData name="Josie Versloot" userId="21650351-ceaf-4c5e-acf0-be8276fefc3c" providerId="ADAL" clId="{23DB148D-3B2F-4928-82C9-E7B12ED6FC7C}" dt="2023-09-20T14:48:52.963" v="202" actId="478"/>
-          <ac:cxnSpMkLst>
-            <pc:docMk/>
-            <pc:sldMk cId="3542691548" sldId="257"/>
-            <ac:cxnSpMk id="2056" creationId="{99C7B934-5C16-30CE-D512-FCA7E8950F0B}"/>
-          </ac:cxnSpMkLst>
-        </pc:cxnChg>
         <pc:cxnChg chg="add mod">
-          <ac:chgData name="Josie Versloot" userId="21650351-ceaf-4c5e-acf0-be8276fefc3c" providerId="ADAL" clId="{23DB148D-3B2F-4928-82C9-E7B12ED6FC7C}" dt="2023-09-20T15:12:19.123" v="594" actId="14100"/>
-          <ac:cxnSpMkLst>
-            <pc:docMk/>
-            <pc:sldMk cId="3542691548" sldId="257"/>
-            <ac:cxnSpMk id="2057" creationId="{9A6F73A5-01F0-B452-DA86-5248CE9B4942}"/>
-          </ac:cxnSpMkLst>
-        </pc:cxnChg>
-        <pc:cxnChg chg="add mod">
-          <ac:chgData name="Josie Versloot" userId="21650351-ceaf-4c5e-acf0-be8276fefc3c" providerId="ADAL" clId="{23DB148D-3B2F-4928-82C9-E7B12ED6FC7C}" dt="2023-09-20T15:09:41.222" v="531" actId="14100"/>
-          <ac:cxnSpMkLst>
-            <pc:docMk/>
-            <pc:sldMk cId="3542691548" sldId="257"/>
-            <ac:cxnSpMk id="2058" creationId="{2BE4C3CC-EFE4-2B25-9496-7466F142EBEF}"/>
-          </ac:cxnSpMkLst>
-        </pc:cxnChg>
-        <pc:cxnChg chg="add mod">
-          <ac:chgData name="Josie Versloot" userId="21650351-ceaf-4c5e-acf0-be8276fefc3c" providerId="ADAL" clId="{23DB148D-3B2F-4928-82C9-E7B12ED6FC7C}" dt="2023-09-20T15:12:29.945" v="597" actId="14100"/>
-          <ac:cxnSpMkLst>
-            <pc:docMk/>
-            <pc:sldMk cId="3542691548" sldId="257"/>
-            <ac:cxnSpMk id="2059" creationId="{B969F7F2-080F-E3DD-4F8B-768C5412A2B5}"/>
-          </ac:cxnSpMkLst>
-        </pc:cxnChg>
-        <pc:cxnChg chg="add mod">
-          <ac:chgData name="Josie Versloot" userId="21650351-ceaf-4c5e-acf0-be8276fefc3c" providerId="ADAL" clId="{23DB148D-3B2F-4928-82C9-E7B12ED6FC7C}" dt="2023-09-20T15:12:21.950" v="595" actId="14100"/>
-          <ac:cxnSpMkLst>
-            <pc:docMk/>
-            <pc:sldMk cId="3542691548" sldId="257"/>
-            <ac:cxnSpMk id="2061" creationId="{2E2437AE-3A8D-9840-1E73-EC417CFE0F1C}"/>
-          </ac:cxnSpMkLst>
-        </pc:cxnChg>
-        <pc:cxnChg chg="add mod">
-          <ac:chgData name="Josie Versloot" userId="21650351-ceaf-4c5e-acf0-be8276fefc3c" providerId="ADAL" clId="{23DB148D-3B2F-4928-82C9-E7B12ED6FC7C}" dt="2023-09-20T14:59:49.278" v="407" actId="14100"/>
-          <ac:cxnSpMkLst>
-            <pc:docMk/>
-            <pc:sldMk cId="3542691548" sldId="257"/>
-            <ac:cxnSpMk id="2062" creationId="{17B3530B-D036-3144-9595-42ACD7886B8E}"/>
-          </ac:cxnSpMkLst>
-        </pc:cxnChg>
-        <pc:cxnChg chg="add del mod">
-          <ac:chgData name="Josie Versloot" userId="21650351-ceaf-4c5e-acf0-be8276fefc3c" providerId="ADAL" clId="{23DB148D-3B2F-4928-82C9-E7B12ED6FC7C}" dt="2023-09-20T15:09:25.536" v="527" actId="478"/>
-          <ac:cxnSpMkLst>
-            <pc:docMk/>
-            <pc:sldMk cId="3542691548" sldId="257"/>
-            <ac:cxnSpMk id="2063" creationId="{D46ED659-DCD8-7E1E-3BE8-38BAD1972BC3}"/>
-          </ac:cxnSpMkLst>
-        </pc:cxnChg>
-        <pc:cxnChg chg="add mod">
-          <ac:chgData name="Josie Versloot" userId="21650351-ceaf-4c5e-acf0-be8276fefc3c" providerId="ADAL" clId="{23DB148D-3B2F-4928-82C9-E7B12ED6FC7C}" dt="2023-09-20T14:49:01.074" v="204" actId="1076"/>
-          <ac:cxnSpMkLst>
-            <pc:docMk/>
-            <pc:sldMk cId="3542691548" sldId="257"/>
-            <ac:cxnSpMk id="2073" creationId="{0954D992-AD78-16A2-BC13-F6D6117F9761}"/>
-          </ac:cxnSpMkLst>
-        </pc:cxnChg>
-        <pc:cxnChg chg="add mod">
-          <ac:chgData name="Josie Versloot" userId="21650351-ceaf-4c5e-acf0-be8276fefc3c" providerId="ADAL" clId="{23DB148D-3B2F-4928-82C9-E7B12ED6FC7C}" dt="2023-09-20T14:49:01.074" v="204" actId="1076"/>
-          <ac:cxnSpMkLst>
-            <pc:docMk/>
-            <pc:sldMk cId="3542691548" sldId="257"/>
-            <ac:cxnSpMk id="2074" creationId="{56678A9F-A440-157A-9D2D-6DA6CF8AB21A}"/>
-          </ac:cxnSpMkLst>
-        </pc:cxnChg>
-        <pc:cxnChg chg="add mod">
-          <ac:chgData name="Josie Versloot" userId="21650351-ceaf-4c5e-acf0-be8276fefc3c" providerId="ADAL" clId="{23DB148D-3B2F-4928-82C9-E7B12ED6FC7C}" dt="2023-09-20T14:49:01.074" v="204" actId="1076"/>
-          <ac:cxnSpMkLst>
-            <pc:docMk/>
-            <pc:sldMk cId="3542691548" sldId="257"/>
-            <ac:cxnSpMk id="2075" creationId="{E8BAA04B-C567-308A-DAC9-20571C89C508}"/>
-          </ac:cxnSpMkLst>
-        </pc:cxnChg>
-        <pc:cxnChg chg="add mod">
-          <ac:chgData name="Josie Versloot" userId="21650351-ceaf-4c5e-acf0-be8276fefc3c" providerId="ADAL" clId="{23DB148D-3B2F-4928-82C9-E7B12ED6FC7C}" dt="2023-09-20T14:49:01.074" v="204" actId="1076"/>
-          <ac:cxnSpMkLst>
-            <pc:docMk/>
-            <pc:sldMk cId="3542691548" sldId="257"/>
-            <ac:cxnSpMk id="2076" creationId="{ADE8E1B2-A2ED-90EB-9BB6-50DBD6144365}"/>
-          </ac:cxnSpMkLst>
-        </pc:cxnChg>
-        <pc:cxnChg chg="add del mod">
-          <ac:chgData name="Josie Versloot" userId="21650351-ceaf-4c5e-acf0-be8276fefc3c" providerId="ADAL" clId="{23DB148D-3B2F-4928-82C9-E7B12ED6FC7C}" dt="2023-09-20T14:58:44.529" v="393" actId="478"/>
-          <ac:cxnSpMkLst>
-            <pc:docMk/>
-            <pc:sldMk cId="3542691548" sldId="257"/>
-            <ac:cxnSpMk id="2077" creationId="{AD4EB65D-F733-9A08-9043-B353B931988B}"/>
-          </ac:cxnSpMkLst>
-        </pc:cxnChg>
-        <pc:cxnChg chg="add mod">
-          <ac:chgData name="Josie Versloot" userId="21650351-ceaf-4c5e-acf0-be8276fefc3c" providerId="ADAL" clId="{23DB148D-3B2F-4928-82C9-E7B12ED6FC7C}" dt="2023-09-20T14:59:54.671" v="409" actId="14100"/>
-          <ac:cxnSpMkLst>
-            <pc:docMk/>
-            <pc:sldMk cId="3542691548" sldId="257"/>
-            <ac:cxnSpMk id="2078" creationId="{7AB36CD0-9D25-5850-4DC8-CF62E1C4FF9A}"/>
-          </ac:cxnSpMkLst>
-        </pc:cxnChg>
-        <pc:cxnChg chg="add del mod">
-          <ac:chgData name="Josie Versloot" userId="21650351-ceaf-4c5e-acf0-be8276fefc3c" providerId="ADAL" clId="{23DB148D-3B2F-4928-82C9-E7B12ED6FC7C}" dt="2023-09-20T14:58:45.279" v="394" actId="478"/>
-          <ac:cxnSpMkLst>
-            <pc:docMk/>
-            <pc:sldMk cId="3542691548" sldId="257"/>
-            <ac:cxnSpMk id="2079" creationId="{90F2A397-13D8-63E5-8319-7351AEFA9F4C}"/>
-          </ac:cxnSpMkLst>
-        </pc:cxnChg>
-        <pc:cxnChg chg="add del mod">
-          <ac:chgData name="Josie Versloot" userId="21650351-ceaf-4c5e-acf0-be8276fefc3c" providerId="ADAL" clId="{23DB148D-3B2F-4928-82C9-E7B12ED6FC7C}" dt="2023-09-20T14:58:46.160" v="395" actId="478"/>
-          <ac:cxnSpMkLst>
-            <pc:docMk/>
-            <pc:sldMk cId="3542691548" sldId="257"/>
-            <ac:cxnSpMk id="2080" creationId="{4574033C-269E-13FA-D98E-B07AD59A451C}"/>
-          </ac:cxnSpMkLst>
-        </pc:cxnChg>
-        <pc:cxnChg chg="add mod">
-          <ac:chgData name="Josie Versloot" userId="21650351-ceaf-4c5e-acf0-be8276fefc3c" providerId="ADAL" clId="{23DB148D-3B2F-4928-82C9-E7B12ED6FC7C}" dt="2023-09-20T14:49:01.074" v="204" actId="1076"/>
-          <ac:cxnSpMkLst>
-            <pc:docMk/>
-            <pc:sldMk cId="3542691548" sldId="257"/>
-            <ac:cxnSpMk id="2082" creationId="{191AC23A-7229-CD94-6FE1-36507DCEACE9}"/>
-          </ac:cxnSpMkLst>
-        </pc:cxnChg>
-        <pc:cxnChg chg="add mod">
-          <ac:chgData name="Josie Versloot" userId="21650351-ceaf-4c5e-acf0-be8276fefc3c" providerId="ADAL" clId="{23DB148D-3B2F-4928-82C9-E7B12ED6FC7C}" dt="2023-09-20T14:49:01.074" v="204" actId="1076"/>
-          <ac:cxnSpMkLst>
-            <pc:docMk/>
-            <pc:sldMk cId="3542691548" sldId="257"/>
-            <ac:cxnSpMk id="2083" creationId="{5D991CE2-8D47-C23A-54D7-88DAF5EAB42D}"/>
-          </ac:cxnSpMkLst>
-        </pc:cxnChg>
-        <pc:cxnChg chg="add mod">
-          <ac:chgData name="Josie Versloot" userId="21650351-ceaf-4c5e-acf0-be8276fefc3c" providerId="ADAL" clId="{23DB148D-3B2F-4928-82C9-E7B12ED6FC7C}" dt="2023-09-20T14:49:01.074" v="204" actId="1076"/>
-          <ac:cxnSpMkLst>
-            <pc:docMk/>
-            <pc:sldMk cId="3542691548" sldId="257"/>
-            <ac:cxnSpMk id="2084" creationId="{93804002-588B-9198-23C7-034677239237}"/>
-          </ac:cxnSpMkLst>
-        </pc:cxnChg>
-        <pc:cxnChg chg="add mod">
-          <ac:chgData name="Josie Versloot" userId="21650351-ceaf-4c5e-acf0-be8276fefc3c" providerId="ADAL" clId="{23DB148D-3B2F-4928-82C9-E7B12ED6FC7C}" dt="2023-09-20T14:49:01.074" v="204" actId="1076"/>
-          <ac:cxnSpMkLst>
-            <pc:docMk/>
-            <pc:sldMk cId="3542691548" sldId="257"/>
-            <ac:cxnSpMk id="2085" creationId="{C12279F0-7E44-9483-21F2-1BD7AC68C603}"/>
-          </ac:cxnSpMkLst>
-        </pc:cxnChg>
-        <pc:cxnChg chg="add mod">
-          <ac:chgData name="Josie Versloot" userId="21650351-ceaf-4c5e-acf0-be8276fefc3c" providerId="ADAL" clId="{23DB148D-3B2F-4928-82C9-E7B12ED6FC7C}" dt="2023-09-20T14:57:22.921" v="283" actId="1076"/>
-          <ac:cxnSpMkLst>
-            <pc:docMk/>
-            <pc:sldMk cId="3542691548" sldId="257"/>
-            <ac:cxnSpMk id="2086" creationId="{63EB6A65-834E-716F-BD02-CC1513919F43}"/>
-          </ac:cxnSpMkLst>
-        </pc:cxnChg>
-        <pc:cxnChg chg="add mod">
-          <ac:chgData name="Josie Versloot" userId="21650351-ceaf-4c5e-acf0-be8276fefc3c" providerId="ADAL" clId="{23DB148D-3B2F-4928-82C9-E7B12ED6FC7C}" dt="2023-09-20T14:57:22.921" v="283" actId="1076"/>
-          <ac:cxnSpMkLst>
-            <pc:docMk/>
-            <pc:sldMk cId="3542691548" sldId="257"/>
-            <ac:cxnSpMk id="2088" creationId="{D0E89F0E-F64C-2608-BAC7-23FA2ACA0578}"/>
-          </ac:cxnSpMkLst>
-        </pc:cxnChg>
-        <pc:cxnChg chg="add del mod">
-          <ac:chgData name="Josie Versloot" userId="21650351-ceaf-4c5e-acf0-be8276fefc3c" providerId="ADAL" clId="{23DB148D-3B2F-4928-82C9-E7B12ED6FC7C}" dt="2023-09-20T14:52:12.455" v="248" actId="478"/>
-          <ac:cxnSpMkLst>
-            <pc:docMk/>
-            <pc:sldMk cId="3542691548" sldId="257"/>
-            <ac:cxnSpMk id="2089" creationId="{80BB85E8-FE68-7C8C-B55A-63E4DBAC06B3}"/>
-          </ac:cxnSpMkLst>
-        </pc:cxnChg>
-        <pc:cxnChg chg="add mod">
-          <ac:chgData name="Josie Versloot" userId="21650351-ceaf-4c5e-acf0-be8276fefc3c" providerId="ADAL" clId="{23DB148D-3B2F-4928-82C9-E7B12ED6FC7C}" dt="2023-09-20T14:57:22.921" v="283" actId="1076"/>
-          <ac:cxnSpMkLst>
-            <pc:docMk/>
-            <pc:sldMk cId="3542691548" sldId="257"/>
-            <ac:cxnSpMk id="2090" creationId="{5C050ACB-B38F-AECF-5C39-76128FB28CAD}"/>
-          </ac:cxnSpMkLst>
-        </pc:cxnChg>
-        <pc:cxnChg chg="add mod">
-          <ac:chgData name="Josie Versloot" userId="21650351-ceaf-4c5e-acf0-be8276fefc3c" providerId="ADAL" clId="{23DB148D-3B2F-4928-82C9-E7B12ED6FC7C}" dt="2023-09-20T14:57:22.921" v="283" actId="1076"/>
-          <ac:cxnSpMkLst>
-            <pc:docMk/>
-            <pc:sldMk cId="3542691548" sldId="257"/>
-            <ac:cxnSpMk id="2091" creationId="{8C92E253-4863-AA1D-BD06-A54BB81223EC}"/>
-          </ac:cxnSpMkLst>
-        </pc:cxnChg>
-        <pc:cxnChg chg="add mod">
-          <ac:chgData name="Josie Versloot" userId="21650351-ceaf-4c5e-acf0-be8276fefc3c" providerId="ADAL" clId="{23DB148D-3B2F-4928-82C9-E7B12ED6FC7C}" dt="2023-09-20T14:57:22.921" v="283" actId="1076"/>
-          <ac:cxnSpMkLst>
-            <pc:docMk/>
-            <pc:sldMk cId="3542691548" sldId="257"/>
-            <ac:cxnSpMk id="2092" creationId="{5F4FF822-6B1E-C4BF-8FD8-CEA85303C15B}"/>
-          </ac:cxnSpMkLst>
-        </pc:cxnChg>
-        <pc:cxnChg chg="add mod">
-          <ac:chgData name="Josie Versloot" userId="21650351-ceaf-4c5e-acf0-be8276fefc3c" providerId="ADAL" clId="{23DB148D-3B2F-4928-82C9-E7B12ED6FC7C}" dt="2023-09-20T14:57:22.921" v="283" actId="1076"/>
-          <ac:cxnSpMkLst>
-            <pc:docMk/>
-            <pc:sldMk cId="3542691548" sldId="257"/>
-            <ac:cxnSpMk id="2100" creationId="{9F94A6D8-3B9F-E3FA-AA41-4377FEDFFB0D}"/>
-          </ac:cxnSpMkLst>
-        </pc:cxnChg>
-        <pc:cxnChg chg="add mod">
-          <ac:chgData name="Josie Versloot" userId="21650351-ceaf-4c5e-acf0-be8276fefc3c" providerId="ADAL" clId="{23DB148D-3B2F-4928-82C9-E7B12ED6FC7C}" dt="2023-09-20T14:57:22.921" v="283" actId="1076"/>
-          <ac:cxnSpMkLst>
-            <pc:docMk/>
-            <pc:sldMk cId="3542691548" sldId="257"/>
-            <ac:cxnSpMk id="2103" creationId="{633810D9-FB72-EFC6-19EA-BDBE801AF743}"/>
-          </ac:cxnSpMkLst>
-        </pc:cxnChg>
-        <pc:cxnChg chg="add mod">
-          <ac:chgData name="Josie Versloot" userId="21650351-ceaf-4c5e-acf0-be8276fefc3c" providerId="ADAL" clId="{23DB148D-3B2F-4928-82C9-E7B12ED6FC7C}" dt="2023-09-20T14:57:22.921" v="283" actId="1076"/>
-          <ac:cxnSpMkLst>
-            <pc:docMk/>
-            <pc:sldMk cId="3542691548" sldId="257"/>
-            <ac:cxnSpMk id="2106" creationId="{6492A485-7BEA-D195-8B3A-71AA8FC7DD2F}"/>
-          </ac:cxnSpMkLst>
-        </pc:cxnChg>
-        <pc:cxnChg chg="add mod">
-          <ac:chgData name="Josie Versloot" userId="21650351-ceaf-4c5e-acf0-be8276fefc3c" providerId="ADAL" clId="{23DB148D-3B2F-4928-82C9-E7B12ED6FC7C}" dt="2023-09-20T14:57:22.921" v="283" actId="1076"/>
-          <ac:cxnSpMkLst>
-            <pc:docMk/>
-            <pc:sldMk cId="3542691548" sldId="257"/>
-            <ac:cxnSpMk id="2107" creationId="{0616D6DE-9087-DBFE-553B-CC22784F3D8C}"/>
-          </ac:cxnSpMkLst>
-        </pc:cxnChg>
-        <pc:cxnChg chg="add mod">
-          <ac:chgData name="Josie Versloot" userId="21650351-ceaf-4c5e-acf0-be8276fefc3c" providerId="ADAL" clId="{23DB148D-3B2F-4928-82C9-E7B12ED6FC7C}" dt="2023-09-20T15:11:44.601" v="572" actId="14100"/>
-          <ac:cxnSpMkLst>
-            <pc:docMk/>
-            <pc:sldMk cId="3542691548" sldId="257"/>
-            <ac:cxnSpMk id="2118" creationId="{4A4347A8-5861-09DA-A485-D71C985597EC}"/>
-          </ac:cxnSpMkLst>
-        </pc:cxnChg>
-        <pc:cxnChg chg="add mod">
-          <ac:chgData name="Josie Versloot" userId="21650351-ceaf-4c5e-acf0-be8276fefc3c" providerId="ADAL" clId="{23DB148D-3B2F-4928-82C9-E7B12ED6FC7C}" dt="2023-09-20T15:12:15.818" v="593" actId="1038"/>
-          <ac:cxnSpMkLst>
-            <pc:docMk/>
-            <pc:sldMk cId="3542691548" sldId="257"/>
-            <ac:cxnSpMk id="2126" creationId="{4A43795A-19E6-EC40-7131-D9DE3406FB74}"/>
-          </ac:cxnSpMkLst>
-        </pc:cxnChg>
-        <pc:cxnChg chg="add del mod">
-          <ac:chgData name="Josie Versloot" userId="21650351-ceaf-4c5e-acf0-be8276fefc3c" providerId="ADAL" clId="{23DB148D-3B2F-4928-82C9-E7B12ED6FC7C}" dt="2023-09-20T15:09:28.856" v="528" actId="478"/>
-          <ac:cxnSpMkLst>
-            <pc:docMk/>
-            <pc:sldMk cId="3542691548" sldId="257"/>
-            <ac:cxnSpMk id="2131" creationId="{0C08457E-75F5-6EC9-CB8C-DAFC02ED2756}"/>
-          </ac:cxnSpMkLst>
-        </pc:cxnChg>
-        <pc:cxnChg chg="add mod">
-          <ac:chgData name="Josie Versloot" userId="21650351-ceaf-4c5e-acf0-be8276fefc3c" providerId="ADAL" clId="{23DB148D-3B2F-4928-82C9-E7B12ED6FC7C}" dt="2023-09-20T15:09:42.902" v="532" actId="14100"/>
-          <ac:cxnSpMkLst>
-            <pc:docMk/>
-            <pc:sldMk cId="3542691548" sldId="257"/>
+          <ac:chgData name="Stephen Moyer" userId="fde0619e-9f48-44fe-9adc-708c18563dcc" providerId="ADAL" clId="{998EA659-91A7-412B-94B9-119A637F5B9E}" dt="2023-12-14T17:13:33.820" v="21" actId="14100"/>
+          <ac:cxnSpMkLst>
+            <pc:docMk/>
+            <pc:sldMk cId="1725122554" sldId="259"/>
+            <ac:cxnSpMk id="28" creationId="{387344E4-2256-B845-419C-ACEBD2784E5C}"/>
+          </ac:cxnSpMkLst>
+        </pc:cxnChg>
+        <pc:cxnChg chg="mod">
+          <ac:chgData name="Stephen Moyer" userId="fde0619e-9f48-44fe-9adc-708c18563dcc" providerId="ADAL" clId="{998EA659-91A7-412B-94B9-119A637F5B9E}" dt="2023-12-14T17:12:38.859" v="10" actId="14100"/>
+          <ac:cxnSpMkLst>
+            <pc:docMk/>
+            <pc:sldMk cId="1725122554" sldId="259"/>
             <ac:cxnSpMk id="2146" creationId="{7F005ACC-CCCE-A45C-53B5-CB39BE14A73F}"/>
           </ac:cxnSpMkLst>
         </pc:cxnChg>
-        <pc:cxnChg chg="add mod">
-          <ac:chgData name="Josie Versloot" userId="21650351-ceaf-4c5e-acf0-be8276fefc3c" providerId="ADAL" clId="{23DB148D-3B2F-4928-82C9-E7B12ED6FC7C}" dt="2023-09-20T15:09:35.567" v="530" actId="14100"/>
-          <ac:cxnSpMkLst>
-            <pc:docMk/>
-            <pc:sldMk cId="3542691548" sldId="257"/>
+        <pc:cxnChg chg="mod">
+          <ac:chgData name="Stephen Moyer" userId="fde0619e-9f48-44fe-9adc-708c18563dcc" providerId="ADAL" clId="{998EA659-91A7-412B-94B9-119A637F5B9E}" dt="2023-12-14T17:13:19.200" v="17" actId="14100"/>
+          <ac:cxnSpMkLst>
+            <pc:docMk/>
+            <pc:sldMk cId="1725122554" sldId="259"/>
             <ac:cxnSpMk id="2149" creationId="{1277DF2B-A807-74D2-2477-87A9DB5CBA21}"/>
           </ac:cxnSpMkLst>
         </pc:cxnChg>
-        <pc:cxnChg chg="add mod">
-          <ac:chgData name="Josie Versloot" userId="21650351-ceaf-4c5e-acf0-be8276fefc3c" providerId="ADAL" clId="{23DB148D-3B2F-4928-82C9-E7B12ED6FC7C}" dt="2023-09-20T15:09:56.034" v="538" actId="14100"/>
-          <ac:cxnSpMkLst>
-            <pc:docMk/>
-            <pc:sldMk cId="3542691548" sldId="257"/>
+        <pc:cxnChg chg="mod">
+          <ac:chgData name="Stephen Moyer" userId="fde0619e-9f48-44fe-9adc-708c18563dcc" providerId="ADAL" clId="{998EA659-91A7-412B-94B9-119A637F5B9E}" dt="2023-12-14T17:13:27.447" v="18" actId="14100"/>
+          <ac:cxnSpMkLst>
+            <pc:docMk/>
+            <pc:sldMk cId="1725122554" sldId="259"/>
             <ac:cxnSpMk id="2157" creationId="{93305E49-C70C-3851-111B-5B2E47AE8CE0}"/>
           </ac:cxnSpMkLst>
         </pc:cxnChg>
-        <pc:cxnChg chg="add mod">
-          <ac:chgData name="Josie Versloot" userId="21650351-ceaf-4c5e-acf0-be8276fefc3c" providerId="ADAL" clId="{23DB148D-3B2F-4928-82C9-E7B12ED6FC7C}" dt="2023-09-20T15:12:03.056" v="576" actId="1037"/>
-          <ac:cxnSpMkLst>
-            <pc:docMk/>
-            <pc:sldMk cId="3542691548" sldId="257"/>
+        <pc:cxnChg chg="mod">
+          <ac:chgData name="Stephen Moyer" userId="fde0619e-9f48-44fe-9adc-708c18563dcc" providerId="ADAL" clId="{998EA659-91A7-412B-94B9-119A637F5B9E}" dt="2023-12-14T17:12:49.331" v="13" actId="14100"/>
+          <ac:cxnSpMkLst>
+            <pc:docMk/>
+            <pc:sldMk cId="1725122554" sldId="259"/>
             <ac:cxnSpMk id="2161" creationId="{EC4D4C9F-EB2E-BEB0-659F-8E2BF4967CA9}"/>
           </ac:cxnSpMkLst>
         </pc:cxnChg>
-        <pc:cxnChg chg="add mod">
-          <ac:chgData name="Josie Versloot" userId="21650351-ceaf-4c5e-acf0-be8276fefc3c" providerId="ADAL" clId="{23DB148D-3B2F-4928-82C9-E7B12ED6FC7C}" dt="2023-09-20T15:12:54.651" v="604" actId="14100"/>
-          <ac:cxnSpMkLst>
-            <pc:docMk/>
-            <pc:sldMk cId="3542691548" sldId="257"/>
-            <ac:cxnSpMk id="2178" creationId="{95517525-52EE-121A-0E10-A961188B6FDD}"/>
-          </ac:cxnSpMkLst>
-        </pc:cxnChg>
-      </pc:sldChg>
-      <pc:sldChg chg="addSp delSp modSp new mod">
-        <pc:chgData name="Josie Versloot" userId="21650351-ceaf-4c5e-acf0-be8276fefc3c" providerId="ADAL" clId="{23DB148D-3B2F-4928-82C9-E7B12ED6FC7C}" dt="2023-09-19T21:19:33.110" v="27" actId="1076"/>
-        <pc:sldMkLst>
-          <pc:docMk/>
-          <pc:sldMk cId="3367889752" sldId="258"/>
-        </pc:sldMkLst>
-        <pc:spChg chg="del">
-          <ac:chgData name="Josie Versloot" userId="21650351-ceaf-4c5e-acf0-be8276fefc3c" providerId="ADAL" clId="{23DB148D-3B2F-4928-82C9-E7B12ED6FC7C}" dt="2023-09-19T21:16:50.817" v="15" actId="478"/>
-          <ac:spMkLst>
-            <pc:docMk/>
-            <pc:sldMk cId="3367889752" sldId="258"/>
-            <ac:spMk id="2" creationId="{BB7E249C-F215-20B2-17A3-268E7027E384}"/>
-          </ac:spMkLst>
-        </pc:spChg>
-        <pc:spChg chg="del">
-          <ac:chgData name="Josie Versloot" userId="21650351-ceaf-4c5e-acf0-be8276fefc3c" providerId="ADAL" clId="{23DB148D-3B2F-4928-82C9-E7B12ED6FC7C}" dt="2023-09-19T21:16:51.961" v="16" actId="478"/>
-          <ac:spMkLst>
-            <pc:docMk/>
-            <pc:sldMk cId="3367889752" sldId="258"/>
-            <ac:spMk id="3" creationId="{666FA618-77E0-9D0A-741C-0DB9E6801955}"/>
-          </ac:spMkLst>
-        </pc:spChg>
-        <pc:picChg chg="add mod">
-          <ac:chgData name="Josie Versloot" userId="21650351-ceaf-4c5e-acf0-be8276fefc3c" providerId="ADAL" clId="{23DB148D-3B2F-4928-82C9-E7B12ED6FC7C}" dt="2023-09-19T21:19:33.110" v="27" actId="1076"/>
-          <ac:picMkLst>
-            <pc:docMk/>
-            <pc:sldMk cId="3367889752" sldId="258"/>
-            <ac:picMk id="4" creationId="{AB612575-133B-8682-EDC8-76FF9BF71B5F}"/>
-          </ac:picMkLst>
-        </pc:picChg>
       </pc:sldChg>
     </pc:docChg>
   </pc:docChgLst>
@@ -1840,80 +658,1350 @@
     </pc:docChg>
   </pc:docChgLst>
   <pc:docChgLst>
-    <pc:chgData name="Stephen Moyer" userId="fde0619e-9f48-44fe-9adc-708c18563dcc" providerId="ADAL" clId="{998EA659-91A7-412B-94B9-119A637F5B9E}"/>
-    <pc:docChg chg="modSld">
-      <pc:chgData name="Stephen Moyer" userId="fde0619e-9f48-44fe-9adc-708c18563dcc" providerId="ADAL" clId="{998EA659-91A7-412B-94B9-119A637F5B9E}" dt="2023-12-14T17:13:54.659" v="24" actId="1076"/>
+    <pc:chgData name="Josie Versloot" userId="21650351-ceaf-4c5e-acf0-be8276fefc3c" providerId="ADAL" clId="{23DB148D-3B2F-4928-82C9-E7B12ED6FC7C}"/>
+    <pc:docChg chg="undo redo custSel addSld modSld">
+      <pc:chgData name="Josie Versloot" userId="21650351-ceaf-4c5e-acf0-be8276fefc3c" providerId="ADAL" clId="{23DB148D-3B2F-4928-82C9-E7B12ED6FC7C}" dt="2023-09-22T13:30:58.670" v="821" actId="1036"/>
       <pc:docMkLst>
         <pc:docMk/>
       </pc:docMkLst>
-      <pc:sldChg chg="addSp modSp mod">
-        <pc:chgData name="Stephen Moyer" userId="fde0619e-9f48-44fe-9adc-708c18563dcc" providerId="ADAL" clId="{998EA659-91A7-412B-94B9-119A637F5B9E}" dt="2023-12-14T17:13:54.659" v="24" actId="1076"/>
+      <pc:sldChg chg="addSp delSp modSp mod">
+        <pc:chgData name="Josie Versloot" userId="21650351-ceaf-4c5e-acf0-be8276fefc3c" providerId="ADAL" clId="{23DB148D-3B2F-4928-82C9-E7B12ED6FC7C}" dt="2023-09-22T13:30:58.670" v="821" actId="1036"/>
         <pc:sldMkLst>
           <pc:docMk/>
-          <pc:sldMk cId="1725122554" sldId="259"/>
+          <pc:sldMk cId="2922292050" sldId="256"/>
         </pc:sldMkLst>
-        <pc:spChg chg="mod">
-          <ac:chgData name="Stephen Moyer" userId="fde0619e-9f48-44fe-9adc-708c18563dcc" providerId="ADAL" clId="{998EA659-91A7-412B-94B9-119A637F5B9E}" dt="2023-12-14T17:12:04.659" v="9" actId="207"/>
+        <pc:spChg chg="add mod">
+          <ac:chgData name="Josie Versloot" userId="21650351-ceaf-4c5e-acf0-be8276fefc3c" providerId="ADAL" clId="{23DB148D-3B2F-4928-82C9-E7B12ED6FC7C}" dt="2023-09-22T13:22:54.042" v="696" actId="1036"/>
           <ac:spMkLst>
             <pc:docMk/>
-            <pc:sldMk cId="1725122554" sldId="259"/>
+            <pc:sldMk cId="2922292050" sldId="256"/>
+            <ac:spMk id="21" creationId="{453BBD75-CA27-D040-AB53-0E5485FE3510}"/>
+          </ac:spMkLst>
+        </pc:spChg>
+        <pc:spChg chg="add mod">
+          <ac:chgData name="Josie Versloot" userId="21650351-ceaf-4c5e-acf0-be8276fefc3c" providerId="ADAL" clId="{23DB148D-3B2F-4928-82C9-E7B12ED6FC7C}" dt="2023-09-22T13:24:43.556" v="719" actId="207"/>
+          <ac:spMkLst>
+            <pc:docMk/>
+            <pc:sldMk cId="2922292050" sldId="256"/>
+            <ac:spMk id="22" creationId="{B57E2696-DCF1-54D6-7767-9FE6BEA097BF}"/>
+          </ac:spMkLst>
+        </pc:spChg>
+        <pc:spChg chg="add mod">
+          <ac:chgData name="Josie Versloot" userId="21650351-ceaf-4c5e-acf0-be8276fefc3c" providerId="ADAL" clId="{23DB148D-3B2F-4928-82C9-E7B12ED6FC7C}" dt="2023-09-22T13:27:47.249" v="757" actId="1076"/>
+          <ac:spMkLst>
+            <pc:docMk/>
+            <pc:sldMk cId="2922292050" sldId="256"/>
+            <ac:spMk id="54" creationId="{C83D70B9-5BE4-7E49-33FA-B74892EC33FA}"/>
+          </ac:spMkLst>
+        </pc:spChg>
+        <pc:spChg chg="add mod">
+          <ac:chgData name="Josie Versloot" userId="21650351-ceaf-4c5e-acf0-be8276fefc3c" providerId="ADAL" clId="{23DB148D-3B2F-4928-82C9-E7B12ED6FC7C}" dt="2023-09-22T13:28:20.930" v="763" actId="1076"/>
+          <ac:spMkLst>
+            <pc:docMk/>
+            <pc:sldMk cId="2922292050" sldId="256"/>
+            <ac:spMk id="61" creationId="{B1C9EFF5-BB50-E3F9-9668-91DAD3D41D62}"/>
+          </ac:spMkLst>
+        </pc:spChg>
+        <pc:spChg chg="add mod">
+          <ac:chgData name="Josie Versloot" userId="21650351-ceaf-4c5e-acf0-be8276fefc3c" providerId="ADAL" clId="{23DB148D-3B2F-4928-82C9-E7B12ED6FC7C}" dt="2023-09-22T13:30:58.670" v="821" actId="1036"/>
+          <ac:spMkLst>
+            <pc:docMk/>
+            <pc:sldMk cId="2922292050" sldId="256"/>
+            <ac:spMk id="62" creationId="{7BDBC84D-180D-49DF-7084-F9F8209948C9}"/>
+          </ac:spMkLst>
+        </pc:spChg>
+        <pc:spChg chg="add mod">
+          <ac:chgData name="Josie Versloot" userId="21650351-ceaf-4c5e-acf0-be8276fefc3c" providerId="ADAL" clId="{23DB148D-3B2F-4928-82C9-E7B12ED6FC7C}" dt="2023-09-22T13:30:53.163" v="818" actId="1035"/>
+          <ac:spMkLst>
+            <pc:docMk/>
+            <pc:sldMk cId="2922292050" sldId="256"/>
+            <ac:spMk id="1024" creationId="{1467EA08-F534-C889-8D1A-6D38ADE2E241}"/>
+          </ac:spMkLst>
+        </pc:spChg>
+        <pc:spChg chg="add mod">
+          <ac:chgData name="Josie Versloot" userId="21650351-ceaf-4c5e-acf0-be8276fefc3c" providerId="ADAL" clId="{23DB148D-3B2F-4928-82C9-E7B12ED6FC7C}" dt="2023-09-20T14:46:19.963" v="155" actId="208"/>
+          <ac:spMkLst>
+            <pc:docMk/>
+            <pc:sldMk cId="2922292050" sldId="256"/>
+            <ac:spMk id="1048" creationId="{B1FE8235-C8AD-945F-95DB-FFD3265E13D1}"/>
+          </ac:spMkLst>
+        </pc:spChg>
+        <pc:picChg chg="add mod">
+          <ac:chgData name="Josie Versloot" userId="21650351-ceaf-4c5e-acf0-be8276fefc3c" providerId="ADAL" clId="{23DB148D-3B2F-4928-82C9-E7B12ED6FC7C}" dt="2023-09-22T13:22:50.268" v="695" actId="1035"/>
+          <ac:picMkLst>
+            <pc:docMk/>
+            <pc:sldMk cId="2922292050" sldId="256"/>
+            <ac:picMk id="3" creationId="{6A74AC54-97B7-AEEC-982B-F2921D2DAEDD}"/>
+          </ac:picMkLst>
+        </pc:picChg>
+        <pc:picChg chg="add del mod">
+          <ac:chgData name="Josie Versloot" userId="21650351-ceaf-4c5e-acf0-be8276fefc3c" providerId="ADAL" clId="{23DB148D-3B2F-4928-82C9-E7B12ED6FC7C}" dt="2023-09-22T13:19:47.232" v="623" actId="478"/>
+          <ac:picMkLst>
+            <pc:docMk/>
+            <pc:sldMk cId="2922292050" sldId="256"/>
+            <ac:picMk id="5" creationId="{10059444-DD1A-EAB0-82B2-09D49631B5CF}"/>
+          </ac:picMkLst>
+        </pc:picChg>
+        <pc:picChg chg="mod">
+          <ac:chgData name="Josie Versloot" userId="21650351-ceaf-4c5e-acf0-be8276fefc3c" providerId="ADAL" clId="{23DB148D-3B2F-4928-82C9-E7B12ED6FC7C}" dt="2023-09-22T13:17:50.247" v="615" actId="14100"/>
+          <ac:picMkLst>
+            <pc:docMk/>
+            <pc:sldMk cId="2922292050" sldId="256"/>
+            <ac:picMk id="1028" creationId="{A4D3099E-C7DC-F8BE-C5F3-7B2CA7808018}"/>
+          </ac:picMkLst>
+        </pc:picChg>
+        <pc:cxnChg chg="add del mod">
+          <ac:chgData name="Josie Versloot" userId="21650351-ceaf-4c5e-acf0-be8276fefc3c" providerId="ADAL" clId="{23DB148D-3B2F-4928-82C9-E7B12ED6FC7C}" dt="2023-09-22T13:20:20.357" v="627"/>
+          <ac:cxnSpMkLst>
+            <pc:docMk/>
+            <pc:sldMk cId="2922292050" sldId="256"/>
+            <ac:cxnSpMk id="19" creationId="{F59B0472-CD7C-D733-6160-C63F739DBF3D}"/>
+          </ac:cxnSpMkLst>
+        </pc:cxnChg>
+        <pc:cxnChg chg="add del mod">
+          <ac:chgData name="Josie Versloot" userId="21650351-ceaf-4c5e-acf0-be8276fefc3c" providerId="ADAL" clId="{23DB148D-3B2F-4928-82C9-E7B12ED6FC7C}" dt="2023-09-22T13:20:20.357" v="627"/>
+          <ac:cxnSpMkLst>
+            <pc:docMk/>
+            <pc:sldMk cId="2922292050" sldId="256"/>
+            <ac:cxnSpMk id="20" creationId="{99D99F5E-A670-EE59-6A78-966A26122674}"/>
+          </ac:cxnSpMkLst>
+        </pc:cxnChg>
+        <pc:cxnChg chg="add mod">
+          <ac:chgData name="Josie Versloot" userId="21650351-ceaf-4c5e-acf0-be8276fefc3c" providerId="ADAL" clId="{23DB148D-3B2F-4928-82C9-E7B12ED6FC7C}" dt="2023-09-22T13:22:54.042" v="696" actId="1036"/>
+          <ac:cxnSpMkLst>
+            <pc:docMk/>
+            <pc:sldMk cId="2922292050" sldId="256"/>
+            <ac:cxnSpMk id="23" creationId="{5DF6E68A-EDDF-F669-A75E-D86E12269403}"/>
+          </ac:cxnSpMkLst>
+        </pc:cxnChg>
+        <pc:cxnChg chg="add mod">
+          <ac:chgData name="Josie Versloot" userId="21650351-ceaf-4c5e-acf0-be8276fefc3c" providerId="ADAL" clId="{23DB148D-3B2F-4928-82C9-E7B12ED6FC7C}" dt="2023-09-22T13:22:54.042" v="696" actId="1036"/>
+          <ac:cxnSpMkLst>
+            <pc:docMk/>
+            <pc:sldMk cId="2922292050" sldId="256"/>
+            <ac:cxnSpMk id="24" creationId="{714D9DDF-4416-4646-3533-E3325B769F25}"/>
+          </ac:cxnSpMkLst>
+        </pc:cxnChg>
+        <pc:cxnChg chg="add mod">
+          <ac:chgData name="Josie Versloot" userId="21650351-ceaf-4c5e-acf0-be8276fefc3c" providerId="ADAL" clId="{23DB148D-3B2F-4928-82C9-E7B12ED6FC7C}" dt="2023-09-22T13:22:54.042" v="696" actId="1036"/>
+          <ac:cxnSpMkLst>
+            <pc:docMk/>
+            <pc:sldMk cId="2922292050" sldId="256"/>
+            <ac:cxnSpMk id="25" creationId="{C11744F2-872D-5744-583A-CD6CEE1055F1}"/>
+          </ac:cxnSpMkLst>
+        </pc:cxnChg>
+        <pc:cxnChg chg="add mod">
+          <ac:chgData name="Josie Versloot" userId="21650351-ceaf-4c5e-acf0-be8276fefc3c" providerId="ADAL" clId="{23DB148D-3B2F-4928-82C9-E7B12ED6FC7C}" dt="2023-09-22T13:22:57.958" v="697" actId="14100"/>
+          <ac:cxnSpMkLst>
+            <pc:docMk/>
+            <pc:sldMk cId="2922292050" sldId="256"/>
+            <ac:cxnSpMk id="26" creationId="{15B92820-D23C-AA2F-BBB9-671AD21B55B9}"/>
+          </ac:cxnSpMkLst>
+        </pc:cxnChg>
+        <pc:cxnChg chg="add del mod">
+          <ac:chgData name="Josie Versloot" userId="21650351-ceaf-4c5e-acf0-be8276fefc3c" providerId="ADAL" clId="{23DB148D-3B2F-4928-82C9-E7B12ED6FC7C}" dt="2023-09-22T13:23:46.132" v="704" actId="478"/>
+          <ac:cxnSpMkLst>
+            <pc:docMk/>
+            <pc:sldMk cId="2922292050" sldId="256"/>
+            <ac:cxnSpMk id="28" creationId="{36F5607A-E025-036B-7825-1E6B4972C230}"/>
+          </ac:cxnSpMkLst>
+        </pc:cxnChg>
+        <pc:cxnChg chg="mod ord">
+          <ac:chgData name="Josie Versloot" userId="21650351-ceaf-4c5e-acf0-be8276fefc3c" providerId="ADAL" clId="{23DB148D-3B2F-4928-82C9-E7B12ED6FC7C}" dt="2023-09-20T14:48:34.644" v="199" actId="554"/>
+          <ac:cxnSpMkLst>
+            <pc:docMk/>
+            <pc:sldMk cId="2922292050" sldId="256"/>
+            <ac:cxnSpMk id="30" creationId="{4D8A65B0-FD29-1764-4775-0C869BF5C4E4}"/>
+          </ac:cxnSpMkLst>
+        </pc:cxnChg>
+        <pc:cxnChg chg="add mod ord">
+          <ac:chgData name="Josie Versloot" userId="21650351-ceaf-4c5e-acf0-be8276fefc3c" providerId="ADAL" clId="{23DB148D-3B2F-4928-82C9-E7B12ED6FC7C}" dt="2023-09-22T13:24:33.053" v="718" actId="208"/>
+          <ac:cxnSpMkLst>
+            <pc:docMk/>
+            <pc:sldMk cId="2922292050" sldId="256"/>
+            <ac:cxnSpMk id="31" creationId="{7D435197-ADDB-584B-86EC-E3800DF70A1F}"/>
+          </ac:cxnSpMkLst>
+        </pc:cxnChg>
+        <pc:cxnChg chg="mod">
+          <ac:chgData name="Josie Versloot" userId="21650351-ceaf-4c5e-acf0-be8276fefc3c" providerId="ADAL" clId="{23DB148D-3B2F-4928-82C9-E7B12ED6FC7C}" dt="2023-09-20T14:45:15.017" v="139" actId="692"/>
+          <ac:cxnSpMkLst>
+            <pc:docMk/>
+            <pc:sldMk cId="2922292050" sldId="256"/>
+            <ac:cxnSpMk id="32" creationId="{C0B9AB97-299F-4B76-3C2C-977514A4A449}"/>
+          </ac:cxnSpMkLst>
+        </pc:cxnChg>
+        <pc:cxnChg chg="add mod">
+          <ac:chgData name="Josie Versloot" userId="21650351-ceaf-4c5e-acf0-be8276fefc3c" providerId="ADAL" clId="{23DB148D-3B2F-4928-82C9-E7B12ED6FC7C}" dt="2023-09-22T13:25:38.942" v="733" actId="14100"/>
+          <ac:cxnSpMkLst>
+            <pc:docMk/>
+            <pc:sldMk cId="2922292050" sldId="256"/>
+            <ac:cxnSpMk id="33" creationId="{495E1AC3-BB2C-2078-1868-FB27D432BD29}"/>
+          </ac:cxnSpMkLst>
+        </pc:cxnChg>
+        <pc:cxnChg chg="add mod">
+          <ac:chgData name="Josie Versloot" userId="21650351-ceaf-4c5e-acf0-be8276fefc3c" providerId="ADAL" clId="{23DB148D-3B2F-4928-82C9-E7B12ED6FC7C}" dt="2023-09-22T13:25:46.996" v="734" actId="14100"/>
+          <ac:cxnSpMkLst>
+            <pc:docMk/>
+            <pc:sldMk cId="2922292050" sldId="256"/>
+            <ac:cxnSpMk id="34" creationId="{D1AA424D-52AE-7A5E-2185-B63E6229AD93}"/>
+          </ac:cxnSpMkLst>
+        </pc:cxnChg>
+        <pc:cxnChg chg="add mod">
+          <ac:chgData name="Josie Versloot" userId="21650351-ceaf-4c5e-acf0-be8276fefc3c" providerId="ADAL" clId="{23DB148D-3B2F-4928-82C9-E7B12ED6FC7C}" dt="2023-09-22T13:25:50.871" v="735" actId="14100"/>
+          <ac:cxnSpMkLst>
+            <pc:docMk/>
+            <pc:sldMk cId="2922292050" sldId="256"/>
+            <ac:cxnSpMk id="36" creationId="{8A557AB0-D25B-40F9-3559-294F6792F0DF}"/>
+          </ac:cxnSpMkLst>
+        </pc:cxnChg>
+        <pc:cxnChg chg="mod ord">
+          <ac:chgData name="Josie Versloot" userId="21650351-ceaf-4c5e-acf0-be8276fefc3c" providerId="ADAL" clId="{23DB148D-3B2F-4928-82C9-E7B12ED6FC7C}" dt="2023-09-20T14:48:34.644" v="199" actId="554"/>
+          <ac:cxnSpMkLst>
+            <pc:docMk/>
+            <pc:sldMk cId="2922292050" sldId="256"/>
+            <ac:cxnSpMk id="38" creationId="{7FB42686-8992-805C-FE25-5F355C617FBC}"/>
+          </ac:cxnSpMkLst>
+        </pc:cxnChg>
+        <pc:cxnChg chg="mod">
+          <ac:chgData name="Josie Versloot" userId="21650351-ceaf-4c5e-acf0-be8276fefc3c" providerId="ADAL" clId="{23DB148D-3B2F-4928-82C9-E7B12ED6FC7C}" dt="2023-09-20T14:45:45.396" v="151" actId="692"/>
+          <ac:cxnSpMkLst>
+            <pc:docMk/>
+            <pc:sldMk cId="2922292050" sldId="256"/>
+            <ac:cxnSpMk id="40" creationId="{F0D77CF0-CE44-8A9F-4143-976C0D972E7B}"/>
+          </ac:cxnSpMkLst>
+        </pc:cxnChg>
+        <pc:cxnChg chg="mod ord">
+          <ac:chgData name="Josie Versloot" userId="21650351-ceaf-4c5e-acf0-be8276fefc3c" providerId="ADAL" clId="{23DB148D-3B2F-4928-82C9-E7B12ED6FC7C}" dt="2023-09-20T14:48:37.734" v="200" actId="14100"/>
+          <ac:cxnSpMkLst>
+            <pc:docMk/>
+            <pc:sldMk cId="2922292050" sldId="256"/>
+            <ac:cxnSpMk id="44" creationId="{589A06C1-2B89-58FE-F5C4-3D016A3FEE15}"/>
+          </ac:cxnSpMkLst>
+        </pc:cxnChg>
+        <pc:cxnChg chg="mod">
+          <ac:chgData name="Josie Versloot" userId="21650351-ceaf-4c5e-acf0-be8276fefc3c" providerId="ADAL" clId="{23DB148D-3B2F-4928-82C9-E7B12ED6FC7C}" dt="2023-09-20T14:47:38.257" v="185" actId="692"/>
+          <ac:cxnSpMkLst>
+            <pc:docMk/>
+            <pc:sldMk cId="2922292050" sldId="256"/>
+            <ac:cxnSpMk id="45" creationId="{D21B4FC7-67F5-2402-BE83-0E8FB269A4EC}"/>
+          </ac:cxnSpMkLst>
+        </pc:cxnChg>
+        <pc:cxnChg chg="add mod">
+          <ac:chgData name="Josie Versloot" userId="21650351-ceaf-4c5e-acf0-be8276fefc3c" providerId="ADAL" clId="{23DB148D-3B2F-4928-82C9-E7B12ED6FC7C}" dt="2023-09-22T13:27:49.265" v="758" actId="14100"/>
+          <ac:cxnSpMkLst>
+            <pc:docMk/>
+            <pc:sldMk cId="2922292050" sldId="256"/>
+            <ac:cxnSpMk id="48" creationId="{C03E7130-138C-E68D-7ADA-B2737F3644D5}"/>
+          </ac:cxnSpMkLst>
+        </pc:cxnChg>
+        <pc:cxnChg chg="mod ord">
+          <ac:chgData name="Josie Versloot" userId="21650351-ceaf-4c5e-acf0-be8276fefc3c" providerId="ADAL" clId="{23DB148D-3B2F-4928-82C9-E7B12ED6FC7C}" dt="2023-09-20T14:48:34.644" v="199" actId="554"/>
+          <ac:cxnSpMkLst>
+            <pc:docMk/>
+            <pc:sldMk cId="2922292050" sldId="256"/>
+            <ac:cxnSpMk id="49" creationId="{97D06446-9D9F-4D43-BCA8-F990270E7C53}"/>
+          </ac:cxnSpMkLst>
+        </pc:cxnChg>
+        <pc:cxnChg chg="mod">
+          <ac:chgData name="Josie Versloot" userId="21650351-ceaf-4c5e-acf0-be8276fefc3c" providerId="ADAL" clId="{23DB148D-3B2F-4928-82C9-E7B12ED6FC7C}" dt="2023-09-20T14:47:55.535" v="193" actId="692"/>
+          <ac:cxnSpMkLst>
+            <pc:docMk/>
+            <pc:sldMk cId="2922292050" sldId="256"/>
+            <ac:cxnSpMk id="51" creationId="{D2BBF06E-61A7-163C-EBB8-1EE61F798CD7}"/>
+          </ac:cxnSpMkLst>
+        </pc:cxnChg>
+        <pc:cxnChg chg="add mod">
+          <ac:chgData name="Josie Versloot" userId="21650351-ceaf-4c5e-acf0-be8276fefc3c" providerId="ADAL" clId="{23DB148D-3B2F-4928-82C9-E7B12ED6FC7C}" dt="2023-09-22T13:27:43.346" v="756" actId="1076"/>
+          <ac:cxnSpMkLst>
+            <pc:docMk/>
+            <pc:sldMk cId="2922292050" sldId="256"/>
+            <ac:cxnSpMk id="55" creationId="{2F76AFB4-38DF-95D4-5FCA-E37F10B6E4B4}"/>
+          </ac:cxnSpMkLst>
+        </pc:cxnChg>
+        <pc:cxnChg chg="mod">
+          <ac:chgData name="Josie Versloot" userId="21650351-ceaf-4c5e-acf0-be8276fefc3c" providerId="ADAL" clId="{23DB148D-3B2F-4928-82C9-E7B12ED6FC7C}" dt="2023-09-19T21:15:46.758" v="1" actId="14100"/>
+          <ac:cxnSpMkLst>
+            <pc:docMk/>
+            <pc:sldMk cId="2922292050" sldId="256"/>
+            <ac:cxnSpMk id="58" creationId="{52C5FF01-1E3A-34BC-C669-C5AC61A29F8B}"/>
+          </ac:cxnSpMkLst>
+        </pc:cxnChg>
+      </pc:sldChg>
+      <pc:sldChg chg="addSp delSp modSp mod">
+        <pc:chgData name="Josie Versloot" userId="21650351-ceaf-4c5e-acf0-be8276fefc3c" providerId="ADAL" clId="{23DB148D-3B2F-4928-82C9-E7B12ED6FC7C}" dt="2023-09-20T15:12:54.651" v="604" actId="14100"/>
+        <pc:sldMkLst>
+          <pc:docMk/>
+          <pc:sldMk cId="3542691548" sldId="257"/>
+        </pc:sldMkLst>
+        <pc:spChg chg="del">
+          <ac:chgData name="Josie Versloot" userId="21650351-ceaf-4c5e-acf0-be8276fefc3c" providerId="ADAL" clId="{23DB148D-3B2F-4928-82C9-E7B12ED6FC7C}" dt="2023-09-19T21:16:00.994" v="2" actId="478"/>
+          <ac:spMkLst>
+            <pc:docMk/>
+            <pc:sldMk cId="3542691548" sldId="257"/>
+            <ac:spMk id="4" creationId="{8E4326E5-1328-F6E0-8DCB-DD5FC3F17C57}"/>
+          </ac:spMkLst>
+        </pc:spChg>
+        <pc:spChg chg="add mod">
+          <ac:chgData name="Josie Versloot" userId="21650351-ceaf-4c5e-acf0-be8276fefc3c" providerId="ADAL" clId="{23DB148D-3B2F-4928-82C9-E7B12ED6FC7C}" dt="2023-09-20T14:57:22.921" v="283" actId="1076"/>
+          <ac:spMkLst>
+            <pc:docMk/>
+            <pc:sldMk cId="3542691548" sldId="257"/>
+            <ac:spMk id="5" creationId="{FB5EC477-2430-75BD-907A-BDFD0848FDC0}"/>
+          </ac:spMkLst>
+        </pc:spChg>
+        <pc:spChg chg="add mod">
+          <ac:chgData name="Josie Versloot" userId="21650351-ceaf-4c5e-acf0-be8276fefc3c" providerId="ADAL" clId="{23DB148D-3B2F-4928-82C9-E7B12ED6FC7C}" dt="2023-09-20T14:57:22.921" v="283" actId="1076"/>
+          <ac:spMkLst>
+            <pc:docMk/>
+            <pc:sldMk cId="3542691548" sldId="257"/>
             <ac:spMk id="6" creationId="{77BF3E52-4727-EA7E-D0C5-17E002E9F386}"/>
           </ac:spMkLst>
         </pc:spChg>
-        <pc:spChg chg="mod">
-          <ac:chgData name="Stephen Moyer" userId="fde0619e-9f48-44fe-9adc-708c18563dcc" providerId="ADAL" clId="{998EA659-91A7-412B-94B9-119A637F5B9E}" dt="2023-12-14T17:13:14.539" v="16" actId="207"/>
+        <pc:spChg chg="add mod">
+          <ac:chgData name="Josie Versloot" userId="21650351-ceaf-4c5e-acf0-be8276fefc3c" providerId="ADAL" clId="{23DB148D-3B2F-4928-82C9-E7B12ED6FC7C}" dt="2023-09-20T14:57:22.921" v="283" actId="1076"/>
           <ac:spMkLst>
             <pc:docMk/>
-            <pc:sldMk cId="1725122554" sldId="259"/>
+            <pc:sldMk cId="3542691548" sldId="257"/>
             <ac:spMk id="7" creationId="{70747C81-2036-749C-B56E-C63E7562C252}"/>
           </ac:spMkLst>
         </pc:spChg>
         <pc:spChg chg="add mod">
-          <ac:chgData name="Stephen Moyer" userId="fde0619e-9f48-44fe-9adc-708c18563dcc" providerId="ADAL" clId="{998EA659-91A7-412B-94B9-119A637F5B9E}" dt="2023-12-14T17:13:54.659" v="24" actId="1076"/>
+          <ac:chgData name="Josie Versloot" userId="21650351-ceaf-4c5e-acf0-be8276fefc3c" providerId="ADAL" clId="{23DB148D-3B2F-4928-82C9-E7B12ED6FC7C}" dt="2023-09-20T14:57:22.921" v="283" actId="1076"/>
           <ac:spMkLst>
             <pc:docMk/>
-            <pc:sldMk cId="1725122554" sldId="259"/>
-            <ac:spMk id="30" creationId="{62DD9C45-3DA9-DF79-B6EA-786AED291595}"/>
+            <pc:sldMk cId="3542691548" sldId="257"/>
+            <ac:spMk id="8" creationId="{BF20FFF7-E2EB-976B-FD57-8DCA9094558B}"/>
           </ac:spMkLst>
         </pc:spChg>
+        <pc:spChg chg="add mod">
+          <ac:chgData name="Josie Versloot" userId="21650351-ceaf-4c5e-acf0-be8276fefc3c" providerId="ADAL" clId="{23DB148D-3B2F-4928-82C9-E7B12ED6FC7C}" dt="2023-09-20T14:57:22.921" v="283" actId="1076"/>
+          <ac:spMkLst>
+            <pc:docMk/>
+            <pc:sldMk cId="3542691548" sldId="257"/>
+            <ac:spMk id="9" creationId="{378C1035-760A-2D7E-0085-28E6AEC7829B}"/>
+          </ac:spMkLst>
+        </pc:spChg>
+        <pc:spChg chg="add del mod">
+          <ac:chgData name="Josie Versloot" userId="21650351-ceaf-4c5e-acf0-be8276fefc3c" providerId="ADAL" clId="{23DB148D-3B2F-4928-82C9-E7B12ED6FC7C}" dt="2023-09-20T14:42:46.085" v="112" actId="478"/>
+          <ac:spMkLst>
+            <pc:docMk/>
+            <pc:sldMk cId="3542691548" sldId="257"/>
+            <ac:spMk id="17" creationId="{E59BF495-4824-C225-939C-592C3F08EA90}"/>
+          </ac:spMkLst>
+        </pc:spChg>
+        <pc:spChg chg="add del mod">
+          <ac:chgData name="Josie Versloot" userId="21650351-ceaf-4c5e-acf0-be8276fefc3c" providerId="ADAL" clId="{23DB148D-3B2F-4928-82C9-E7B12ED6FC7C}" dt="2023-09-20T14:42:46.085" v="112" actId="478"/>
+          <ac:spMkLst>
+            <pc:docMk/>
+            <pc:sldMk cId="3542691548" sldId="257"/>
+            <ac:spMk id="18" creationId="{E6993007-44F2-5B92-D935-8B30B54D6973}"/>
+          </ac:spMkLst>
+        </pc:spChg>
+        <pc:spChg chg="add del mod">
+          <ac:chgData name="Josie Versloot" userId="21650351-ceaf-4c5e-acf0-be8276fefc3c" providerId="ADAL" clId="{23DB148D-3B2F-4928-82C9-E7B12ED6FC7C}" dt="2023-09-20T14:42:46.085" v="112" actId="478"/>
+          <ac:spMkLst>
+            <pc:docMk/>
+            <pc:sldMk cId="3542691548" sldId="257"/>
+            <ac:spMk id="19" creationId="{8DBE063E-4A61-911C-3F91-4B8C46617305}"/>
+          </ac:spMkLst>
+        </pc:spChg>
+        <pc:spChg chg="add del mod">
+          <ac:chgData name="Josie Versloot" userId="21650351-ceaf-4c5e-acf0-be8276fefc3c" providerId="ADAL" clId="{23DB148D-3B2F-4928-82C9-E7B12ED6FC7C}" dt="2023-09-20T14:42:46.085" v="112" actId="478"/>
+          <ac:spMkLst>
+            <pc:docMk/>
+            <pc:sldMk cId="3542691548" sldId="257"/>
+            <ac:spMk id="20" creationId="{94FB05F9-652B-4668-FDA7-997DC073D064}"/>
+          </ac:spMkLst>
+        </pc:spChg>
+        <pc:spChg chg="add del mod">
+          <ac:chgData name="Josie Versloot" userId="21650351-ceaf-4c5e-acf0-be8276fefc3c" providerId="ADAL" clId="{23DB148D-3B2F-4928-82C9-E7B12ED6FC7C}" dt="2023-09-20T14:42:46.085" v="112" actId="478"/>
+          <ac:spMkLst>
+            <pc:docMk/>
+            <pc:sldMk cId="3542691548" sldId="257"/>
+            <ac:spMk id="21" creationId="{BEC25390-801D-7807-9A3A-153B2907868E}"/>
+          </ac:spMkLst>
+        </pc:spChg>
+        <pc:spChg chg="add del mod">
+          <ac:chgData name="Josie Versloot" userId="21650351-ceaf-4c5e-acf0-be8276fefc3c" providerId="ADAL" clId="{23DB148D-3B2F-4928-82C9-E7B12ED6FC7C}" dt="2023-09-20T14:48:10.292" v="194" actId="478"/>
+          <ac:spMkLst>
+            <pc:docMk/>
+            <pc:sldMk cId="3542691548" sldId="257"/>
+            <ac:spMk id="22" creationId="{ABDA34A2-DB6F-D543-57AB-FEF824288613}"/>
+          </ac:spMkLst>
+        </pc:spChg>
+        <pc:spChg chg="add del mod">
+          <ac:chgData name="Josie Versloot" userId="21650351-ceaf-4c5e-acf0-be8276fefc3c" providerId="ADAL" clId="{23DB148D-3B2F-4928-82C9-E7B12ED6FC7C}" dt="2023-09-20T14:48:10.292" v="194" actId="478"/>
+          <ac:spMkLst>
+            <pc:docMk/>
+            <pc:sldMk cId="3542691548" sldId="257"/>
+            <ac:spMk id="23" creationId="{E2279729-8E78-8459-0ACE-65BFF5F7D4CB}"/>
+          </ac:spMkLst>
+        </pc:spChg>
+        <pc:spChg chg="add del mod">
+          <ac:chgData name="Josie Versloot" userId="21650351-ceaf-4c5e-acf0-be8276fefc3c" providerId="ADAL" clId="{23DB148D-3B2F-4928-82C9-E7B12ED6FC7C}" dt="2023-09-20T14:48:10.292" v="194" actId="478"/>
+          <ac:spMkLst>
+            <pc:docMk/>
+            <pc:sldMk cId="3542691548" sldId="257"/>
+            <ac:spMk id="24" creationId="{F35047B7-AB4A-B3FD-B18B-BF86D15B3D62}"/>
+          </ac:spMkLst>
+        </pc:spChg>
+        <pc:spChg chg="add del mod">
+          <ac:chgData name="Josie Versloot" userId="21650351-ceaf-4c5e-acf0-be8276fefc3c" providerId="ADAL" clId="{23DB148D-3B2F-4928-82C9-E7B12ED6FC7C}" dt="2023-09-20T14:48:10.292" v="194" actId="478"/>
+          <ac:spMkLst>
+            <pc:docMk/>
+            <pc:sldMk cId="3542691548" sldId="257"/>
+            <ac:spMk id="25" creationId="{70F88842-E1E8-C277-1C1A-601EE15615B7}"/>
+          </ac:spMkLst>
+        </pc:spChg>
+        <pc:spChg chg="add del mod">
+          <ac:chgData name="Josie Versloot" userId="21650351-ceaf-4c5e-acf0-be8276fefc3c" providerId="ADAL" clId="{23DB148D-3B2F-4928-82C9-E7B12ED6FC7C}" dt="2023-09-20T14:48:50.856" v="201" actId="478"/>
+          <ac:spMkLst>
+            <pc:docMk/>
+            <pc:sldMk cId="3542691548" sldId="257"/>
+            <ac:spMk id="49" creationId="{94E5518C-79C8-A5E3-0291-0B6C4B158D36}"/>
+          </ac:spMkLst>
+        </pc:spChg>
+        <pc:spChg chg="add del mod">
+          <ac:chgData name="Josie Versloot" userId="21650351-ceaf-4c5e-acf0-be8276fefc3c" providerId="ADAL" clId="{23DB148D-3B2F-4928-82C9-E7B12ED6FC7C}" dt="2023-09-20T14:48:50.856" v="201" actId="478"/>
+          <ac:spMkLst>
+            <pc:docMk/>
+            <pc:sldMk cId="3542691548" sldId="257"/>
+            <ac:spMk id="50" creationId="{9B01F27E-6983-9DA9-1523-387F86F138CC}"/>
+          </ac:spMkLst>
+        </pc:spChg>
+        <pc:spChg chg="add del mod">
+          <ac:chgData name="Josie Versloot" userId="21650351-ceaf-4c5e-acf0-be8276fefc3c" providerId="ADAL" clId="{23DB148D-3B2F-4928-82C9-E7B12ED6FC7C}" dt="2023-09-20T14:48:50.856" v="201" actId="478"/>
+          <ac:spMkLst>
+            <pc:docMk/>
+            <pc:sldMk cId="3542691548" sldId="257"/>
+            <ac:spMk id="51" creationId="{D3D8B866-BE57-2239-989B-999DF28CE338}"/>
+          </ac:spMkLst>
+        </pc:spChg>
+        <pc:spChg chg="add del mod">
+          <ac:chgData name="Josie Versloot" userId="21650351-ceaf-4c5e-acf0-be8276fefc3c" providerId="ADAL" clId="{23DB148D-3B2F-4928-82C9-E7B12ED6FC7C}" dt="2023-09-20T14:48:50.856" v="201" actId="478"/>
+          <ac:spMkLst>
+            <pc:docMk/>
+            <pc:sldMk cId="3542691548" sldId="257"/>
+            <ac:spMk id="52" creationId="{D4B3CE6B-171C-6373-138B-5EA28C71567F}"/>
+          </ac:spMkLst>
+        </pc:spChg>
+        <pc:spChg chg="add del mod">
+          <ac:chgData name="Josie Versloot" userId="21650351-ceaf-4c5e-acf0-be8276fefc3c" providerId="ADAL" clId="{23DB148D-3B2F-4928-82C9-E7B12ED6FC7C}" dt="2023-09-20T14:48:50.856" v="201" actId="478"/>
+          <ac:spMkLst>
+            <pc:docMk/>
+            <pc:sldMk cId="3542691548" sldId="257"/>
+            <ac:spMk id="53" creationId="{A573D9EB-4411-34DE-7F45-F94EA9117814}"/>
+          </ac:spMkLst>
+        </pc:spChg>
+        <pc:spChg chg="add del mod">
+          <ac:chgData name="Josie Versloot" userId="21650351-ceaf-4c5e-acf0-be8276fefc3c" providerId="ADAL" clId="{23DB148D-3B2F-4928-82C9-E7B12ED6FC7C}" dt="2023-09-20T14:48:50.856" v="201" actId="478"/>
+          <ac:spMkLst>
+            <pc:docMk/>
+            <pc:sldMk cId="3542691548" sldId="257"/>
+            <ac:spMk id="54" creationId="{B35DD35C-2E57-A462-92A1-D82372404A67}"/>
+          </ac:spMkLst>
+        </pc:spChg>
+        <pc:spChg chg="add del mod">
+          <ac:chgData name="Josie Versloot" userId="21650351-ceaf-4c5e-acf0-be8276fefc3c" providerId="ADAL" clId="{23DB148D-3B2F-4928-82C9-E7B12ED6FC7C}" dt="2023-09-20T14:48:50.856" v="201" actId="478"/>
+          <ac:spMkLst>
+            <pc:docMk/>
+            <pc:sldMk cId="3542691548" sldId="257"/>
+            <ac:spMk id="55" creationId="{26213186-6A5B-2AC8-96F8-D5B8AB0BA2E6}"/>
+          </ac:spMkLst>
+        </pc:spChg>
+        <pc:spChg chg="add del mod">
+          <ac:chgData name="Josie Versloot" userId="21650351-ceaf-4c5e-acf0-be8276fefc3c" providerId="ADAL" clId="{23DB148D-3B2F-4928-82C9-E7B12ED6FC7C}" dt="2023-09-20T14:48:52.963" v="202" actId="478"/>
+          <ac:spMkLst>
+            <pc:docMk/>
+            <pc:sldMk cId="3542691548" sldId="257"/>
+            <ac:spMk id="56" creationId="{8CE9C035-94EA-25EB-8DA7-9CEB5DC3C2D1}"/>
+          </ac:spMkLst>
+        </pc:spChg>
+        <pc:spChg chg="add del mod">
+          <ac:chgData name="Josie Versloot" userId="21650351-ceaf-4c5e-acf0-be8276fefc3c" providerId="ADAL" clId="{23DB148D-3B2F-4928-82C9-E7B12ED6FC7C}" dt="2023-09-20T14:48:52.963" v="202" actId="478"/>
+          <ac:spMkLst>
+            <pc:docMk/>
+            <pc:sldMk cId="3542691548" sldId="257"/>
+            <ac:spMk id="57" creationId="{DAB406F8-AF87-6DD7-7F43-DEA75BA21CC2}"/>
+          </ac:spMkLst>
+        </pc:spChg>
+        <pc:spChg chg="add del mod">
+          <ac:chgData name="Josie Versloot" userId="21650351-ceaf-4c5e-acf0-be8276fefc3c" providerId="ADAL" clId="{23DB148D-3B2F-4928-82C9-E7B12ED6FC7C}" dt="2023-09-20T14:48:50.856" v="201" actId="478"/>
+          <ac:spMkLst>
+            <pc:docMk/>
+            <pc:sldMk cId="3542691548" sldId="257"/>
+            <ac:spMk id="2051" creationId="{D625D2A5-DCAE-1A92-2821-397128963B45}"/>
+          </ac:spMkLst>
+        </pc:spChg>
+        <pc:spChg chg="add del mod">
+          <ac:chgData name="Josie Versloot" userId="21650351-ceaf-4c5e-acf0-be8276fefc3c" providerId="ADAL" clId="{23DB148D-3B2F-4928-82C9-E7B12ED6FC7C}" dt="2023-09-20T14:49:03.701" v="205" actId="478"/>
+          <ac:spMkLst>
+            <pc:docMk/>
+            <pc:sldMk cId="3542691548" sldId="257"/>
+            <ac:spMk id="2064" creationId="{B70A267D-CDDF-FA93-CCE0-4AD799887C1F}"/>
+          </ac:spMkLst>
+        </pc:spChg>
+        <pc:spChg chg="add del mod">
+          <ac:chgData name="Josie Versloot" userId="21650351-ceaf-4c5e-acf0-be8276fefc3c" providerId="ADAL" clId="{23DB148D-3B2F-4928-82C9-E7B12ED6FC7C}" dt="2023-09-20T14:49:03.701" v="205" actId="478"/>
+          <ac:spMkLst>
+            <pc:docMk/>
+            <pc:sldMk cId="3542691548" sldId="257"/>
+            <ac:spMk id="2065" creationId="{28D65B14-2481-1B84-95D9-3E1C0B244829}"/>
+          </ac:spMkLst>
+        </pc:spChg>
+        <pc:spChg chg="add del mod">
+          <ac:chgData name="Josie Versloot" userId="21650351-ceaf-4c5e-acf0-be8276fefc3c" providerId="ADAL" clId="{23DB148D-3B2F-4928-82C9-E7B12ED6FC7C}" dt="2023-09-20T14:49:03.701" v="205" actId="478"/>
+          <ac:spMkLst>
+            <pc:docMk/>
+            <pc:sldMk cId="3542691548" sldId="257"/>
+            <ac:spMk id="2066" creationId="{E3DE6343-47ED-CC89-6D6E-2024625ED44F}"/>
+          </ac:spMkLst>
+        </pc:spChg>
+        <pc:spChg chg="add del mod">
+          <ac:chgData name="Josie Versloot" userId="21650351-ceaf-4c5e-acf0-be8276fefc3c" providerId="ADAL" clId="{23DB148D-3B2F-4928-82C9-E7B12ED6FC7C}" dt="2023-09-20T14:49:03.701" v="205" actId="478"/>
+          <ac:spMkLst>
+            <pc:docMk/>
+            <pc:sldMk cId="3542691548" sldId="257"/>
+            <ac:spMk id="2067" creationId="{1D35160E-2743-26C5-B195-9A91D05A53C7}"/>
+          </ac:spMkLst>
+        </pc:spChg>
+        <pc:spChg chg="add del mod">
+          <ac:chgData name="Josie Versloot" userId="21650351-ceaf-4c5e-acf0-be8276fefc3c" providerId="ADAL" clId="{23DB148D-3B2F-4928-82C9-E7B12ED6FC7C}" dt="2023-09-20T14:49:03.701" v="205" actId="478"/>
+          <ac:spMkLst>
+            <pc:docMk/>
+            <pc:sldMk cId="3542691548" sldId="257"/>
+            <ac:spMk id="2068" creationId="{6723B06A-FC65-E259-8F67-5ED89D315BA1}"/>
+          </ac:spMkLst>
+        </pc:spChg>
+        <pc:spChg chg="add mod">
+          <ac:chgData name="Josie Versloot" userId="21650351-ceaf-4c5e-acf0-be8276fefc3c" providerId="ADAL" clId="{23DB148D-3B2F-4928-82C9-E7B12ED6FC7C}" dt="2023-09-20T14:49:01.074" v="204" actId="1076"/>
+          <ac:spMkLst>
+            <pc:docMk/>
+            <pc:sldMk cId="3542691548" sldId="257"/>
+            <ac:spMk id="2069" creationId="{8D77B35A-6D65-101F-6721-3D0D0F3D560A}"/>
+          </ac:spMkLst>
+        </pc:spChg>
+        <pc:spChg chg="add mod">
+          <ac:chgData name="Josie Versloot" userId="21650351-ceaf-4c5e-acf0-be8276fefc3c" providerId="ADAL" clId="{23DB148D-3B2F-4928-82C9-E7B12ED6FC7C}" dt="2023-09-20T14:49:01.074" v="204" actId="1076"/>
+          <ac:spMkLst>
+            <pc:docMk/>
+            <pc:sldMk cId="3542691548" sldId="257"/>
+            <ac:spMk id="2070" creationId="{B040A06E-A129-7C25-967D-1D6B8C948275}"/>
+          </ac:spMkLst>
+        </pc:spChg>
+        <pc:spChg chg="add mod">
+          <ac:chgData name="Josie Versloot" userId="21650351-ceaf-4c5e-acf0-be8276fefc3c" providerId="ADAL" clId="{23DB148D-3B2F-4928-82C9-E7B12ED6FC7C}" dt="2023-09-20T14:49:01.074" v="204" actId="1076"/>
+          <ac:spMkLst>
+            <pc:docMk/>
+            <pc:sldMk cId="3542691548" sldId="257"/>
+            <ac:spMk id="2071" creationId="{311A113C-3D04-5451-574B-1B572962D498}"/>
+          </ac:spMkLst>
+        </pc:spChg>
+        <pc:spChg chg="add mod">
+          <ac:chgData name="Josie Versloot" userId="21650351-ceaf-4c5e-acf0-be8276fefc3c" providerId="ADAL" clId="{23DB148D-3B2F-4928-82C9-E7B12ED6FC7C}" dt="2023-09-20T14:49:01.074" v="204" actId="1076"/>
+          <ac:spMkLst>
+            <pc:docMk/>
+            <pc:sldMk cId="3542691548" sldId="257"/>
+            <ac:spMk id="2072" creationId="{EA404592-0C54-AAD3-F196-ABA1D4C09E10}"/>
+          </ac:spMkLst>
+        </pc:spChg>
+        <pc:spChg chg="add mod">
+          <ac:chgData name="Josie Versloot" userId="21650351-ceaf-4c5e-acf0-be8276fefc3c" providerId="ADAL" clId="{23DB148D-3B2F-4928-82C9-E7B12ED6FC7C}" dt="2023-09-20T14:49:01.074" v="204" actId="1076"/>
+          <ac:spMkLst>
+            <pc:docMk/>
+            <pc:sldMk cId="3542691548" sldId="257"/>
+            <ac:spMk id="2081" creationId="{E0013EC2-D951-EDF6-363B-7954D8389034}"/>
+          </ac:spMkLst>
+        </pc:spChg>
+        <pc:spChg chg="add del mod">
+          <ac:chgData name="Josie Versloot" userId="21650351-ceaf-4c5e-acf0-be8276fefc3c" providerId="ADAL" clId="{23DB148D-3B2F-4928-82C9-E7B12ED6FC7C}" dt="2023-09-20T15:09:23.319" v="525" actId="478"/>
+          <ac:spMkLst>
+            <pc:docMk/>
+            <pc:sldMk cId="3542691548" sldId="257"/>
+            <ac:spMk id="2137" creationId="{30BD4CF9-023C-D60B-0E38-8D0267005877}"/>
+          </ac:spMkLst>
+        </pc:spChg>
+        <pc:spChg chg="add del mod">
+          <ac:chgData name="Josie Versloot" userId="21650351-ceaf-4c5e-acf0-be8276fefc3c" providerId="ADAL" clId="{23DB148D-3B2F-4928-82C9-E7B12ED6FC7C}" dt="2023-09-20T15:09:25.158" v="526" actId="478"/>
+          <ac:spMkLst>
+            <pc:docMk/>
+            <pc:sldMk cId="3542691548" sldId="257"/>
+            <ac:spMk id="2141" creationId="{29ED21A7-CE8F-00A0-4716-DB3ADF9E8E29}"/>
+          </ac:spMkLst>
+        </pc:spChg>
+        <pc:spChg chg="add mod ord">
+          <ac:chgData name="Josie Versloot" userId="21650351-ceaf-4c5e-acf0-be8276fefc3c" providerId="ADAL" clId="{23DB148D-3B2F-4928-82C9-E7B12ED6FC7C}" dt="2023-09-20T15:12:41.968" v="599" actId="208"/>
+          <ac:spMkLst>
+            <pc:docMk/>
+            <pc:sldMk cId="3542691548" sldId="257"/>
+            <ac:spMk id="2143" creationId="{DAB6BE57-85EB-C8E2-521A-7D8F7AB421EF}"/>
+          </ac:spMkLst>
+        </pc:spChg>
+        <pc:spChg chg="add mod">
+          <ac:chgData name="Josie Versloot" userId="21650351-ceaf-4c5e-acf0-be8276fefc3c" providerId="ADAL" clId="{23DB148D-3B2F-4928-82C9-E7B12ED6FC7C}" dt="2023-09-20T15:11:24.814" v="568" actId="14100"/>
+          <ac:spMkLst>
+            <pc:docMk/>
+            <pc:sldMk cId="3542691548" sldId="257"/>
+            <ac:spMk id="2166" creationId="{7130555E-1D52-1DA6-5CF9-824505E18894}"/>
+          </ac:spMkLst>
+        </pc:spChg>
+        <pc:picChg chg="add del mod">
+          <ac:chgData name="Josie Versloot" userId="21650351-ceaf-4c5e-acf0-be8276fefc3c" providerId="ADAL" clId="{23DB148D-3B2F-4928-82C9-E7B12ED6FC7C}" dt="2023-09-20T14:48:10.292" v="194" actId="478"/>
+          <ac:picMkLst>
+            <pc:docMk/>
+            <pc:sldMk cId="3542691548" sldId="257"/>
+            <ac:picMk id="13" creationId="{AAA69C63-F0DB-6CED-048F-3F143BFE611B}"/>
+          </ac:picMkLst>
+        </pc:picChg>
+        <pc:picChg chg="add del mod">
+          <ac:chgData name="Josie Versloot" userId="21650351-ceaf-4c5e-acf0-be8276fefc3c" providerId="ADAL" clId="{23DB148D-3B2F-4928-82C9-E7B12ED6FC7C}" dt="2023-09-20T14:48:50.856" v="201" actId="478"/>
+          <ac:picMkLst>
+            <pc:docMk/>
+            <pc:sldMk cId="3542691548" sldId="257"/>
+            <ac:picMk id="45" creationId="{E6C0DF2B-E67A-383A-C752-A1EFC4B296DB}"/>
+          </ac:picMkLst>
+        </pc:picChg>
+        <pc:picChg chg="mod">
+          <ac:chgData name="Josie Versloot" userId="21650351-ceaf-4c5e-acf0-be8276fefc3c" providerId="ADAL" clId="{23DB148D-3B2F-4928-82C9-E7B12ED6FC7C}" dt="2023-09-20T14:57:22.921" v="283" actId="1076"/>
+          <ac:picMkLst>
+            <pc:docMk/>
+            <pc:sldMk cId="3542691548" sldId="257"/>
+            <ac:picMk id="2050" creationId="{E32688F9-D91A-7D76-79BB-42644DB1638C}"/>
+          </ac:picMkLst>
+        </pc:picChg>
+        <pc:picChg chg="add del mod">
+          <ac:chgData name="Josie Versloot" userId="21650351-ceaf-4c5e-acf0-be8276fefc3c" providerId="ADAL" clId="{23DB148D-3B2F-4928-82C9-E7B12ED6FC7C}" dt="2023-09-19T21:16:47.464" v="12" actId="21"/>
+          <ac:picMkLst>
+            <pc:docMk/>
+            <pc:sldMk cId="3542691548" sldId="257"/>
+            <ac:picMk id="2052" creationId="{4BE56AA3-C4D7-E743-1AEE-8CC3343A9AD1}"/>
+          </ac:picMkLst>
+        </pc:picChg>
+        <pc:picChg chg="add mod">
+          <ac:chgData name="Josie Versloot" userId="21650351-ceaf-4c5e-acf0-be8276fefc3c" providerId="ADAL" clId="{23DB148D-3B2F-4928-82C9-E7B12ED6FC7C}" dt="2023-09-20T14:49:01.074" v="204" actId="1076"/>
+          <ac:picMkLst>
+            <pc:docMk/>
+            <pc:sldMk cId="3542691548" sldId="257"/>
+            <ac:picMk id="2060" creationId="{5E3E1480-BE18-AC09-0C03-5787CD68C0D4}"/>
+          </ac:picMkLst>
+        </pc:picChg>
+        <pc:cxnChg chg="add del mod">
+          <ac:chgData name="Josie Versloot" userId="21650351-ceaf-4c5e-acf0-be8276fefc3c" providerId="ADAL" clId="{23DB148D-3B2F-4928-82C9-E7B12ED6FC7C}" dt="2023-09-20T14:48:10.292" v="194" actId="478"/>
+          <ac:cxnSpMkLst>
+            <pc:docMk/>
+            <pc:sldMk cId="3542691548" sldId="257"/>
+            <ac:cxnSpMk id="10" creationId="{18AAA979-A458-249B-A9B1-99556840E579}"/>
+          </ac:cxnSpMkLst>
+        </pc:cxnChg>
+        <pc:cxnChg chg="add del mod">
+          <ac:chgData name="Josie Versloot" userId="21650351-ceaf-4c5e-acf0-be8276fefc3c" providerId="ADAL" clId="{23DB148D-3B2F-4928-82C9-E7B12ED6FC7C}" dt="2023-09-20T14:48:10.292" v="194" actId="478"/>
+          <ac:cxnSpMkLst>
+            <pc:docMk/>
+            <pc:sldMk cId="3542691548" sldId="257"/>
+            <ac:cxnSpMk id="11" creationId="{4922CFF9-46A9-9B2B-83C8-6A2C5FEB3625}"/>
+          </ac:cxnSpMkLst>
+        </pc:cxnChg>
+        <pc:cxnChg chg="add del mod">
+          <ac:chgData name="Josie Versloot" userId="21650351-ceaf-4c5e-acf0-be8276fefc3c" providerId="ADAL" clId="{23DB148D-3B2F-4928-82C9-E7B12ED6FC7C}" dt="2023-09-20T14:48:10.292" v="194" actId="478"/>
+          <ac:cxnSpMkLst>
+            <pc:docMk/>
+            <pc:sldMk cId="3542691548" sldId="257"/>
+            <ac:cxnSpMk id="12" creationId="{CF440862-FE5A-689B-6164-849BCC2AA161}"/>
+          </ac:cxnSpMkLst>
+        </pc:cxnChg>
+        <pc:cxnChg chg="add del mod">
+          <ac:chgData name="Josie Versloot" userId="21650351-ceaf-4c5e-acf0-be8276fefc3c" providerId="ADAL" clId="{23DB148D-3B2F-4928-82C9-E7B12ED6FC7C}" dt="2023-09-20T14:48:10.292" v="194" actId="478"/>
+          <ac:cxnSpMkLst>
+            <pc:docMk/>
+            <pc:sldMk cId="3542691548" sldId="257"/>
+            <ac:cxnSpMk id="14" creationId="{5FA17B49-E5CC-FCB3-04AE-282B591C1553}"/>
+          </ac:cxnSpMkLst>
+        </pc:cxnChg>
+        <pc:cxnChg chg="add del mod">
+          <ac:chgData name="Josie Versloot" userId="21650351-ceaf-4c5e-acf0-be8276fefc3c" providerId="ADAL" clId="{23DB148D-3B2F-4928-82C9-E7B12ED6FC7C}" dt="2023-09-20T14:48:10.292" v="194" actId="478"/>
+          <ac:cxnSpMkLst>
+            <pc:docMk/>
+            <pc:sldMk cId="3542691548" sldId="257"/>
+            <ac:cxnSpMk id="15" creationId="{128F2BEA-05E8-EE2B-8201-7E541AFB1059}"/>
+          </ac:cxnSpMkLst>
+        </pc:cxnChg>
+        <pc:cxnChg chg="add del mod">
+          <ac:chgData name="Josie Versloot" userId="21650351-ceaf-4c5e-acf0-be8276fefc3c" providerId="ADAL" clId="{23DB148D-3B2F-4928-82C9-E7B12ED6FC7C}" dt="2023-09-20T14:48:10.292" v="194" actId="478"/>
+          <ac:cxnSpMkLst>
+            <pc:docMk/>
+            <pc:sldMk cId="3542691548" sldId="257"/>
+            <ac:cxnSpMk id="16" creationId="{7477EA28-D26C-3B5F-64E9-561090FBF5DC}"/>
+          </ac:cxnSpMkLst>
+        </pc:cxnChg>
+        <pc:cxnChg chg="add del mod">
+          <ac:chgData name="Josie Versloot" userId="21650351-ceaf-4c5e-acf0-be8276fefc3c" providerId="ADAL" clId="{23DB148D-3B2F-4928-82C9-E7B12ED6FC7C}" dt="2023-09-20T14:48:10.292" v="194" actId="478"/>
+          <ac:cxnSpMkLst>
+            <pc:docMk/>
+            <pc:sldMk cId="3542691548" sldId="257"/>
+            <ac:cxnSpMk id="26" creationId="{681AAC21-D4C7-6B02-3D99-B76C7F1D44D7}"/>
+          </ac:cxnSpMkLst>
+        </pc:cxnChg>
+        <pc:cxnChg chg="add del mod">
+          <ac:chgData name="Josie Versloot" userId="21650351-ceaf-4c5e-acf0-be8276fefc3c" providerId="ADAL" clId="{23DB148D-3B2F-4928-82C9-E7B12ED6FC7C}" dt="2023-09-20T14:48:10.292" v="194" actId="478"/>
+          <ac:cxnSpMkLst>
+            <pc:docMk/>
+            <pc:sldMk cId="3542691548" sldId="257"/>
+            <ac:cxnSpMk id="27" creationId="{BB1740A6-8D85-9D7B-D46B-C6D9BEF01095}"/>
+          </ac:cxnSpMkLst>
+        </pc:cxnChg>
+        <pc:cxnChg chg="add del mod">
+          <ac:chgData name="Josie Versloot" userId="21650351-ceaf-4c5e-acf0-be8276fefc3c" providerId="ADAL" clId="{23DB148D-3B2F-4928-82C9-E7B12ED6FC7C}" dt="2023-09-20T14:48:10.292" v="194" actId="478"/>
+          <ac:cxnSpMkLst>
+            <pc:docMk/>
+            <pc:sldMk cId="3542691548" sldId="257"/>
+            <ac:cxnSpMk id="28" creationId="{6FDFD8B1-6F37-C925-B7CD-40301A9D248F}"/>
+          </ac:cxnSpMkLst>
+        </pc:cxnChg>
+        <pc:cxnChg chg="add del mod">
+          <ac:chgData name="Josie Versloot" userId="21650351-ceaf-4c5e-acf0-be8276fefc3c" providerId="ADAL" clId="{23DB148D-3B2F-4928-82C9-E7B12ED6FC7C}" dt="2023-09-20T14:48:10.292" v="194" actId="478"/>
+          <ac:cxnSpMkLst>
+            <pc:docMk/>
+            <pc:sldMk cId="3542691548" sldId="257"/>
+            <ac:cxnSpMk id="29" creationId="{134FBD7E-8D2A-67AF-7537-CEEC078030AE}"/>
+          </ac:cxnSpMkLst>
+        </pc:cxnChg>
+        <pc:cxnChg chg="add del mod">
+          <ac:chgData name="Josie Versloot" userId="21650351-ceaf-4c5e-acf0-be8276fefc3c" providerId="ADAL" clId="{23DB148D-3B2F-4928-82C9-E7B12ED6FC7C}" dt="2023-09-20T14:48:10.292" v="194" actId="478"/>
+          <ac:cxnSpMkLst>
+            <pc:docMk/>
+            <pc:sldMk cId="3542691548" sldId="257"/>
+            <ac:cxnSpMk id="30" creationId="{904046F6-1852-421C-C6A3-A4C240F9384B}"/>
+          </ac:cxnSpMkLst>
+        </pc:cxnChg>
+        <pc:cxnChg chg="add del mod">
+          <ac:chgData name="Josie Versloot" userId="21650351-ceaf-4c5e-acf0-be8276fefc3c" providerId="ADAL" clId="{23DB148D-3B2F-4928-82C9-E7B12ED6FC7C}" dt="2023-09-20T14:48:10.292" v="194" actId="478"/>
+          <ac:cxnSpMkLst>
+            <pc:docMk/>
+            <pc:sldMk cId="3542691548" sldId="257"/>
+            <ac:cxnSpMk id="31" creationId="{B3787BF4-1F47-8363-F03E-41C30F85BEE0}"/>
+          </ac:cxnSpMkLst>
+        </pc:cxnChg>
+        <pc:cxnChg chg="add del mod">
+          <ac:chgData name="Josie Versloot" userId="21650351-ceaf-4c5e-acf0-be8276fefc3c" providerId="ADAL" clId="{23DB148D-3B2F-4928-82C9-E7B12ED6FC7C}" dt="2023-09-20T14:48:10.292" v="194" actId="478"/>
+          <ac:cxnSpMkLst>
+            <pc:docMk/>
+            <pc:sldMk cId="3542691548" sldId="257"/>
+            <ac:cxnSpMk id="32" creationId="{980E26BF-31D6-00AA-20DF-9E1BC66EA1D4}"/>
+          </ac:cxnSpMkLst>
+        </pc:cxnChg>
+        <pc:cxnChg chg="add del mod">
+          <ac:chgData name="Josie Versloot" userId="21650351-ceaf-4c5e-acf0-be8276fefc3c" providerId="ADAL" clId="{23DB148D-3B2F-4928-82C9-E7B12ED6FC7C}" dt="2023-09-20T14:48:10.292" v="194" actId="478"/>
+          <ac:cxnSpMkLst>
+            <pc:docMk/>
+            <pc:sldMk cId="3542691548" sldId="257"/>
+            <ac:cxnSpMk id="33" creationId="{FAC24073-B1CB-274A-CA8F-076A8E193DA0}"/>
+          </ac:cxnSpMkLst>
+        </pc:cxnChg>
+        <pc:cxnChg chg="add del mod">
+          <ac:chgData name="Josie Versloot" userId="21650351-ceaf-4c5e-acf0-be8276fefc3c" providerId="ADAL" clId="{23DB148D-3B2F-4928-82C9-E7B12ED6FC7C}" dt="2023-09-20T14:48:10.292" v="194" actId="478"/>
+          <ac:cxnSpMkLst>
+            <pc:docMk/>
+            <pc:sldMk cId="3542691548" sldId="257"/>
+            <ac:cxnSpMk id="34" creationId="{BA0229A8-7C0E-29E3-E92B-2A29959121E4}"/>
+          </ac:cxnSpMkLst>
+        </pc:cxnChg>
+        <pc:cxnChg chg="add del mod">
+          <ac:chgData name="Josie Versloot" userId="21650351-ceaf-4c5e-acf0-be8276fefc3c" providerId="ADAL" clId="{23DB148D-3B2F-4928-82C9-E7B12ED6FC7C}" dt="2023-09-20T14:48:10.292" v="194" actId="478"/>
+          <ac:cxnSpMkLst>
+            <pc:docMk/>
+            <pc:sldMk cId="3542691548" sldId="257"/>
+            <ac:cxnSpMk id="35" creationId="{4D6903D9-3C56-9030-8737-E54103D07B65}"/>
+          </ac:cxnSpMkLst>
+        </pc:cxnChg>
+        <pc:cxnChg chg="add del mod">
+          <ac:chgData name="Josie Versloot" userId="21650351-ceaf-4c5e-acf0-be8276fefc3c" providerId="ADAL" clId="{23DB148D-3B2F-4928-82C9-E7B12ED6FC7C}" dt="2023-09-20T14:48:10.292" v="194" actId="478"/>
+          <ac:cxnSpMkLst>
+            <pc:docMk/>
+            <pc:sldMk cId="3542691548" sldId="257"/>
+            <ac:cxnSpMk id="36" creationId="{93B350D6-D349-EA96-811D-5DDE85977A60}"/>
+          </ac:cxnSpMkLst>
+        </pc:cxnChg>
+        <pc:cxnChg chg="add del mod">
+          <ac:chgData name="Josie Versloot" userId="21650351-ceaf-4c5e-acf0-be8276fefc3c" providerId="ADAL" clId="{23DB148D-3B2F-4928-82C9-E7B12ED6FC7C}" dt="2023-09-20T14:48:10.292" v="194" actId="478"/>
+          <ac:cxnSpMkLst>
+            <pc:docMk/>
+            <pc:sldMk cId="3542691548" sldId="257"/>
+            <ac:cxnSpMk id="37" creationId="{0002962E-E013-0A76-21EC-92FB24E464F1}"/>
+          </ac:cxnSpMkLst>
+        </pc:cxnChg>
+        <pc:cxnChg chg="add del mod">
+          <ac:chgData name="Josie Versloot" userId="21650351-ceaf-4c5e-acf0-be8276fefc3c" providerId="ADAL" clId="{23DB148D-3B2F-4928-82C9-E7B12ED6FC7C}" dt="2023-09-20T14:49:07.240" v="206" actId="478"/>
+          <ac:cxnSpMkLst>
+            <pc:docMk/>
+            <pc:sldMk cId="3542691548" sldId="257"/>
+            <ac:cxnSpMk id="38" creationId="{665C5F7E-C90D-8B35-ECEA-4BA70E51B911}"/>
+          </ac:cxnSpMkLst>
+        </pc:cxnChg>
+        <pc:cxnChg chg="add del mod">
+          <ac:chgData name="Josie Versloot" userId="21650351-ceaf-4c5e-acf0-be8276fefc3c" providerId="ADAL" clId="{23DB148D-3B2F-4928-82C9-E7B12ED6FC7C}" dt="2023-09-20T14:49:08.065" v="207" actId="478"/>
+          <ac:cxnSpMkLst>
+            <pc:docMk/>
+            <pc:sldMk cId="3542691548" sldId="257"/>
+            <ac:cxnSpMk id="40" creationId="{875E848F-FEC0-05CE-2D4B-9D9ABD4CE39F}"/>
+          </ac:cxnSpMkLst>
+        </pc:cxnChg>
+        <pc:cxnChg chg="add del mod">
+          <ac:chgData name="Josie Versloot" userId="21650351-ceaf-4c5e-acf0-be8276fefc3c" providerId="ADAL" clId="{23DB148D-3B2F-4928-82C9-E7B12ED6FC7C}" dt="2023-09-20T14:48:50.856" v="201" actId="478"/>
+          <ac:cxnSpMkLst>
+            <pc:docMk/>
+            <pc:sldMk cId="3542691548" sldId="257"/>
+            <ac:cxnSpMk id="42" creationId="{948023C0-29CA-0C57-62A1-7CA7BDA03609}"/>
+          </ac:cxnSpMkLst>
+        </pc:cxnChg>
+        <pc:cxnChg chg="add del mod">
+          <ac:chgData name="Josie Versloot" userId="21650351-ceaf-4c5e-acf0-be8276fefc3c" providerId="ADAL" clId="{23DB148D-3B2F-4928-82C9-E7B12ED6FC7C}" dt="2023-09-20T14:48:50.856" v="201" actId="478"/>
+          <ac:cxnSpMkLst>
+            <pc:docMk/>
+            <pc:sldMk cId="3542691548" sldId="257"/>
+            <ac:cxnSpMk id="43" creationId="{3B413509-BA58-E6F1-D427-C2C68E4B7186}"/>
+          </ac:cxnSpMkLst>
+        </pc:cxnChg>
+        <pc:cxnChg chg="add del mod">
+          <ac:chgData name="Josie Versloot" userId="21650351-ceaf-4c5e-acf0-be8276fefc3c" providerId="ADAL" clId="{23DB148D-3B2F-4928-82C9-E7B12ED6FC7C}" dt="2023-09-20T14:48:50.856" v="201" actId="478"/>
+          <ac:cxnSpMkLst>
+            <pc:docMk/>
+            <pc:sldMk cId="3542691548" sldId="257"/>
+            <ac:cxnSpMk id="44" creationId="{5B642D3F-0309-E62F-DA0E-A9A34D808B91}"/>
+          </ac:cxnSpMkLst>
+        </pc:cxnChg>
+        <pc:cxnChg chg="add del mod">
+          <ac:chgData name="Josie Versloot" userId="21650351-ceaf-4c5e-acf0-be8276fefc3c" providerId="ADAL" clId="{23DB148D-3B2F-4928-82C9-E7B12ED6FC7C}" dt="2023-09-20T14:48:50.856" v="201" actId="478"/>
+          <ac:cxnSpMkLst>
+            <pc:docMk/>
+            <pc:sldMk cId="3542691548" sldId="257"/>
+            <ac:cxnSpMk id="46" creationId="{C39D13D0-13E6-7D49-3079-B193A18BB633}"/>
+          </ac:cxnSpMkLst>
+        </pc:cxnChg>
+        <pc:cxnChg chg="add del mod">
+          <ac:chgData name="Josie Versloot" userId="21650351-ceaf-4c5e-acf0-be8276fefc3c" providerId="ADAL" clId="{23DB148D-3B2F-4928-82C9-E7B12ED6FC7C}" dt="2023-09-20T14:48:50.856" v="201" actId="478"/>
+          <ac:cxnSpMkLst>
+            <pc:docMk/>
+            <pc:sldMk cId="3542691548" sldId="257"/>
+            <ac:cxnSpMk id="47" creationId="{898EA07A-CA81-F057-CD3B-2ECDCB5ED17D}"/>
+          </ac:cxnSpMkLst>
+        </pc:cxnChg>
+        <pc:cxnChg chg="add del mod">
+          <ac:chgData name="Josie Versloot" userId="21650351-ceaf-4c5e-acf0-be8276fefc3c" providerId="ADAL" clId="{23DB148D-3B2F-4928-82C9-E7B12ED6FC7C}" dt="2023-09-20T14:48:50.856" v="201" actId="478"/>
+          <ac:cxnSpMkLst>
+            <pc:docMk/>
+            <pc:sldMk cId="3542691548" sldId="257"/>
+            <ac:cxnSpMk id="48" creationId="{4CF7B3C9-2D42-B44A-DD79-4E815EE4F4C1}"/>
+          </ac:cxnSpMkLst>
+        </pc:cxnChg>
+        <pc:cxnChg chg="add del mod">
+          <ac:chgData name="Josie Versloot" userId="21650351-ceaf-4c5e-acf0-be8276fefc3c" providerId="ADAL" clId="{23DB148D-3B2F-4928-82C9-E7B12ED6FC7C}" dt="2023-09-20T14:48:50.856" v="201" actId="478"/>
+          <ac:cxnSpMkLst>
+            <pc:docMk/>
+            <pc:sldMk cId="3542691548" sldId="257"/>
+            <ac:cxnSpMk id="58" creationId="{247CA70C-A4E2-DA1F-5ABE-DCCCDE706B53}"/>
+          </ac:cxnSpMkLst>
+        </pc:cxnChg>
+        <pc:cxnChg chg="add del mod">
+          <ac:chgData name="Josie Versloot" userId="21650351-ceaf-4c5e-acf0-be8276fefc3c" providerId="ADAL" clId="{23DB148D-3B2F-4928-82C9-E7B12ED6FC7C}" dt="2023-09-20T14:48:50.856" v="201" actId="478"/>
+          <ac:cxnSpMkLst>
+            <pc:docMk/>
+            <pc:sldMk cId="3542691548" sldId="257"/>
+            <ac:cxnSpMk id="59" creationId="{A176107B-AE82-F0F0-FFE8-DA074429FC1B}"/>
+          </ac:cxnSpMkLst>
+        </pc:cxnChg>
+        <pc:cxnChg chg="add del mod">
+          <ac:chgData name="Josie Versloot" userId="21650351-ceaf-4c5e-acf0-be8276fefc3c" providerId="ADAL" clId="{23DB148D-3B2F-4928-82C9-E7B12ED6FC7C}" dt="2023-09-20T14:48:50.856" v="201" actId="478"/>
+          <ac:cxnSpMkLst>
+            <pc:docMk/>
+            <pc:sldMk cId="3542691548" sldId="257"/>
+            <ac:cxnSpMk id="60" creationId="{881C8548-58FC-70B7-5AC0-ACC9CADAB9EA}"/>
+          </ac:cxnSpMkLst>
+        </pc:cxnChg>
+        <pc:cxnChg chg="add del mod">
+          <ac:chgData name="Josie Versloot" userId="21650351-ceaf-4c5e-acf0-be8276fefc3c" providerId="ADAL" clId="{23DB148D-3B2F-4928-82C9-E7B12ED6FC7C}" dt="2023-09-20T14:48:52.963" v="202" actId="478"/>
+          <ac:cxnSpMkLst>
+            <pc:docMk/>
+            <pc:sldMk cId="3542691548" sldId="257"/>
+            <ac:cxnSpMk id="61" creationId="{A189BC60-68E4-586B-3C2D-A9AF0E288D6E}"/>
+          </ac:cxnSpMkLst>
+        </pc:cxnChg>
+        <pc:cxnChg chg="add del mod">
+          <ac:chgData name="Josie Versloot" userId="21650351-ceaf-4c5e-acf0-be8276fefc3c" providerId="ADAL" clId="{23DB148D-3B2F-4928-82C9-E7B12ED6FC7C}" dt="2023-09-20T14:48:50.856" v="201" actId="478"/>
+          <ac:cxnSpMkLst>
+            <pc:docMk/>
+            <pc:sldMk cId="3542691548" sldId="257"/>
+            <ac:cxnSpMk id="62" creationId="{A6EF2815-B033-F508-F8DD-809355E7271D}"/>
+          </ac:cxnSpMkLst>
+        </pc:cxnChg>
+        <pc:cxnChg chg="add del mod">
+          <ac:chgData name="Josie Versloot" userId="21650351-ceaf-4c5e-acf0-be8276fefc3c" providerId="ADAL" clId="{23DB148D-3B2F-4928-82C9-E7B12ED6FC7C}" dt="2023-09-20T14:48:50.856" v="201" actId="478"/>
+          <ac:cxnSpMkLst>
+            <pc:docMk/>
+            <pc:sldMk cId="3542691548" sldId="257"/>
+            <ac:cxnSpMk id="63" creationId="{481A8508-E510-AACB-B993-5F03E8CECCC4}"/>
+          </ac:cxnSpMkLst>
+        </pc:cxnChg>
+        <pc:cxnChg chg="add del mod">
+          <ac:chgData name="Josie Versloot" userId="21650351-ceaf-4c5e-acf0-be8276fefc3c" providerId="ADAL" clId="{23DB148D-3B2F-4928-82C9-E7B12ED6FC7C}" dt="2023-09-20T14:48:50.856" v="201" actId="478"/>
+          <ac:cxnSpMkLst>
+            <pc:docMk/>
+            <pc:sldMk cId="3542691548" sldId="257"/>
+            <ac:cxnSpMk id="2048" creationId="{29A30DBB-FE7D-A776-072F-6A7FFF5C9FD5}"/>
+          </ac:cxnSpMkLst>
+        </pc:cxnChg>
+        <pc:cxnChg chg="add del mod">
+          <ac:chgData name="Josie Versloot" userId="21650351-ceaf-4c5e-acf0-be8276fefc3c" providerId="ADAL" clId="{23DB148D-3B2F-4928-82C9-E7B12ED6FC7C}" dt="2023-09-20T14:48:50.856" v="201" actId="478"/>
+          <ac:cxnSpMkLst>
+            <pc:docMk/>
+            <pc:sldMk cId="3542691548" sldId="257"/>
+            <ac:cxnSpMk id="2049" creationId="{67C671A5-E07A-73EE-069C-8D9A9F915A5D}"/>
+          </ac:cxnSpMkLst>
+        </pc:cxnChg>
+        <pc:cxnChg chg="add del mod">
+          <ac:chgData name="Josie Versloot" userId="21650351-ceaf-4c5e-acf0-be8276fefc3c" providerId="ADAL" clId="{23DB148D-3B2F-4928-82C9-E7B12ED6FC7C}" dt="2023-09-20T14:48:50.856" v="201" actId="478"/>
+          <ac:cxnSpMkLst>
+            <pc:docMk/>
+            <pc:sldMk cId="3542691548" sldId="257"/>
+            <ac:cxnSpMk id="2053" creationId="{C6E126F8-83EE-3033-5DDC-80E62FB0CEC1}"/>
+          </ac:cxnSpMkLst>
+        </pc:cxnChg>
+        <pc:cxnChg chg="add del mod">
+          <ac:chgData name="Josie Versloot" userId="21650351-ceaf-4c5e-acf0-be8276fefc3c" providerId="ADAL" clId="{23DB148D-3B2F-4928-82C9-E7B12ED6FC7C}" dt="2023-09-20T14:48:50.856" v="201" actId="478"/>
+          <ac:cxnSpMkLst>
+            <pc:docMk/>
+            <pc:sldMk cId="3542691548" sldId="257"/>
+            <ac:cxnSpMk id="2054" creationId="{646A855A-8FBC-55F9-B948-E2703AE6BA77}"/>
+          </ac:cxnSpMkLst>
+        </pc:cxnChg>
+        <pc:cxnChg chg="add del mod">
+          <ac:chgData name="Josie Versloot" userId="21650351-ceaf-4c5e-acf0-be8276fefc3c" providerId="ADAL" clId="{23DB148D-3B2F-4928-82C9-E7B12ED6FC7C}" dt="2023-09-20T14:48:50.856" v="201" actId="478"/>
+          <ac:cxnSpMkLst>
+            <pc:docMk/>
+            <pc:sldMk cId="3542691548" sldId="257"/>
+            <ac:cxnSpMk id="2055" creationId="{370F3A26-17E1-CF5F-C6A2-9D5FCB51A42B}"/>
+          </ac:cxnSpMkLst>
+        </pc:cxnChg>
+        <pc:cxnChg chg="add del mod">
+          <ac:chgData name="Josie Versloot" userId="21650351-ceaf-4c5e-acf0-be8276fefc3c" providerId="ADAL" clId="{23DB148D-3B2F-4928-82C9-E7B12ED6FC7C}" dt="2023-09-20T14:48:52.963" v="202" actId="478"/>
+          <ac:cxnSpMkLst>
+            <pc:docMk/>
+            <pc:sldMk cId="3542691548" sldId="257"/>
+            <ac:cxnSpMk id="2056" creationId="{99C7B934-5C16-30CE-D512-FCA7E8950F0B}"/>
+          </ac:cxnSpMkLst>
+        </pc:cxnChg>
         <pc:cxnChg chg="add mod">
-          <ac:chgData name="Stephen Moyer" userId="fde0619e-9f48-44fe-9adc-708c18563dcc" providerId="ADAL" clId="{998EA659-91A7-412B-94B9-119A637F5B9E}" dt="2023-12-14T17:13:33.820" v="21" actId="14100"/>
-          <ac:cxnSpMkLst>
-            <pc:docMk/>
-            <pc:sldMk cId="1725122554" sldId="259"/>
-            <ac:cxnSpMk id="28" creationId="{387344E4-2256-B845-419C-ACEBD2784E5C}"/>
-          </ac:cxnSpMkLst>
-        </pc:cxnChg>
+          <ac:chgData name="Josie Versloot" userId="21650351-ceaf-4c5e-acf0-be8276fefc3c" providerId="ADAL" clId="{23DB148D-3B2F-4928-82C9-E7B12ED6FC7C}" dt="2023-09-20T15:12:19.123" v="594" actId="14100"/>
+          <ac:cxnSpMkLst>
+            <pc:docMk/>
+            <pc:sldMk cId="3542691548" sldId="257"/>
+            <ac:cxnSpMk id="2057" creationId="{9A6F73A5-01F0-B452-DA86-5248CE9B4942}"/>
+          </ac:cxnSpMkLst>
+        </pc:cxnChg>
+        <pc:cxnChg chg="add mod">
+          <ac:chgData name="Josie Versloot" userId="21650351-ceaf-4c5e-acf0-be8276fefc3c" providerId="ADAL" clId="{23DB148D-3B2F-4928-82C9-E7B12ED6FC7C}" dt="2023-09-20T15:09:41.222" v="531" actId="14100"/>
+          <ac:cxnSpMkLst>
+            <pc:docMk/>
+            <pc:sldMk cId="3542691548" sldId="257"/>
+            <ac:cxnSpMk id="2058" creationId="{2BE4C3CC-EFE4-2B25-9496-7466F142EBEF}"/>
+          </ac:cxnSpMkLst>
+        </pc:cxnChg>
+        <pc:cxnChg chg="add mod">
+          <ac:chgData name="Josie Versloot" userId="21650351-ceaf-4c5e-acf0-be8276fefc3c" providerId="ADAL" clId="{23DB148D-3B2F-4928-82C9-E7B12ED6FC7C}" dt="2023-09-20T15:12:29.945" v="597" actId="14100"/>
+          <ac:cxnSpMkLst>
+            <pc:docMk/>
+            <pc:sldMk cId="3542691548" sldId="257"/>
+            <ac:cxnSpMk id="2059" creationId="{B969F7F2-080F-E3DD-4F8B-768C5412A2B5}"/>
+          </ac:cxnSpMkLst>
+        </pc:cxnChg>
+        <pc:cxnChg chg="add mod">
+          <ac:chgData name="Josie Versloot" userId="21650351-ceaf-4c5e-acf0-be8276fefc3c" providerId="ADAL" clId="{23DB148D-3B2F-4928-82C9-E7B12ED6FC7C}" dt="2023-09-20T15:12:21.950" v="595" actId="14100"/>
+          <ac:cxnSpMkLst>
+            <pc:docMk/>
+            <pc:sldMk cId="3542691548" sldId="257"/>
+            <ac:cxnSpMk id="2061" creationId="{2E2437AE-3A8D-9840-1E73-EC417CFE0F1C}"/>
+          </ac:cxnSpMkLst>
+        </pc:cxnChg>
+        <pc:cxnChg chg="add mod">
+          <ac:chgData name="Josie Versloot" userId="21650351-ceaf-4c5e-acf0-be8276fefc3c" providerId="ADAL" clId="{23DB148D-3B2F-4928-82C9-E7B12ED6FC7C}" dt="2023-09-20T14:59:49.278" v="407" actId="14100"/>
+          <ac:cxnSpMkLst>
+            <pc:docMk/>
+            <pc:sldMk cId="3542691548" sldId="257"/>
+            <ac:cxnSpMk id="2062" creationId="{17B3530B-D036-3144-9595-42ACD7886B8E}"/>
+          </ac:cxnSpMkLst>
+        </pc:cxnChg>
+        <pc:cxnChg chg="add del mod">
+          <ac:chgData name="Josie Versloot" userId="21650351-ceaf-4c5e-acf0-be8276fefc3c" providerId="ADAL" clId="{23DB148D-3B2F-4928-82C9-E7B12ED6FC7C}" dt="2023-09-20T15:09:25.536" v="527" actId="478"/>
+          <ac:cxnSpMkLst>
+            <pc:docMk/>
+            <pc:sldMk cId="3542691548" sldId="257"/>
+            <ac:cxnSpMk id="2063" creationId="{D46ED659-DCD8-7E1E-3BE8-38BAD1972BC3}"/>
+          </ac:cxnSpMkLst>
+        </pc:cxnChg>
+        <pc:cxnChg chg="add mod">
+          <ac:chgData name="Josie Versloot" userId="21650351-ceaf-4c5e-acf0-be8276fefc3c" providerId="ADAL" clId="{23DB148D-3B2F-4928-82C9-E7B12ED6FC7C}" dt="2023-09-20T14:49:01.074" v="204" actId="1076"/>
+          <ac:cxnSpMkLst>
+            <pc:docMk/>
+            <pc:sldMk cId="3542691548" sldId="257"/>
+            <ac:cxnSpMk id="2073" creationId="{0954D992-AD78-16A2-BC13-F6D6117F9761}"/>
+          </ac:cxnSpMkLst>
+        </pc:cxnChg>
+        <pc:cxnChg chg="add mod">
+          <ac:chgData name="Josie Versloot" userId="21650351-ceaf-4c5e-acf0-be8276fefc3c" providerId="ADAL" clId="{23DB148D-3B2F-4928-82C9-E7B12ED6FC7C}" dt="2023-09-20T14:49:01.074" v="204" actId="1076"/>
+          <ac:cxnSpMkLst>
+            <pc:docMk/>
+            <pc:sldMk cId="3542691548" sldId="257"/>
+            <ac:cxnSpMk id="2074" creationId="{56678A9F-A440-157A-9D2D-6DA6CF8AB21A}"/>
+          </ac:cxnSpMkLst>
+        </pc:cxnChg>
+        <pc:cxnChg chg="add mod">
+          <ac:chgData name="Josie Versloot" userId="21650351-ceaf-4c5e-acf0-be8276fefc3c" providerId="ADAL" clId="{23DB148D-3B2F-4928-82C9-E7B12ED6FC7C}" dt="2023-09-20T14:49:01.074" v="204" actId="1076"/>
+          <ac:cxnSpMkLst>
+            <pc:docMk/>
+            <pc:sldMk cId="3542691548" sldId="257"/>
+            <ac:cxnSpMk id="2075" creationId="{E8BAA04B-C567-308A-DAC9-20571C89C508}"/>
+          </ac:cxnSpMkLst>
+        </pc:cxnChg>
+        <pc:cxnChg chg="add mod">
+          <ac:chgData name="Josie Versloot" userId="21650351-ceaf-4c5e-acf0-be8276fefc3c" providerId="ADAL" clId="{23DB148D-3B2F-4928-82C9-E7B12ED6FC7C}" dt="2023-09-20T14:49:01.074" v="204" actId="1076"/>
+          <ac:cxnSpMkLst>
+            <pc:docMk/>
+            <pc:sldMk cId="3542691548" sldId="257"/>
+            <ac:cxnSpMk id="2076" creationId="{ADE8E1B2-A2ED-90EB-9BB6-50DBD6144365}"/>
+          </ac:cxnSpMkLst>
+        </pc:cxnChg>
+        <pc:cxnChg chg="add del mod">
+          <ac:chgData name="Josie Versloot" userId="21650351-ceaf-4c5e-acf0-be8276fefc3c" providerId="ADAL" clId="{23DB148D-3B2F-4928-82C9-E7B12ED6FC7C}" dt="2023-09-20T14:58:44.529" v="393" actId="478"/>
+          <ac:cxnSpMkLst>
+            <pc:docMk/>
+            <pc:sldMk cId="3542691548" sldId="257"/>
+            <ac:cxnSpMk id="2077" creationId="{AD4EB65D-F733-9A08-9043-B353B931988B}"/>
+          </ac:cxnSpMkLst>
+        </pc:cxnChg>
+        <pc:cxnChg chg="add mod">
+          <ac:chgData name="Josie Versloot" userId="21650351-ceaf-4c5e-acf0-be8276fefc3c" providerId="ADAL" clId="{23DB148D-3B2F-4928-82C9-E7B12ED6FC7C}" dt="2023-09-20T14:59:54.671" v="409" actId="14100"/>
+          <ac:cxnSpMkLst>
+            <pc:docMk/>
+            <pc:sldMk cId="3542691548" sldId="257"/>
+            <ac:cxnSpMk id="2078" creationId="{7AB36CD0-9D25-5850-4DC8-CF62E1C4FF9A}"/>
+          </ac:cxnSpMkLst>
+        </pc:cxnChg>
+        <pc:cxnChg chg="add del mod">
+          <ac:chgData name="Josie Versloot" userId="21650351-ceaf-4c5e-acf0-be8276fefc3c" providerId="ADAL" clId="{23DB148D-3B2F-4928-82C9-E7B12ED6FC7C}" dt="2023-09-20T14:58:45.279" v="394" actId="478"/>
+          <ac:cxnSpMkLst>
+            <pc:docMk/>
+            <pc:sldMk cId="3542691548" sldId="257"/>
+            <ac:cxnSpMk id="2079" creationId="{90F2A397-13D8-63E5-8319-7351AEFA9F4C}"/>
+          </ac:cxnSpMkLst>
+        </pc:cxnChg>
+        <pc:cxnChg chg="add del mod">
+          <ac:chgData name="Josie Versloot" userId="21650351-ceaf-4c5e-acf0-be8276fefc3c" providerId="ADAL" clId="{23DB148D-3B2F-4928-82C9-E7B12ED6FC7C}" dt="2023-09-20T14:58:46.160" v="395" actId="478"/>
+          <ac:cxnSpMkLst>
+            <pc:docMk/>
+            <pc:sldMk cId="3542691548" sldId="257"/>
+            <ac:cxnSpMk id="2080" creationId="{4574033C-269E-13FA-D98E-B07AD59A451C}"/>
+          </ac:cxnSpMkLst>
+        </pc:cxnChg>
+        <pc:cxnChg chg="add mod">
+          <ac:chgData name="Josie Versloot" userId="21650351-ceaf-4c5e-acf0-be8276fefc3c" providerId="ADAL" clId="{23DB148D-3B2F-4928-82C9-E7B12ED6FC7C}" dt="2023-09-20T14:49:01.074" v="204" actId="1076"/>
+          <ac:cxnSpMkLst>
+            <pc:docMk/>
+            <pc:sldMk cId="3542691548" sldId="257"/>
+            <ac:cxnSpMk id="2082" creationId="{191AC23A-7229-CD94-6FE1-36507DCEACE9}"/>
+          </ac:cxnSpMkLst>
+        </pc:cxnChg>
+        <pc:cxnChg chg="add mod">
+          <ac:chgData name="Josie Versloot" userId="21650351-ceaf-4c5e-acf0-be8276fefc3c" providerId="ADAL" clId="{23DB148D-3B2F-4928-82C9-E7B12ED6FC7C}" dt="2023-09-20T14:49:01.074" v="204" actId="1076"/>
+          <ac:cxnSpMkLst>
+            <pc:docMk/>
+            <pc:sldMk cId="3542691548" sldId="257"/>
+            <ac:cxnSpMk id="2083" creationId="{5D991CE2-8D47-C23A-54D7-88DAF5EAB42D}"/>
+          </ac:cxnSpMkLst>
+        </pc:cxnChg>
+        <pc:cxnChg chg="add mod">
+          <ac:chgData name="Josie Versloot" userId="21650351-ceaf-4c5e-acf0-be8276fefc3c" providerId="ADAL" clId="{23DB148D-3B2F-4928-82C9-E7B12ED6FC7C}" dt="2023-09-20T14:49:01.074" v="204" actId="1076"/>
+          <ac:cxnSpMkLst>
+            <pc:docMk/>
+            <pc:sldMk cId="3542691548" sldId="257"/>
+            <ac:cxnSpMk id="2084" creationId="{93804002-588B-9198-23C7-034677239237}"/>
+          </ac:cxnSpMkLst>
+        </pc:cxnChg>
+        <pc:cxnChg chg="add mod">
+          <ac:chgData name="Josie Versloot" userId="21650351-ceaf-4c5e-acf0-be8276fefc3c" providerId="ADAL" clId="{23DB148D-3B2F-4928-82C9-E7B12ED6FC7C}" dt="2023-09-20T14:49:01.074" v="204" actId="1076"/>
+          <ac:cxnSpMkLst>
+            <pc:docMk/>
+            <pc:sldMk cId="3542691548" sldId="257"/>
+            <ac:cxnSpMk id="2085" creationId="{C12279F0-7E44-9483-21F2-1BD7AC68C603}"/>
+          </ac:cxnSpMkLst>
+        </pc:cxnChg>
+        <pc:cxnChg chg="add mod">
+          <ac:chgData name="Josie Versloot" userId="21650351-ceaf-4c5e-acf0-be8276fefc3c" providerId="ADAL" clId="{23DB148D-3B2F-4928-82C9-E7B12ED6FC7C}" dt="2023-09-20T14:57:22.921" v="283" actId="1076"/>
+          <ac:cxnSpMkLst>
+            <pc:docMk/>
+            <pc:sldMk cId="3542691548" sldId="257"/>
+            <ac:cxnSpMk id="2086" creationId="{63EB6A65-834E-716F-BD02-CC1513919F43}"/>
+          </ac:cxnSpMkLst>
+        </pc:cxnChg>
+        <pc:cxnChg chg="add mod">
+          <ac:chgData name="Josie Versloot" userId="21650351-ceaf-4c5e-acf0-be8276fefc3c" providerId="ADAL" clId="{23DB148D-3B2F-4928-82C9-E7B12ED6FC7C}" dt="2023-09-20T14:57:22.921" v="283" actId="1076"/>
+          <ac:cxnSpMkLst>
+            <pc:docMk/>
+            <pc:sldMk cId="3542691548" sldId="257"/>
+            <ac:cxnSpMk id="2088" creationId="{D0E89F0E-F64C-2608-BAC7-23FA2ACA0578}"/>
+          </ac:cxnSpMkLst>
+        </pc:cxnChg>
+        <pc:cxnChg chg="add del mod">
+          <ac:chgData name="Josie Versloot" userId="21650351-ceaf-4c5e-acf0-be8276fefc3c" providerId="ADAL" clId="{23DB148D-3B2F-4928-82C9-E7B12ED6FC7C}" dt="2023-09-20T14:52:12.455" v="248" actId="478"/>
+          <ac:cxnSpMkLst>
+            <pc:docMk/>
+            <pc:sldMk cId="3542691548" sldId="257"/>
+            <ac:cxnSpMk id="2089" creationId="{80BB85E8-FE68-7C8C-B55A-63E4DBAC06B3}"/>
+          </ac:cxnSpMkLst>
+        </pc:cxnChg>
+        <pc:cxnChg chg="add mod">
+          <ac:chgData name="Josie Versloot" userId="21650351-ceaf-4c5e-acf0-be8276fefc3c" providerId="ADAL" clId="{23DB148D-3B2F-4928-82C9-E7B12ED6FC7C}" dt="2023-09-20T14:57:22.921" v="283" actId="1076"/>
+          <ac:cxnSpMkLst>
+            <pc:docMk/>
+            <pc:sldMk cId="3542691548" sldId="257"/>
+            <ac:cxnSpMk id="2090" creationId="{5C050ACB-B38F-AECF-5C39-76128FB28CAD}"/>
+          </ac:cxnSpMkLst>
+        </pc:cxnChg>
+        <pc:cxnChg chg="add mod">
+          <ac:chgData name="Josie Versloot" userId="21650351-ceaf-4c5e-acf0-be8276fefc3c" providerId="ADAL" clId="{23DB148D-3B2F-4928-82C9-E7B12ED6FC7C}" dt="2023-09-20T14:57:22.921" v="283" actId="1076"/>
+          <ac:cxnSpMkLst>
+            <pc:docMk/>
+            <pc:sldMk cId="3542691548" sldId="257"/>
+            <ac:cxnSpMk id="2091" creationId="{8C92E253-4863-AA1D-BD06-A54BB81223EC}"/>
+          </ac:cxnSpMkLst>
+        </pc:cxnChg>
+        <pc:cxnChg chg="add mod">
+          <ac:chgData name="Josie Versloot" userId="21650351-ceaf-4c5e-acf0-be8276fefc3c" providerId="ADAL" clId="{23DB148D-3B2F-4928-82C9-E7B12ED6FC7C}" dt="2023-09-20T14:57:22.921" v="283" actId="1076"/>
+          <ac:cxnSpMkLst>
+            <pc:docMk/>
+            <pc:sldMk cId="3542691548" sldId="257"/>
+            <ac:cxnSpMk id="2092" creationId="{5F4FF822-6B1E-C4BF-8FD8-CEA85303C15B}"/>
+          </ac:cxnSpMkLst>
+        </pc:cxnChg>
+        <pc:cxnChg chg="add mod">
+          <ac:chgData name="Josie Versloot" userId="21650351-ceaf-4c5e-acf0-be8276fefc3c" providerId="ADAL" clId="{23DB148D-3B2F-4928-82C9-E7B12ED6FC7C}" dt="2023-09-20T14:57:22.921" v="283" actId="1076"/>
+          <ac:cxnSpMkLst>
+            <pc:docMk/>
+            <pc:sldMk cId="3542691548" sldId="257"/>
+            <ac:cxnSpMk id="2100" creationId="{9F94A6D8-3B9F-E3FA-AA41-4377FEDFFB0D}"/>
+          </ac:cxnSpMkLst>
+        </pc:cxnChg>
+        <pc:cxnChg chg="add mod">
+          <ac:chgData name="Josie Versloot" userId="21650351-ceaf-4c5e-acf0-be8276fefc3c" providerId="ADAL" clId="{23DB148D-3B2F-4928-82C9-E7B12ED6FC7C}" dt="2023-09-20T14:57:22.921" v="283" actId="1076"/>
+          <ac:cxnSpMkLst>
+            <pc:docMk/>
+            <pc:sldMk cId="3542691548" sldId="257"/>
+            <ac:cxnSpMk id="2103" creationId="{633810D9-FB72-EFC6-19EA-BDBE801AF743}"/>
+          </ac:cxnSpMkLst>
+        </pc:cxnChg>
+        <pc:cxnChg chg="add mod">
+          <ac:chgData name="Josie Versloot" userId="21650351-ceaf-4c5e-acf0-be8276fefc3c" providerId="ADAL" clId="{23DB148D-3B2F-4928-82C9-E7B12ED6FC7C}" dt="2023-09-20T14:57:22.921" v="283" actId="1076"/>
+          <ac:cxnSpMkLst>
+            <pc:docMk/>
+            <pc:sldMk cId="3542691548" sldId="257"/>
+            <ac:cxnSpMk id="2106" creationId="{6492A485-7BEA-D195-8B3A-71AA8FC7DD2F}"/>
+          </ac:cxnSpMkLst>
+        </pc:cxnChg>
+        <pc:cxnChg chg="add mod">
+          <ac:chgData name="Josie Versloot" userId="21650351-ceaf-4c5e-acf0-be8276fefc3c" providerId="ADAL" clId="{23DB148D-3B2F-4928-82C9-E7B12ED6FC7C}" dt="2023-09-20T14:57:22.921" v="283" actId="1076"/>
+          <ac:cxnSpMkLst>
+            <pc:docMk/>
+            <pc:sldMk cId="3542691548" sldId="257"/>
+            <ac:cxnSpMk id="2107" creationId="{0616D6DE-9087-DBFE-553B-CC22784F3D8C}"/>
+          </ac:cxnSpMkLst>
+        </pc:cxnChg>
+        <pc:cxnChg chg="add mod">
+          <ac:chgData name="Josie Versloot" userId="21650351-ceaf-4c5e-acf0-be8276fefc3c" providerId="ADAL" clId="{23DB148D-3B2F-4928-82C9-E7B12ED6FC7C}" dt="2023-09-20T15:11:44.601" v="572" actId="14100"/>
+          <ac:cxnSpMkLst>
+            <pc:docMk/>
+            <pc:sldMk cId="3542691548" sldId="257"/>
+            <ac:cxnSpMk id="2118" creationId="{4A4347A8-5861-09DA-A485-D71C985597EC}"/>
+          </ac:cxnSpMkLst>
+        </pc:cxnChg>
+        <pc:cxnChg chg="add mod">
+          <ac:chgData name="Josie Versloot" userId="21650351-ceaf-4c5e-acf0-be8276fefc3c" providerId="ADAL" clId="{23DB148D-3B2F-4928-82C9-E7B12ED6FC7C}" dt="2023-09-20T15:12:15.818" v="593" actId="1038"/>
+          <ac:cxnSpMkLst>
+            <pc:docMk/>
+            <pc:sldMk cId="3542691548" sldId="257"/>
+            <ac:cxnSpMk id="2126" creationId="{4A43795A-19E6-EC40-7131-D9DE3406FB74}"/>
+          </ac:cxnSpMkLst>
+        </pc:cxnChg>
+        <pc:cxnChg chg="add del mod">
+          <ac:chgData name="Josie Versloot" userId="21650351-ceaf-4c5e-acf0-be8276fefc3c" providerId="ADAL" clId="{23DB148D-3B2F-4928-82C9-E7B12ED6FC7C}" dt="2023-09-20T15:09:28.856" v="528" actId="478"/>
+          <ac:cxnSpMkLst>
+            <pc:docMk/>
+            <pc:sldMk cId="3542691548" sldId="257"/>
+            <ac:cxnSpMk id="2131" creationId="{0C08457E-75F5-6EC9-CB8C-DAFC02ED2756}"/>
+          </ac:cxnSpMkLst>
+        </pc:cxnChg>
+        <pc:cxnChg chg="add mod">
+          <ac:chgData name="Josie Versloot" userId="21650351-ceaf-4c5e-acf0-be8276fefc3c" providerId="ADAL" clId="{23DB148D-3B2F-4928-82C9-E7B12ED6FC7C}" dt="2023-09-20T15:09:42.902" v="532" actId="14100"/>
+          <ac:cxnSpMkLst>
+            <pc:docMk/>
+            <pc:sldMk cId="3542691548" sldId="257"/>
+            <ac:cxnSpMk id="2146" creationId="{7F005ACC-CCCE-A45C-53B5-CB39BE14A73F}"/>
+          </ac:cxnSpMkLst>
+        </pc:cxnChg>
+        <pc:cxnChg chg="add mod">
+          <ac:chgData name="Josie Versloot" userId="21650351-ceaf-4c5e-acf0-be8276fefc3c" providerId="ADAL" clId="{23DB148D-3B2F-4928-82C9-E7B12ED6FC7C}" dt="2023-09-20T15:09:35.567" v="530" actId="14100"/>
+          <ac:cxnSpMkLst>
+            <pc:docMk/>
+            <pc:sldMk cId="3542691548" sldId="257"/>
+            <ac:cxnSpMk id="2149" creationId="{1277DF2B-A807-74D2-2477-87A9DB5CBA21}"/>
+          </ac:cxnSpMkLst>
+        </pc:cxnChg>
+        <pc:cxnChg chg="add mod">
+          <ac:chgData name="Josie Versloot" userId="21650351-ceaf-4c5e-acf0-be8276fefc3c" providerId="ADAL" clId="{23DB148D-3B2F-4928-82C9-E7B12ED6FC7C}" dt="2023-09-20T15:09:56.034" v="538" actId="14100"/>
+          <ac:cxnSpMkLst>
+            <pc:docMk/>
+            <pc:sldMk cId="3542691548" sldId="257"/>
+            <ac:cxnSpMk id="2157" creationId="{93305E49-C70C-3851-111B-5B2E47AE8CE0}"/>
+          </ac:cxnSpMkLst>
+        </pc:cxnChg>
+        <pc:cxnChg chg="add mod">
+          <ac:chgData name="Josie Versloot" userId="21650351-ceaf-4c5e-acf0-be8276fefc3c" providerId="ADAL" clId="{23DB148D-3B2F-4928-82C9-E7B12ED6FC7C}" dt="2023-09-20T15:12:03.056" v="576" actId="1037"/>
+          <ac:cxnSpMkLst>
+            <pc:docMk/>
+            <pc:sldMk cId="3542691548" sldId="257"/>
+            <ac:cxnSpMk id="2161" creationId="{EC4D4C9F-EB2E-BEB0-659F-8E2BF4967CA9}"/>
+          </ac:cxnSpMkLst>
+        </pc:cxnChg>
+        <pc:cxnChg chg="add mod">
+          <ac:chgData name="Josie Versloot" userId="21650351-ceaf-4c5e-acf0-be8276fefc3c" providerId="ADAL" clId="{23DB148D-3B2F-4928-82C9-E7B12ED6FC7C}" dt="2023-09-20T15:12:54.651" v="604" actId="14100"/>
+          <ac:cxnSpMkLst>
+            <pc:docMk/>
+            <pc:sldMk cId="3542691548" sldId="257"/>
+            <ac:cxnSpMk id="2178" creationId="{95517525-52EE-121A-0E10-A961188B6FDD}"/>
+          </ac:cxnSpMkLst>
+        </pc:cxnChg>
+      </pc:sldChg>
+      <pc:sldChg chg="addSp delSp modSp new mod">
+        <pc:chgData name="Josie Versloot" userId="21650351-ceaf-4c5e-acf0-be8276fefc3c" providerId="ADAL" clId="{23DB148D-3B2F-4928-82C9-E7B12ED6FC7C}" dt="2023-09-19T21:19:33.110" v="27" actId="1076"/>
+        <pc:sldMkLst>
+          <pc:docMk/>
+          <pc:sldMk cId="3367889752" sldId="258"/>
+        </pc:sldMkLst>
+        <pc:spChg chg="del">
+          <ac:chgData name="Josie Versloot" userId="21650351-ceaf-4c5e-acf0-be8276fefc3c" providerId="ADAL" clId="{23DB148D-3B2F-4928-82C9-E7B12ED6FC7C}" dt="2023-09-19T21:16:50.817" v="15" actId="478"/>
+          <ac:spMkLst>
+            <pc:docMk/>
+            <pc:sldMk cId="3367889752" sldId="258"/>
+            <ac:spMk id="2" creationId="{BB7E249C-F215-20B2-17A3-268E7027E384}"/>
+          </ac:spMkLst>
+        </pc:spChg>
+        <pc:spChg chg="del">
+          <ac:chgData name="Josie Versloot" userId="21650351-ceaf-4c5e-acf0-be8276fefc3c" providerId="ADAL" clId="{23DB148D-3B2F-4928-82C9-E7B12ED6FC7C}" dt="2023-09-19T21:16:51.961" v="16" actId="478"/>
+          <ac:spMkLst>
+            <pc:docMk/>
+            <pc:sldMk cId="3367889752" sldId="258"/>
+            <ac:spMk id="3" creationId="{666FA618-77E0-9D0A-741C-0DB9E6801955}"/>
+          </ac:spMkLst>
+        </pc:spChg>
+        <pc:picChg chg="add mod">
+          <ac:chgData name="Josie Versloot" userId="21650351-ceaf-4c5e-acf0-be8276fefc3c" providerId="ADAL" clId="{23DB148D-3B2F-4928-82C9-E7B12ED6FC7C}" dt="2023-09-19T21:19:33.110" v="27" actId="1076"/>
+          <ac:picMkLst>
+            <pc:docMk/>
+            <pc:sldMk cId="3367889752" sldId="258"/>
+            <ac:picMk id="4" creationId="{AB612575-133B-8682-EDC8-76FF9BF71B5F}"/>
+          </ac:picMkLst>
+        </pc:picChg>
+      </pc:sldChg>
+    </pc:docChg>
+  </pc:docChgLst>
+  <pc:docChgLst>
+    <pc:chgData name="Josie Versloot" userId="21650351-ceaf-4c5e-acf0-be8276fefc3c" providerId="ADAL" clId="{F1480E2A-35F3-450B-92EE-15379DEA6026}"/>
+    <pc:docChg chg="undo custSel modSld">
+      <pc:chgData name="Josie Versloot" userId="21650351-ceaf-4c5e-acf0-be8276fefc3c" providerId="ADAL" clId="{F1480E2A-35F3-450B-92EE-15379DEA6026}" dt="2024-02-12T16:30:44.962" v="27" actId="207"/>
+      <pc:docMkLst>
+        <pc:docMk/>
+      </pc:docMkLst>
+      <pc:sldChg chg="modSp mod">
+        <pc:chgData name="Josie Versloot" userId="21650351-ceaf-4c5e-acf0-be8276fefc3c" providerId="ADAL" clId="{F1480E2A-35F3-450B-92EE-15379DEA6026}" dt="2024-02-12T16:30:44.962" v="27" actId="207"/>
+        <pc:sldMkLst>
+          <pc:docMk/>
+          <pc:sldMk cId="2922292050" sldId="256"/>
+        </pc:sldMkLst>
+        <pc:spChg chg="mod">
+          <ac:chgData name="Josie Versloot" userId="21650351-ceaf-4c5e-acf0-be8276fefc3c" providerId="ADAL" clId="{F1480E2A-35F3-450B-92EE-15379DEA6026}" dt="2024-02-12T16:30:44.962" v="27" actId="207"/>
+          <ac:spMkLst>
+            <pc:docMk/>
+            <pc:sldMk cId="2922292050" sldId="256"/>
+            <ac:spMk id="21" creationId="{453BBD75-CA27-D040-AB53-0E5485FE3510}"/>
+          </ac:spMkLst>
+        </pc:spChg>
+        <pc:spChg chg="mod">
+          <ac:chgData name="Josie Versloot" userId="21650351-ceaf-4c5e-acf0-be8276fefc3c" providerId="ADAL" clId="{F1480E2A-35F3-450B-92EE-15379DEA6026}" dt="2024-02-12T16:29:58.841" v="21" actId="14100"/>
+          <ac:spMkLst>
+            <pc:docMk/>
+            <pc:sldMk cId="2922292050" sldId="256"/>
+            <ac:spMk id="54" creationId="{C83D70B9-5BE4-7E49-33FA-B74892EC33FA}"/>
+          </ac:spMkLst>
+        </pc:spChg>
+        <pc:spChg chg="mod">
+          <ac:chgData name="Josie Versloot" userId="21650351-ceaf-4c5e-acf0-be8276fefc3c" providerId="ADAL" clId="{F1480E2A-35F3-450B-92EE-15379DEA6026}" dt="2024-02-12T16:29:01.511" v="14" actId="207"/>
+          <ac:spMkLst>
+            <pc:docMk/>
+            <pc:sldMk cId="2922292050" sldId="256"/>
+            <ac:spMk id="61" creationId="{B1C9EFF5-BB50-E3F9-9668-91DAD3D41D62}"/>
+          </ac:spMkLst>
+        </pc:spChg>
         <pc:cxnChg chg="mod">
-          <ac:chgData name="Stephen Moyer" userId="fde0619e-9f48-44fe-9adc-708c18563dcc" providerId="ADAL" clId="{998EA659-91A7-412B-94B9-119A637F5B9E}" dt="2023-12-14T17:12:38.859" v="10" actId="14100"/>
-          <ac:cxnSpMkLst>
-            <pc:docMk/>
-            <pc:sldMk cId="1725122554" sldId="259"/>
-            <ac:cxnSpMk id="2146" creationId="{7F005ACC-CCCE-A45C-53B5-CB39BE14A73F}"/>
+          <ac:chgData name="Josie Versloot" userId="21650351-ceaf-4c5e-acf0-be8276fefc3c" providerId="ADAL" clId="{F1480E2A-35F3-450B-92EE-15379DEA6026}" dt="2024-02-12T16:29:19.732" v="15" actId="208"/>
+          <ac:cxnSpMkLst>
+            <pc:docMk/>
+            <pc:sldMk cId="2922292050" sldId="256"/>
+            <ac:cxnSpMk id="8" creationId="{AF4B7CD7-8A04-8917-A6D5-0D39B9898857}"/>
+          </ac:cxnSpMkLst>
+        </pc:cxnChg>
+        <pc:cxnChg chg="mod ord">
+          <ac:chgData name="Josie Versloot" userId="21650351-ceaf-4c5e-acf0-be8276fefc3c" providerId="ADAL" clId="{F1480E2A-35F3-450B-92EE-15379DEA6026}" dt="2024-02-12T16:30:25.471" v="26" actId="167"/>
+          <ac:cxnSpMkLst>
+            <pc:docMk/>
+            <pc:sldMk cId="2922292050" sldId="256"/>
+            <ac:cxnSpMk id="33" creationId="{495E1AC3-BB2C-2078-1868-FB27D432BD29}"/>
           </ac:cxnSpMkLst>
         </pc:cxnChg>
         <pc:cxnChg chg="mod">
-          <ac:chgData name="Stephen Moyer" userId="fde0619e-9f48-44fe-9adc-708c18563dcc" providerId="ADAL" clId="{998EA659-91A7-412B-94B9-119A637F5B9E}" dt="2023-12-14T17:13:19.200" v="17" actId="14100"/>
-          <ac:cxnSpMkLst>
-            <pc:docMk/>
-            <pc:sldMk cId="1725122554" sldId="259"/>
-            <ac:cxnSpMk id="2149" creationId="{1277DF2B-A807-74D2-2477-87A9DB5CBA21}"/>
+          <ac:chgData name="Josie Versloot" userId="21650351-ceaf-4c5e-acf0-be8276fefc3c" providerId="ADAL" clId="{F1480E2A-35F3-450B-92EE-15379DEA6026}" dt="2024-02-12T16:30:06.338" v="23" actId="14100"/>
+          <ac:cxnSpMkLst>
+            <pc:docMk/>
+            <pc:sldMk cId="2922292050" sldId="256"/>
+            <ac:cxnSpMk id="48" creationId="{C03E7130-138C-E68D-7ADA-B2737F3644D5}"/>
           </ac:cxnSpMkLst>
         </pc:cxnChg>
         <pc:cxnChg chg="mod">
-          <ac:chgData name="Stephen Moyer" userId="fde0619e-9f48-44fe-9adc-708c18563dcc" providerId="ADAL" clId="{998EA659-91A7-412B-94B9-119A637F5B9E}" dt="2023-12-14T17:13:27.447" v="18" actId="14100"/>
-          <ac:cxnSpMkLst>
-            <pc:docMk/>
-            <pc:sldMk cId="1725122554" sldId="259"/>
-            <ac:cxnSpMk id="2157" creationId="{93305E49-C70C-3851-111B-5B2E47AE8CE0}"/>
+          <ac:chgData name="Josie Versloot" userId="21650351-ceaf-4c5e-acf0-be8276fefc3c" providerId="ADAL" clId="{F1480E2A-35F3-450B-92EE-15379DEA6026}" dt="2024-02-12T16:30:15.958" v="25" actId="14100"/>
+          <ac:cxnSpMkLst>
+            <pc:docMk/>
+            <pc:sldMk cId="2922292050" sldId="256"/>
+            <ac:cxnSpMk id="55" creationId="{2F76AFB4-38DF-95D4-5FCA-E37F10B6E4B4}"/>
           </ac:cxnSpMkLst>
         </pc:cxnChg>
         <pc:cxnChg chg="mod">
-          <ac:chgData name="Stephen Moyer" userId="fde0619e-9f48-44fe-9adc-708c18563dcc" providerId="ADAL" clId="{998EA659-91A7-412B-94B9-119A637F5B9E}" dt="2023-12-14T17:12:49.331" v="13" actId="14100"/>
-          <ac:cxnSpMkLst>
-            <pc:docMk/>
-            <pc:sldMk cId="1725122554" sldId="259"/>
-            <ac:cxnSpMk id="2161" creationId="{EC4D4C9F-EB2E-BEB0-659F-8E2BF4967CA9}"/>
+          <ac:chgData name="Josie Versloot" userId="21650351-ceaf-4c5e-acf0-be8276fefc3c" providerId="ADAL" clId="{F1480E2A-35F3-450B-92EE-15379DEA6026}" dt="2024-02-12T16:29:21.926" v="16" actId="208"/>
+          <ac:cxnSpMkLst>
+            <pc:docMk/>
+            <pc:sldMk cId="2922292050" sldId="256"/>
+            <ac:cxnSpMk id="58" creationId="{52C5FF01-1E3A-34BC-C669-C5AC61A29F8B}"/>
+          </ac:cxnSpMkLst>
+        </pc:cxnChg>
+        <pc:cxnChg chg="mod">
+          <ac:chgData name="Josie Versloot" userId="21650351-ceaf-4c5e-acf0-be8276fefc3c" providerId="ADAL" clId="{F1480E2A-35F3-450B-92EE-15379DEA6026}" dt="2024-02-12T16:29:53.136" v="20" actId="208"/>
+          <ac:cxnSpMkLst>
+            <pc:docMk/>
+            <pc:sldMk cId="2922292050" sldId="256"/>
+            <ac:cxnSpMk id="60" creationId="{1C4E155F-099D-93F1-E15F-396F23455E68}"/>
+          </ac:cxnSpMkLst>
+        </pc:cxnChg>
+        <pc:cxnChg chg="mod ord">
+          <ac:chgData name="Josie Versloot" userId="21650351-ceaf-4c5e-acf0-be8276fefc3c" providerId="ADAL" clId="{F1480E2A-35F3-450B-92EE-15379DEA6026}" dt="2024-02-12T16:29:42.967" v="19" actId="167"/>
+          <ac:cxnSpMkLst>
+            <pc:docMk/>
+            <pc:sldMk cId="2922292050" sldId="256"/>
+            <ac:cxnSpMk id="63" creationId="{42B02ED1-DAF2-6127-EB1B-98CD2AA71A66}"/>
           </ac:cxnSpMkLst>
         </pc:cxnChg>
       </pc:sldChg>
@@ -2071,7 +2159,7 @@
           <a:p>
             <a:fld id="{9EDB7D7B-BBD2-4008-949D-EB97E8FA210C}" type="datetimeFigureOut">
               <a:rPr lang="en-CA" smtClean="0"/>
-              <a:t>2023-12-14</a:t>
+              <a:t>2024-02-12</a:t>
             </a:fld>
             <a:endParaRPr lang="en-CA"/>
           </a:p>
@@ -2271,7 +2359,7 @@
           <a:p>
             <a:fld id="{9EDB7D7B-BBD2-4008-949D-EB97E8FA210C}" type="datetimeFigureOut">
               <a:rPr lang="en-CA" smtClean="0"/>
-              <a:t>2023-12-14</a:t>
+              <a:t>2024-02-12</a:t>
             </a:fld>
             <a:endParaRPr lang="en-CA"/>
           </a:p>
@@ -2481,7 +2569,7 @@
           <a:p>
             <a:fld id="{9EDB7D7B-BBD2-4008-949D-EB97E8FA210C}" type="datetimeFigureOut">
               <a:rPr lang="en-CA" smtClean="0"/>
-              <a:t>2023-12-14</a:t>
+              <a:t>2024-02-12</a:t>
             </a:fld>
             <a:endParaRPr lang="en-CA"/>
           </a:p>
@@ -2681,7 +2769,7 @@
           <a:p>
             <a:fld id="{9EDB7D7B-BBD2-4008-949D-EB97E8FA210C}" type="datetimeFigureOut">
               <a:rPr lang="en-CA" smtClean="0"/>
-              <a:t>2023-12-14</a:t>
+              <a:t>2024-02-12</a:t>
             </a:fld>
             <a:endParaRPr lang="en-CA"/>
           </a:p>
@@ -2957,7 +3045,7 @@
           <a:p>
             <a:fld id="{9EDB7D7B-BBD2-4008-949D-EB97E8FA210C}" type="datetimeFigureOut">
               <a:rPr lang="en-CA" smtClean="0"/>
-              <a:t>2023-12-14</a:t>
+              <a:t>2024-02-12</a:t>
             </a:fld>
             <a:endParaRPr lang="en-CA"/>
           </a:p>
@@ -3225,7 +3313,7 @@
           <a:p>
             <a:fld id="{9EDB7D7B-BBD2-4008-949D-EB97E8FA210C}" type="datetimeFigureOut">
               <a:rPr lang="en-CA" smtClean="0"/>
-              <a:t>2023-12-14</a:t>
+              <a:t>2024-02-12</a:t>
             </a:fld>
             <a:endParaRPr lang="en-CA"/>
           </a:p>
@@ -3640,7 +3728,7 @@
           <a:p>
             <a:fld id="{9EDB7D7B-BBD2-4008-949D-EB97E8FA210C}" type="datetimeFigureOut">
               <a:rPr lang="en-CA" smtClean="0"/>
-              <a:t>2023-12-14</a:t>
+              <a:t>2024-02-12</a:t>
             </a:fld>
             <a:endParaRPr lang="en-CA"/>
           </a:p>
@@ -3782,7 +3870,7 @@
           <a:p>
             <a:fld id="{9EDB7D7B-BBD2-4008-949D-EB97E8FA210C}" type="datetimeFigureOut">
               <a:rPr lang="en-CA" smtClean="0"/>
-              <a:t>2023-12-14</a:t>
+              <a:t>2024-02-12</a:t>
             </a:fld>
             <a:endParaRPr lang="en-CA"/>
           </a:p>
@@ -3895,7 +3983,7 @@
           <a:p>
             <a:fld id="{9EDB7D7B-BBD2-4008-949D-EB97E8FA210C}" type="datetimeFigureOut">
               <a:rPr lang="en-CA" smtClean="0"/>
-              <a:t>2023-12-14</a:t>
+              <a:t>2024-02-12</a:t>
             </a:fld>
             <a:endParaRPr lang="en-CA"/>
           </a:p>
@@ -4208,7 +4296,7 @@
           <a:p>
             <a:fld id="{9EDB7D7B-BBD2-4008-949D-EB97E8FA210C}" type="datetimeFigureOut">
               <a:rPr lang="en-CA" smtClean="0"/>
-              <a:t>2023-12-14</a:t>
+              <a:t>2024-02-12</a:t>
             </a:fld>
             <a:endParaRPr lang="en-CA"/>
           </a:p>
@@ -4497,7 +4585,7 @@
           <a:p>
             <a:fld id="{9EDB7D7B-BBD2-4008-949D-EB97E8FA210C}" type="datetimeFigureOut">
               <a:rPr lang="en-CA" smtClean="0"/>
-              <a:t>2023-12-14</a:t>
+              <a:t>2024-02-12</a:t>
             </a:fld>
             <a:endParaRPr lang="en-CA"/>
           </a:p>
@@ -4740,7 +4828,7 @@
           <a:p>
             <a:fld id="{9EDB7D7B-BBD2-4008-949D-EB97E8FA210C}" type="datetimeFigureOut">
               <a:rPr lang="en-CA" smtClean="0"/>
-              <a:t>2023-12-14</a:t>
+              <a:t>2024-02-12</a:t>
             </a:fld>
             <a:endParaRPr lang="en-CA"/>
           </a:p>
@@ -5159,6 +5247,92 @@
       </p:grpSpPr>
       <p:cxnSp>
         <p:nvCxnSpPr>
+          <p:cNvPr id="33" name="Straight Connector 32">
+            <a:extLst>
+              <a:ext uri="{FF2B5EF4-FFF2-40B4-BE49-F238E27FC236}">
+                <a16:creationId xmlns:a16="http://schemas.microsoft.com/office/drawing/2014/main" id="{495E1AC3-BB2C-2078-1868-FB27D432BD29}"/>
+              </a:ext>
+            </a:extLst>
+          </p:cNvPr>
+          <p:cNvCxnSpPr>
+            <a:cxnSpLocks/>
+          </p:cNvCxnSpPr>
+          <p:nvPr/>
+        </p:nvCxnSpPr>
+        <p:spPr>
+          <a:xfrm>
+            <a:off x="6506307" y="2033192"/>
+            <a:ext cx="1098523" cy="0"/>
+          </a:xfrm>
+          <a:prstGeom prst="line">
+            <a:avLst/>
+          </a:prstGeom>
+          <a:ln w="38100" cap="rnd">
+            <a:solidFill>
+              <a:srgbClr val="00B050"/>
+            </a:solidFill>
+          </a:ln>
+        </p:spPr>
+        <p:style>
+          <a:lnRef idx="1">
+            <a:schemeClr val="accent6"/>
+          </a:lnRef>
+          <a:fillRef idx="0">
+            <a:schemeClr val="accent6"/>
+          </a:fillRef>
+          <a:effectRef idx="0">
+            <a:schemeClr val="accent6"/>
+          </a:effectRef>
+          <a:fontRef idx="minor">
+            <a:schemeClr val="tx1"/>
+          </a:fontRef>
+        </p:style>
+      </p:cxnSp>
+      <p:cxnSp>
+        <p:nvCxnSpPr>
+          <p:cNvPr id="63" name="Straight Connector 62">
+            <a:extLst>
+              <a:ext uri="{FF2B5EF4-FFF2-40B4-BE49-F238E27FC236}">
+                <a16:creationId xmlns:a16="http://schemas.microsoft.com/office/drawing/2014/main" id="{42B02ED1-DAF2-6127-EB1B-98CD2AA71A66}"/>
+              </a:ext>
+            </a:extLst>
+          </p:cNvPr>
+          <p:cNvCxnSpPr>
+            <a:cxnSpLocks/>
+          </p:cNvCxnSpPr>
+          <p:nvPr/>
+        </p:nvCxnSpPr>
+        <p:spPr>
+          <a:xfrm>
+            <a:off x="6455152" y="3488939"/>
+            <a:ext cx="1181938" cy="0"/>
+          </a:xfrm>
+          <a:prstGeom prst="line">
+            <a:avLst/>
+          </a:prstGeom>
+          <a:ln w="38100" cap="rnd">
+            <a:solidFill>
+              <a:schemeClr val="tx1"/>
+            </a:solidFill>
+          </a:ln>
+        </p:spPr>
+        <p:style>
+          <a:lnRef idx="1">
+            <a:schemeClr val="accent6"/>
+          </a:lnRef>
+          <a:fillRef idx="0">
+            <a:schemeClr val="accent6"/>
+          </a:fillRef>
+          <a:effectRef idx="0">
+            <a:schemeClr val="accent6"/>
+          </a:effectRef>
+          <a:fontRef idx="minor">
+            <a:schemeClr val="tx1"/>
+          </a:fontRef>
+        </p:style>
+      </p:cxnSp>
+      <p:cxnSp>
+        <p:nvCxnSpPr>
           <p:cNvPr id="31" name="Straight Connector 30">
             <a:extLst>
               <a:ext uri="{FF2B5EF4-FFF2-40B4-BE49-F238E27FC236}">
@@ -5267,9 +5441,8 @@
           </a:prstGeom>
           <a:ln w="38100">
             <a:solidFill>
-              <a:schemeClr val="tx2">
-                <a:lumMod val="20000"/>
-                <a:lumOff val="80000"/>
+              <a:schemeClr val="bg2">
+                <a:lumMod val="90000"/>
               </a:schemeClr>
             </a:solidFill>
           </a:ln>
@@ -5536,9 +5709,8 @@
           </a:prstGeom>
           <a:ln w="38100" cap="rnd">
             <a:solidFill>
-              <a:schemeClr val="tx2">
-                <a:lumMod val="20000"/>
-                <a:lumOff val="80000"/>
+              <a:schemeClr val="bg2">
+                <a:lumMod val="90000"/>
               </a:schemeClr>
             </a:solidFill>
           </a:ln>
@@ -6340,53 +6512,9 @@
           </a:prstGeom>
           <a:ln w="38100" cap="rnd">
             <a:solidFill>
-              <a:schemeClr val="tx2">
-                <a:lumMod val="20000"/>
-                <a:lumOff val="80000"/>
+              <a:schemeClr val="bg2">
+                <a:lumMod val="90000"/>
               </a:schemeClr>
-            </a:solidFill>
-          </a:ln>
-        </p:spPr>
-        <p:style>
-          <a:lnRef idx="1">
-            <a:schemeClr val="accent6"/>
-          </a:lnRef>
-          <a:fillRef idx="0">
-            <a:schemeClr val="accent6"/>
-          </a:fillRef>
-          <a:effectRef idx="0">
-            <a:schemeClr val="accent6"/>
-          </a:effectRef>
-          <a:fontRef idx="minor">
-            <a:schemeClr val="tx1"/>
-          </a:fontRef>
-        </p:style>
-      </p:cxnSp>
-      <p:cxnSp>
-        <p:nvCxnSpPr>
-          <p:cNvPr id="63" name="Straight Connector 62">
-            <a:extLst>
-              <a:ext uri="{FF2B5EF4-FFF2-40B4-BE49-F238E27FC236}">
-                <a16:creationId xmlns:a16="http://schemas.microsoft.com/office/drawing/2014/main" id="{42B02ED1-DAF2-6127-EB1B-98CD2AA71A66}"/>
-              </a:ext>
-            </a:extLst>
-          </p:cNvPr>
-          <p:cNvCxnSpPr>
-            <a:cxnSpLocks/>
-          </p:cNvCxnSpPr>
-          <p:nvPr/>
-        </p:nvCxnSpPr>
-        <p:spPr>
-          <a:xfrm>
-            <a:off x="6455152" y="3488939"/>
-            <a:ext cx="1181938" cy="0"/>
-          </a:xfrm>
-          <a:prstGeom prst="line">
-            <a:avLst/>
-          </a:prstGeom>
-          <a:ln w="38100" cap="rnd">
-            <a:solidFill>
-              <a:schemeClr val="tx1"/>
             </a:solidFill>
           </a:ln>
         </p:spPr>
@@ -6778,7 +6906,7 @@
             <a:avLst/>
           </a:prstGeom>
           <a:solidFill>
-            <a:schemeClr val="tx1"/>
+            <a:srgbClr val="00B050"/>
           </a:solidFill>
           <a:ln>
             <a:solidFill>
@@ -6808,14 +6936,14 @@
           <a:p>
             <a:pPr algn="ctr"/>
             <a:r>
-              <a:rPr lang="en-US">
+              <a:rPr lang="en-US" dirty="0">
                 <a:solidFill>
                   <a:schemeClr val="bg1"/>
                 </a:solidFill>
               </a:rPr>
               <a:t>Sleeve</a:t>
             </a:r>
-            <a:endParaRPr lang="en-CA">
+            <a:endParaRPr lang="en-CA" dirty="0">
               <a:solidFill>
                 <a:schemeClr val="bg1"/>
               </a:solidFill>
@@ -7061,49 +7189,6 @@
           </a:fillRef>
           <a:effectRef idx="0">
             <a:schemeClr val="accent1"/>
-          </a:effectRef>
-          <a:fontRef idx="minor">
-            <a:schemeClr val="tx1"/>
-          </a:fontRef>
-        </p:style>
-      </p:cxnSp>
-      <p:cxnSp>
-        <p:nvCxnSpPr>
-          <p:cNvPr id="33" name="Straight Connector 32">
-            <a:extLst>
-              <a:ext uri="{FF2B5EF4-FFF2-40B4-BE49-F238E27FC236}">
-                <a16:creationId xmlns:a16="http://schemas.microsoft.com/office/drawing/2014/main" id="{495E1AC3-BB2C-2078-1868-FB27D432BD29}"/>
-              </a:ext>
-            </a:extLst>
-          </p:cNvPr>
-          <p:cNvCxnSpPr>
-            <a:cxnSpLocks/>
-          </p:cNvCxnSpPr>
-          <p:nvPr/>
-        </p:nvCxnSpPr>
-        <p:spPr>
-          <a:xfrm>
-            <a:off x="6506307" y="2033192"/>
-            <a:ext cx="1098523" cy="0"/>
-          </a:xfrm>
-          <a:prstGeom prst="line">
-            <a:avLst/>
-          </a:prstGeom>
-          <a:ln w="38100" cap="rnd">
-            <a:solidFill>
-              <a:schemeClr val="tx1"/>
-            </a:solidFill>
-          </a:ln>
-        </p:spPr>
-        <p:style>
-          <a:lnRef idx="1">
-            <a:schemeClr val="accent6"/>
-          </a:lnRef>
-          <a:fillRef idx="0">
-            <a:schemeClr val="accent6"/>
-          </a:fillRef>
-          <a:effectRef idx="0">
-            <a:schemeClr val="accent6"/>
           </a:effectRef>
           <a:fontRef idx="minor">
             <a:schemeClr val="tx1"/>
@@ -7214,15 +7299,15 @@
         </p:nvCxnSpPr>
         <p:spPr>
           <a:xfrm flipV="1">
-            <a:off x="5985050" y="2033192"/>
-            <a:ext cx="517586" cy="1264383"/>
+            <a:off x="5935626" y="2033192"/>
+            <a:ext cx="567010" cy="1264415"/>
           </a:xfrm>
           <a:prstGeom prst="line">
             <a:avLst/>
           </a:prstGeom>
           <a:ln w="38100" cap="rnd">
             <a:solidFill>
-              <a:schemeClr val="tx1"/>
+              <a:srgbClr val="00B050"/>
             </a:solidFill>
           </a:ln>
         </p:spPr>
@@ -7255,18 +7340,18 @@
         </p:nvSpPr>
         <p:spPr>
           <a:xfrm rot="5400000">
-            <a:off x="5703739" y="3338097"/>
-            <a:ext cx="557425" cy="476347"/>
+            <a:off x="5479442" y="3460318"/>
+            <a:ext cx="903941" cy="578422"/>
           </a:xfrm>
           <a:prstGeom prst="arc">
             <a:avLst>
-              <a:gd name="adj1" fmla="val 21510123"/>
+              <a:gd name="adj1" fmla="val 21465443"/>
               <a:gd name="adj2" fmla="val 10832048"/>
             </a:avLst>
           </a:prstGeom>
           <a:ln w="38100" cap="rnd">
             <a:solidFill>
-              <a:schemeClr val="tx1"/>
+              <a:srgbClr val="00B050"/>
             </a:solidFill>
           </a:ln>
         </p:spPr>
@@ -7304,20 +7389,21 @@
           </p:cNvPr>
           <p:cNvCxnSpPr>
             <a:cxnSpLocks/>
+            <a:stCxn id="54" idx="0"/>
           </p:cNvCxnSpPr>
           <p:nvPr/>
         </p:nvCxnSpPr>
         <p:spPr>
-          <a:xfrm flipH="1">
-            <a:off x="5974798" y="3853027"/>
-            <a:ext cx="8020" cy="238321"/>
+          <a:xfrm>
+            <a:off x="5949080" y="4200656"/>
+            <a:ext cx="29726" cy="228974"/>
           </a:xfrm>
           <a:prstGeom prst="line">
             <a:avLst/>
           </a:prstGeom>
           <a:ln w="38100" cap="rnd">
             <a:solidFill>
-              <a:schemeClr val="tx1"/>
+              <a:srgbClr val="00B050"/>
             </a:solidFill>
           </a:ln>
         </p:spPr>
@@ -7350,12 +7436,20 @@
         </p:nvSpPr>
         <p:spPr>
           <a:xfrm>
-            <a:off x="5909048" y="4015461"/>
+            <a:off x="5924807" y="4386665"/>
             <a:ext cx="108000" cy="108000"/>
           </a:xfrm>
           <a:prstGeom prst="ellipse">
             <a:avLst/>
           </a:prstGeom>
+          <a:solidFill>
+            <a:srgbClr val="00B050"/>
+          </a:solidFill>
+          <a:ln>
+            <a:solidFill>
+              <a:srgbClr val="00B050"/>
+            </a:solidFill>
+          </a:ln>
         </p:spPr>
         <p:style>
           <a:lnRef idx="2">
@@ -11362,15 +11456,6 @@
 </file>
 
 <file path=customXml/item1.xml><?xml version="1.0" encoding="utf-8"?>
-<?mso-contentType ?>
-<FormTemplates xmlns="http://schemas.microsoft.com/sharepoint/v3/contenttype/forms">
-  <Display>DocumentLibraryForm</Display>
-  <Edit>DocumentLibraryForm</Edit>
-  <New>DocumentLibraryForm</New>
-</FormTemplates>
-</file>
-
-<file path=customXml/item2.xml><?xml version="1.0" encoding="utf-8"?>
 <p:properties xmlns:p="http://schemas.microsoft.com/office/2006/metadata/properties" xmlns:xsi="http://www.w3.org/2001/XMLSchema-instance" xmlns:pc="http://schemas.microsoft.com/office/infopath/2007/PartnerControls">
   <documentManagement>
     <lcf76f155ced4ddcb4097134ff3c332f xmlns="cf9f6c1f-8ad0-4eb8-bb2b-fb0b622a341e">
@@ -11379,6 +11464,15 @@
     <TaxCatchAll xmlns="72c39c84-b0a3-45a2-a38c-ff46bb47f11f" xsi:nil="true"/>
   </documentManagement>
 </p:properties>
+</file>
+
+<file path=customXml/item2.xml><?xml version="1.0" encoding="utf-8"?>
+<?mso-contentType ?>
+<FormTemplates xmlns="http://schemas.microsoft.com/sharepoint/v3/contenttype/forms">
+  <Display>DocumentLibraryForm</Display>
+  <Edit>DocumentLibraryForm</Edit>
+  <New>DocumentLibraryForm</New>
+</FormTemplates>
 </file>
 
 <file path=customXml/item3.xml><?xml version="1.0" encoding="utf-8"?>
@@ -11625,20 +11719,20 @@
 </file>
 
 <file path=customXml/itemProps1.xml><?xml version="1.0" encoding="utf-8"?>
-<ds:datastoreItem xmlns:ds="http://schemas.openxmlformats.org/officeDocument/2006/customXml" ds:itemID="{148EFFC8-9BD5-44FF-969B-26E208EAEB1A}">
-  <ds:schemaRefs>
-    <ds:schemaRef ds:uri="http://schemas.microsoft.com/sharepoint/v3/contenttype/forms"/>
-  </ds:schemaRefs>
-</ds:datastoreItem>
-</file>
-
-<file path=customXml/itemProps2.xml><?xml version="1.0" encoding="utf-8"?>
 <ds:datastoreItem xmlns:ds="http://schemas.openxmlformats.org/officeDocument/2006/customXml" ds:itemID="{C2FF7CE0-5BF2-415B-9D8F-81359D68254C}">
   <ds:schemaRefs>
     <ds:schemaRef ds:uri="72c39c84-b0a3-45a2-a38c-ff46bb47f11f"/>
     <ds:schemaRef ds:uri="cf9f6c1f-8ad0-4eb8-bb2b-fb0b622a341e"/>
     <ds:schemaRef ds:uri="http://schemas.microsoft.com/office/2006/metadata/properties"/>
     <ds:schemaRef ds:uri="http://schemas.microsoft.com/office/infopath/2007/PartnerControls"/>
+  </ds:schemaRefs>
+</ds:datastoreItem>
+</file>
+
+<file path=customXml/itemProps2.xml><?xml version="1.0" encoding="utf-8"?>
+<ds:datastoreItem xmlns:ds="http://schemas.openxmlformats.org/officeDocument/2006/customXml" ds:itemID="{148EFFC8-9BD5-44FF-969B-26E208EAEB1A}">
+  <ds:schemaRefs>
+    <ds:schemaRef ds:uri="http://schemas.microsoft.com/sharepoint/v3/contenttype/forms"/>
   </ds:schemaRefs>
 </ds:datastoreItem>
 </file>

</xml_diff>